<commit_message>
- DSEV2: Graph 및 Core 구조 작업 중: JSON <-> AAS XML ??
</commit_message>
<xml_diff>
--- a/docs/Manuals/Developers/Hierarrchies.pptx
+++ b/docs/Manuals/Developers/Hierarrchies.pptx
@@ -7,12 +7,15 @@
   <p:sldIdLst>
     <p:sldId id="256" r:id="rId2"/>
     <p:sldId id="264" r:id="rId3"/>
-    <p:sldId id="265" r:id="rId4"/>
+    <p:sldId id="266" r:id="rId4"/>
+    <p:sldId id="267" r:id="rId5"/>
+    <p:sldId id="268" r:id="rId6"/>
+    <p:sldId id="265" r:id="rId7"/>
   </p:sldIdLst>
   <p:sldSz cx="12192000" cy="6858000"/>
   <p:notesSz cx="6858000" cy="9144000"/>
   <p:custDataLst>
-    <p:tags r:id="rId5"/>
+    <p:tags r:id="rId8"/>
   </p:custDataLst>
   <p:defaultTextStyle>
     <a:defPPr>
@@ -109,6 +112,11 @@
       </a:defRPr>
     </a:lvl9pPr>
   </p:defaultTextStyle>
+  <p:extLst>
+    <p:ext uri="{EFAFB233-063F-42B5-8137-9DF3F51BA10A}">
+      <p15:sldGuideLst xmlns:p15="http://schemas.microsoft.com/office/powerpoint/2012/main"/>
+    </p:ext>
+  </p:extLst>
 </p:presentation>
 </file>
 
@@ -261,9 +269,9 @@
           <a:p>
             <a:fld id="{658CC5F2-894C-457A-B848-A71CF30B605A}" type="datetimeFigureOut">
               <a:rPr lang="ko-KR" altLang="en-US" smtClean="0"/>
-              <a:t>2025-01-29</a:t>
+              <a:t>2025-02-01</a:t>
             </a:fld>
-            <a:endParaRPr lang="ko-KR" altLang="en-US"/>
+            <a:endParaRPr lang="ko-KR" altLang="en-US" dirty="0"/>
           </a:p>
         </p:txBody>
       </p:sp>
@@ -288,7 +296,7 @@
           <a:bodyPr/>
           <a:lstStyle/>
           <a:p>
-            <a:endParaRPr lang="ko-KR" altLang="en-US"/>
+            <a:endParaRPr lang="ko-KR" altLang="en-US" dirty="0"/>
           </a:p>
         </p:txBody>
       </p:sp>
@@ -317,7 +325,7 @@
               <a:rPr lang="ko-KR" altLang="en-US" smtClean="0"/>
               <a:t>‹#›</a:t>
             </a:fld>
-            <a:endParaRPr lang="ko-KR" altLang="en-US"/>
+            <a:endParaRPr lang="ko-KR" altLang="en-US" dirty="0"/>
           </a:p>
         </p:txBody>
       </p:sp>
@@ -461,9 +469,9 @@
           <a:p>
             <a:fld id="{658CC5F2-894C-457A-B848-A71CF30B605A}" type="datetimeFigureOut">
               <a:rPr lang="ko-KR" altLang="en-US" smtClean="0"/>
-              <a:t>2025-01-29</a:t>
+              <a:t>2025-02-01</a:t>
             </a:fld>
-            <a:endParaRPr lang="ko-KR" altLang="en-US"/>
+            <a:endParaRPr lang="ko-KR" altLang="en-US" dirty="0"/>
           </a:p>
         </p:txBody>
       </p:sp>
@@ -488,7 +496,7 @@
           <a:bodyPr/>
           <a:lstStyle/>
           <a:p>
-            <a:endParaRPr lang="ko-KR" altLang="en-US"/>
+            <a:endParaRPr lang="ko-KR" altLang="en-US" dirty="0"/>
           </a:p>
         </p:txBody>
       </p:sp>
@@ -517,7 +525,7 @@
               <a:rPr lang="ko-KR" altLang="en-US" smtClean="0"/>
               <a:t>‹#›</a:t>
             </a:fld>
-            <a:endParaRPr lang="ko-KR" altLang="en-US"/>
+            <a:endParaRPr lang="ko-KR" altLang="en-US" dirty="0"/>
           </a:p>
         </p:txBody>
       </p:sp>
@@ -671,9 +679,9 @@
           <a:p>
             <a:fld id="{658CC5F2-894C-457A-B848-A71CF30B605A}" type="datetimeFigureOut">
               <a:rPr lang="ko-KR" altLang="en-US" smtClean="0"/>
-              <a:t>2025-01-29</a:t>
+              <a:t>2025-02-01</a:t>
             </a:fld>
-            <a:endParaRPr lang="ko-KR" altLang="en-US"/>
+            <a:endParaRPr lang="ko-KR" altLang="en-US" dirty="0"/>
           </a:p>
         </p:txBody>
       </p:sp>
@@ -698,7 +706,7 @@
           <a:bodyPr/>
           <a:lstStyle/>
           <a:p>
-            <a:endParaRPr lang="ko-KR" altLang="en-US"/>
+            <a:endParaRPr lang="ko-KR" altLang="en-US" dirty="0"/>
           </a:p>
         </p:txBody>
       </p:sp>
@@ -727,7 +735,7 @@
               <a:rPr lang="ko-KR" altLang="en-US" smtClean="0"/>
               <a:t>‹#›</a:t>
             </a:fld>
-            <a:endParaRPr lang="ko-KR" altLang="en-US"/>
+            <a:endParaRPr lang="ko-KR" altLang="en-US" dirty="0"/>
           </a:p>
         </p:txBody>
       </p:sp>
@@ -871,9 +879,9 @@
           <a:p>
             <a:fld id="{658CC5F2-894C-457A-B848-A71CF30B605A}" type="datetimeFigureOut">
               <a:rPr lang="ko-KR" altLang="en-US" smtClean="0"/>
-              <a:t>2025-01-29</a:t>
+              <a:t>2025-02-01</a:t>
             </a:fld>
-            <a:endParaRPr lang="ko-KR" altLang="en-US"/>
+            <a:endParaRPr lang="ko-KR" altLang="en-US" dirty="0"/>
           </a:p>
         </p:txBody>
       </p:sp>
@@ -898,7 +906,7 @@
           <a:bodyPr/>
           <a:lstStyle/>
           <a:p>
-            <a:endParaRPr lang="ko-KR" altLang="en-US"/>
+            <a:endParaRPr lang="ko-KR" altLang="en-US" dirty="0"/>
           </a:p>
         </p:txBody>
       </p:sp>
@@ -927,7 +935,7 @@
               <a:rPr lang="ko-KR" altLang="en-US" smtClean="0"/>
               <a:t>‹#›</a:t>
             </a:fld>
-            <a:endParaRPr lang="ko-KR" altLang="en-US"/>
+            <a:endParaRPr lang="ko-KR" altLang="en-US" dirty="0"/>
           </a:p>
         </p:txBody>
       </p:sp>
@@ -1147,9 +1155,9 @@
           <a:p>
             <a:fld id="{658CC5F2-894C-457A-B848-A71CF30B605A}" type="datetimeFigureOut">
               <a:rPr lang="ko-KR" altLang="en-US" smtClean="0"/>
-              <a:t>2025-01-29</a:t>
+              <a:t>2025-02-01</a:t>
             </a:fld>
-            <a:endParaRPr lang="ko-KR" altLang="en-US"/>
+            <a:endParaRPr lang="ko-KR" altLang="en-US" dirty="0"/>
           </a:p>
         </p:txBody>
       </p:sp>
@@ -1174,7 +1182,7 @@
           <a:bodyPr/>
           <a:lstStyle/>
           <a:p>
-            <a:endParaRPr lang="ko-KR" altLang="en-US"/>
+            <a:endParaRPr lang="ko-KR" altLang="en-US" dirty="0"/>
           </a:p>
         </p:txBody>
       </p:sp>
@@ -1203,7 +1211,7 @@
               <a:rPr lang="ko-KR" altLang="en-US" smtClean="0"/>
               <a:t>‹#›</a:t>
             </a:fld>
-            <a:endParaRPr lang="ko-KR" altLang="en-US"/>
+            <a:endParaRPr lang="ko-KR" altLang="en-US" dirty="0"/>
           </a:p>
         </p:txBody>
       </p:sp>
@@ -1415,9 +1423,9 @@
           <a:p>
             <a:fld id="{658CC5F2-894C-457A-B848-A71CF30B605A}" type="datetimeFigureOut">
               <a:rPr lang="ko-KR" altLang="en-US" smtClean="0"/>
-              <a:t>2025-01-29</a:t>
+              <a:t>2025-02-01</a:t>
             </a:fld>
-            <a:endParaRPr lang="ko-KR" altLang="en-US"/>
+            <a:endParaRPr lang="ko-KR" altLang="en-US" dirty="0"/>
           </a:p>
         </p:txBody>
       </p:sp>
@@ -1442,7 +1450,7 @@
           <a:bodyPr/>
           <a:lstStyle/>
           <a:p>
-            <a:endParaRPr lang="ko-KR" altLang="en-US"/>
+            <a:endParaRPr lang="ko-KR" altLang="en-US" dirty="0"/>
           </a:p>
         </p:txBody>
       </p:sp>
@@ -1471,7 +1479,7 @@
               <a:rPr lang="ko-KR" altLang="en-US" smtClean="0"/>
               <a:t>‹#›</a:t>
             </a:fld>
-            <a:endParaRPr lang="ko-KR" altLang="en-US"/>
+            <a:endParaRPr lang="ko-KR" altLang="en-US" dirty="0"/>
           </a:p>
         </p:txBody>
       </p:sp>
@@ -1830,9 +1838,9 @@
           <a:p>
             <a:fld id="{658CC5F2-894C-457A-B848-A71CF30B605A}" type="datetimeFigureOut">
               <a:rPr lang="ko-KR" altLang="en-US" smtClean="0"/>
-              <a:t>2025-01-29</a:t>
+              <a:t>2025-02-01</a:t>
             </a:fld>
-            <a:endParaRPr lang="ko-KR" altLang="en-US"/>
+            <a:endParaRPr lang="ko-KR" altLang="en-US" dirty="0"/>
           </a:p>
         </p:txBody>
       </p:sp>
@@ -1857,7 +1865,7 @@
           <a:bodyPr/>
           <a:lstStyle/>
           <a:p>
-            <a:endParaRPr lang="ko-KR" altLang="en-US"/>
+            <a:endParaRPr lang="ko-KR" altLang="en-US" dirty="0"/>
           </a:p>
         </p:txBody>
       </p:sp>
@@ -1886,7 +1894,7 @@
               <a:rPr lang="ko-KR" altLang="en-US" smtClean="0"/>
               <a:t>‹#›</a:t>
             </a:fld>
-            <a:endParaRPr lang="ko-KR" altLang="en-US"/>
+            <a:endParaRPr lang="ko-KR" altLang="en-US" dirty="0"/>
           </a:p>
         </p:txBody>
       </p:sp>
@@ -1972,9 +1980,9 @@
           <a:p>
             <a:fld id="{658CC5F2-894C-457A-B848-A71CF30B605A}" type="datetimeFigureOut">
               <a:rPr lang="ko-KR" altLang="en-US" smtClean="0"/>
-              <a:t>2025-01-29</a:t>
+              <a:t>2025-02-01</a:t>
             </a:fld>
-            <a:endParaRPr lang="ko-KR" altLang="en-US"/>
+            <a:endParaRPr lang="ko-KR" altLang="en-US" dirty="0"/>
           </a:p>
         </p:txBody>
       </p:sp>
@@ -1999,7 +2007,7 @@
           <a:bodyPr/>
           <a:lstStyle/>
           <a:p>
-            <a:endParaRPr lang="ko-KR" altLang="en-US"/>
+            <a:endParaRPr lang="ko-KR" altLang="en-US" dirty="0"/>
           </a:p>
         </p:txBody>
       </p:sp>
@@ -2028,7 +2036,7 @@
               <a:rPr lang="ko-KR" altLang="en-US" smtClean="0"/>
               <a:t>‹#›</a:t>
             </a:fld>
-            <a:endParaRPr lang="ko-KR" altLang="en-US"/>
+            <a:endParaRPr lang="ko-KR" altLang="en-US" dirty="0"/>
           </a:p>
         </p:txBody>
       </p:sp>
@@ -2085,9 +2093,9 @@
           <a:p>
             <a:fld id="{658CC5F2-894C-457A-B848-A71CF30B605A}" type="datetimeFigureOut">
               <a:rPr lang="ko-KR" altLang="en-US" smtClean="0"/>
-              <a:t>2025-01-29</a:t>
+              <a:t>2025-02-01</a:t>
             </a:fld>
-            <a:endParaRPr lang="ko-KR" altLang="en-US"/>
+            <a:endParaRPr lang="ko-KR" altLang="en-US" dirty="0"/>
           </a:p>
         </p:txBody>
       </p:sp>
@@ -2112,7 +2120,7 @@
           <a:bodyPr/>
           <a:lstStyle/>
           <a:p>
-            <a:endParaRPr lang="ko-KR" altLang="en-US"/>
+            <a:endParaRPr lang="ko-KR" altLang="en-US" dirty="0"/>
           </a:p>
         </p:txBody>
       </p:sp>
@@ -2141,7 +2149,7 @@
               <a:rPr lang="ko-KR" altLang="en-US" smtClean="0"/>
               <a:t>‹#›</a:t>
             </a:fld>
-            <a:endParaRPr lang="ko-KR" altLang="en-US"/>
+            <a:endParaRPr lang="ko-KR" altLang="en-US" dirty="0"/>
           </a:p>
         </p:txBody>
       </p:sp>
@@ -2398,9 +2406,9 @@
           <a:p>
             <a:fld id="{658CC5F2-894C-457A-B848-A71CF30B605A}" type="datetimeFigureOut">
               <a:rPr lang="ko-KR" altLang="en-US" smtClean="0"/>
-              <a:t>2025-01-29</a:t>
+              <a:t>2025-02-01</a:t>
             </a:fld>
-            <a:endParaRPr lang="ko-KR" altLang="en-US"/>
+            <a:endParaRPr lang="ko-KR" altLang="en-US" dirty="0"/>
           </a:p>
         </p:txBody>
       </p:sp>
@@ -2425,7 +2433,7 @@
           <a:bodyPr/>
           <a:lstStyle/>
           <a:p>
-            <a:endParaRPr lang="ko-KR" altLang="en-US"/>
+            <a:endParaRPr lang="ko-KR" altLang="en-US" dirty="0"/>
           </a:p>
         </p:txBody>
       </p:sp>
@@ -2454,7 +2462,7 @@
               <a:rPr lang="ko-KR" altLang="en-US" smtClean="0"/>
               <a:t>‹#›</a:t>
             </a:fld>
-            <a:endParaRPr lang="ko-KR" altLang="en-US"/>
+            <a:endParaRPr lang="ko-KR" altLang="en-US" dirty="0"/>
           </a:p>
         </p:txBody>
       </p:sp>
@@ -2589,7 +2597,7 @@
             </a:lvl9pPr>
           </a:lstStyle>
           <a:p>
-            <a:endParaRPr lang="ko-KR" altLang="en-US"/>
+            <a:endParaRPr lang="ko-KR" altLang="en-US" dirty="0"/>
           </a:p>
         </p:txBody>
       </p:sp>
@@ -2687,9 +2695,9 @@
           <a:p>
             <a:fld id="{658CC5F2-894C-457A-B848-A71CF30B605A}" type="datetimeFigureOut">
               <a:rPr lang="ko-KR" altLang="en-US" smtClean="0"/>
-              <a:t>2025-01-29</a:t>
+              <a:t>2025-02-01</a:t>
             </a:fld>
-            <a:endParaRPr lang="ko-KR" altLang="en-US"/>
+            <a:endParaRPr lang="ko-KR" altLang="en-US" dirty="0"/>
           </a:p>
         </p:txBody>
       </p:sp>
@@ -2714,7 +2722,7 @@
           <a:bodyPr/>
           <a:lstStyle/>
           <a:p>
-            <a:endParaRPr lang="ko-KR" altLang="en-US"/>
+            <a:endParaRPr lang="ko-KR" altLang="en-US" dirty="0"/>
           </a:p>
         </p:txBody>
       </p:sp>
@@ -2743,7 +2751,7 @@
               <a:rPr lang="ko-KR" altLang="en-US" smtClean="0"/>
               <a:t>‹#›</a:t>
             </a:fld>
-            <a:endParaRPr lang="ko-KR" altLang="en-US"/>
+            <a:endParaRPr lang="ko-KR" altLang="en-US" dirty="0"/>
           </a:p>
         </p:txBody>
       </p:sp>
@@ -2930,9 +2938,9 @@
           <a:p>
             <a:fld id="{658CC5F2-894C-457A-B848-A71CF30B605A}" type="datetimeFigureOut">
               <a:rPr lang="ko-KR" altLang="en-US" smtClean="0"/>
-              <a:t>2025-01-29</a:t>
+              <a:t>2025-02-01</a:t>
             </a:fld>
-            <a:endParaRPr lang="ko-KR" altLang="en-US"/>
+            <a:endParaRPr lang="ko-KR" altLang="en-US" dirty="0"/>
           </a:p>
         </p:txBody>
       </p:sp>
@@ -2975,7 +2983,7 @@
             </a:lvl1pPr>
           </a:lstStyle>
           <a:p>
-            <a:endParaRPr lang="ko-KR" altLang="en-US"/>
+            <a:endParaRPr lang="ko-KR" altLang="en-US" dirty="0"/>
           </a:p>
         </p:txBody>
       </p:sp>
@@ -3022,7 +3030,7 @@
               <a:rPr lang="ko-KR" altLang="en-US" smtClean="0"/>
               <a:t>‹#›</a:t>
             </a:fld>
-            <a:endParaRPr lang="ko-KR" altLang="en-US"/>
+            <a:endParaRPr lang="ko-KR" altLang="en-US" dirty="0"/>
           </a:p>
         </p:txBody>
       </p:sp>
@@ -3368,7 +3376,11 @@
           <a:bodyPr/>
           <a:lstStyle/>
           <a:p>
-            <a:endParaRPr lang="ko-KR" altLang="en-US"/>
+            <a:r>
+              <a:rPr lang="en-US" altLang="ko-KR" dirty="0"/>
+              <a:t>DSEV2</a:t>
+            </a:r>
+            <a:endParaRPr lang="ko-KR" altLang="en-US" dirty="0"/>
           </a:p>
         </p:txBody>
       </p:sp>
@@ -3393,7 +3405,11 @@
           <a:bodyPr/>
           <a:lstStyle/>
           <a:p>
-            <a:endParaRPr lang="ko-KR" altLang="en-US"/>
+            <a:r>
+              <a:rPr lang="en-US" altLang="ko-KR" dirty="0"/>
+              <a:t>DS Engine Version2</a:t>
+            </a:r>
+            <a:endParaRPr lang="ko-KR" altLang="en-US" dirty="0"/>
           </a:p>
         </p:txBody>
       </p:sp>
@@ -3559,24 +3575,23 @@
           <a:lstStyle/>
           <a:p>
             <a:r>
-              <a:rPr lang="en-US" altLang="ko-KR" sz="1000" dirty="0" err="1"/>
+              <a:rPr lang="en-US" altLang="ko-KR" sz="1000" dirty="0"/>
               <a:t>Dual.Common.Core</a:t>
             </a:r>
             <a:endParaRPr lang="ko-KR" altLang="en-US" sz="1000" dirty="0"/>
           </a:p>
           <a:p>
             <a:r>
-              <a:rPr lang="en-US" altLang="ko-KR" sz="1000" dirty="0" err="1"/>
+              <a:rPr lang="en-US" altLang="ko-KR" sz="1000" dirty="0"/>
               <a:t>Dual.Common.Core.FS</a:t>
             </a:r>
             <a:endParaRPr lang="ko-KR" altLang="en-US" sz="1000" dirty="0"/>
           </a:p>
           <a:p>
             <a:r>
-              <a:rPr lang="en-US" altLang="ko-KR" sz="1000" dirty="0" err="1"/>
+              <a:rPr lang="en-US" altLang="ko-KR" sz="1000" dirty="0"/>
               <a:t>Dual.Common.Base.CS</a:t>
             </a:r>
-            <a:endParaRPr lang="en-US" altLang="ko-KR" sz="1000" dirty="0"/>
           </a:p>
           <a:p>
             <a:r>
@@ -3606,6 +3621,192 @@
           <a:xfrm>
             <a:off x="4978352" y="1916822"/>
             <a:ext cx="1905458" cy="324571"/>
+          </a:xfrm>
+          <a:prstGeom prst="straightConnector1">
+            <a:avLst/>
+          </a:prstGeom>
+          <a:ln>
+            <a:headEnd type="none"/>
+            <a:tailEnd type="triangle"/>
+          </a:ln>
+        </p:spPr>
+        <p:style>
+          <a:lnRef idx="2">
+            <a:schemeClr val="accent1"/>
+          </a:lnRef>
+          <a:fillRef idx="0">
+            <a:schemeClr val="accent1"/>
+          </a:fillRef>
+          <a:effectRef idx="1">
+            <a:schemeClr val="accent1"/>
+          </a:effectRef>
+          <a:fontRef idx="minor">
+            <a:schemeClr val="tx1"/>
+          </a:fontRef>
+        </p:style>
+      </p:cxnSp>
+      <p:sp>
+        <p:nvSpPr>
+          <p:cNvPr id="3" name="TextBox 2">
+            <a:extLst>
+              <a:ext uri="{FF2B5EF4-FFF2-40B4-BE49-F238E27FC236}">
+                <a16:creationId xmlns:a16="http://schemas.microsoft.com/office/drawing/2014/main" id="{AF945F5D-7889-E0EF-088A-A513A1BB3B2C}"/>
+              </a:ext>
+            </a:extLst>
+          </p:cNvPr>
+          <p:cNvSpPr txBox="1"/>
+          <p:nvPr>
+            <p:custDataLst>
+              <p:tags r:id="rId4"/>
+            </p:custDataLst>
+          </p:nvPr>
+        </p:nvSpPr>
+        <p:spPr>
+          <a:xfrm>
+            <a:off x="6940684" y="2684377"/>
+            <a:ext cx="965329" cy="369332"/>
+          </a:xfrm>
+          <a:prstGeom prst="rect">
+            <a:avLst/>
+          </a:prstGeom>
+          <a:solidFill>
+            <a:schemeClr val="accent5">
+              <a:lumMod val="40000"/>
+              <a:lumOff val="60000"/>
+            </a:schemeClr>
+          </a:solidFill>
+        </p:spPr>
+        <p:txBody>
+          <a:bodyPr wrap="none" rtlCol="0">
+            <a:spAutoFit/>
+          </a:bodyPr>
+          <a:lstStyle/>
+          <a:p>
+            <a:r>
+              <a:rPr lang="en-US" altLang="ko-KR" dirty="0"/>
+              <a:t>Ev2.Aas</a:t>
+            </a:r>
+            <a:endParaRPr lang="ko-KR" altLang="en-US" dirty="0"/>
+          </a:p>
+        </p:txBody>
+      </p:sp>
+      <p:cxnSp>
+        <p:nvCxnSpPr>
+          <p:cNvPr id="5" name="직선 화살표 연결선 4">
+            <a:extLst>
+              <a:ext uri="{FF2B5EF4-FFF2-40B4-BE49-F238E27FC236}">
+                <a16:creationId xmlns:a16="http://schemas.microsoft.com/office/drawing/2014/main" id="{1BF01573-A441-B7B2-8A01-4E5D13D3E5FC}"/>
+              </a:ext>
+            </a:extLst>
+          </p:cNvPr>
+          <p:cNvCxnSpPr>
+            <a:cxnSpLocks/>
+            <a:stCxn id="4" idx="2"/>
+            <a:endCxn id="3" idx="0"/>
+          </p:cNvCxnSpPr>
+          <p:nvPr/>
+        </p:nvCxnSpPr>
+        <p:spPr>
+          <a:xfrm>
+            <a:off x="7423349" y="2426059"/>
+            <a:ext cx="0" cy="258318"/>
+          </a:xfrm>
+          <a:prstGeom prst="straightConnector1">
+            <a:avLst/>
+          </a:prstGeom>
+          <a:ln>
+            <a:headEnd type="none"/>
+            <a:tailEnd type="triangle"/>
+          </a:ln>
+        </p:spPr>
+        <p:style>
+          <a:lnRef idx="2">
+            <a:schemeClr val="accent1"/>
+          </a:lnRef>
+          <a:fillRef idx="0">
+            <a:schemeClr val="accent1"/>
+          </a:fillRef>
+          <a:effectRef idx="1">
+            <a:schemeClr val="accent1"/>
+          </a:effectRef>
+          <a:fontRef idx="minor">
+            <a:schemeClr val="tx1"/>
+          </a:fontRef>
+        </p:style>
+      </p:cxnSp>
+      <p:sp>
+        <p:nvSpPr>
+          <p:cNvPr id="9" name="TextBox 8">
+            <a:extLst>
+              <a:ext uri="{FF2B5EF4-FFF2-40B4-BE49-F238E27FC236}">
+                <a16:creationId xmlns:a16="http://schemas.microsoft.com/office/drawing/2014/main" id="{B392A90A-500D-A9BC-DEB9-B69933C4435E}"/>
+              </a:ext>
+            </a:extLst>
+          </p:cNvPr>
+          <p:cNvSpPr txBox="1"/>
+          <p:nvPr>
+            <p:custDataLst>
+              <p:tags r:id="rId5"/>
+            </p:custDataLst>
+          </p:nvPr>
+        </p:nvSpPr>
+        <p:spPr>
+          <a:xfrm>
+            <a:off x="3490444" y="2515100"/>
+            <a:ext cx="1127232" cy="246221"/>
+          </a:xfrm>
+          <a:prstGeom prst="rect">
+            <a:avLst/>
+          </a:prstGeom>
+          <a:noFill/>
+        </p:spPr>
+        <p:style>
+          <a:lnRef idx="1">
+            <a:schemeClr val="accent4"/>
+          </a:lnRef>
+          <a:fillRef idx="2">
+            <a:schemeClr val="accent4"/>
+          </a:fillRef>
+          <a:effectRef idx="1">
+            <a:schemeClr val="accent4"/>
+          </a:effectRef>
+          <a:fontRef idx="minor">
+            <a:schemeClr val="dk1"/>
+          </a:fontRef>
+        </p:style>
+        <p:txBody>
+          <a:bodyPr wrap="none" rtlCol="0">
+            <a:spAutoFit/>
+          </a:bodyPr>
+          <a:lstStyle/>
+          <a:p>
+            <a:r>
+              <a:rPr lang="en-US" altLang="ko-KR" sz="1000" dirty="0"/>
+              <a:t>Aas.Core.Aas3_0</a:t>
+            </a:r>
+          </a:p>
+        </p:txBody>
+      </p:sp>
+      <p:cxnSp>
+        <p:nvCxnSpPr>
+          <p:cNvPr id="10" name="직선 화살표 연결선 9">
+            <a:extLst>
+              <a:ext uri="{FF2B5EF4-FFF2-40B4-BE49-F238E27FC236}">
+                <a16:creationId xmlns:a16="http://schemas.microsoft.com/office/drawing/2014/main" id="{86B39181-343E-9365-06FC-A240D0315753}"/>
+              </a:ext>
+            </a:extLst>
+          </p:cNvPr>
+          <p:cNvCxnSpPr>
+            <a:cxnSpLocks/>
+            <a:stCxn id="9" idx="3"/>
+            <a:endCxn id="3" idx="1"/>
+          </p:cNvCxnSpPr>
+          <p:nvPr/>
+        </p:nvCxnSpPr>
+        <p:spPr>
+          <a:xfrm>
+            <a:off x="4617676" y="2638211"/>
+            <a:ext cx="2323008" cy="230832"/>
           </a:xfrm>
           <a:prstGeom prst="straightConnector1">
             <a:avLst/>
@@ -3665,10 +3866,10 @@
       </p:grpSpPr>
       <p:sp>
         <p:nvSpPr>
-          <p:cNvPr id="2" name="Title 1">
-            <a:extLst>
-              <a:ext uri="{FF2B5EF4-FFF2-40B4-BE49-F238E27FC236}">
-                <a16:creationId xmlns:a16="http://schemas.microsoft.com/office/drawing/2014/main" id="{6E5FF25C-1B37-6D7C-B51D-3752923B471C}"/>
+          <p:cNvPr id="2" name="제목 1">
+            <a:extLst>
+              <a:ext uri="{FF2B5EF4-FFF2-40B4-BE49-F238E27FC236}">
+                <a16:creationId xmlns:a16="http://schemas.microsoft.com/office/drawing/2014/main" id="{74EB40FC-42FA-25E2-9DAF-66F46FC3AB9D}"/>
               </a:ext>
             </a:extLst>
           </p:cNvPr>
@@ -3679,14 +3880,19 @@
             <p:ph type="title"/>
           </p:nvPr>
         </p:nvSpPr>
-        <p:spPr/>
+        <p:spPr>
+          <a:xfrm>
+            <a:off x="838200" y="365858"/>
+            <a:ext cx="10515600" cy="1325563"/>
+          </a:xfrm>
+        </p:spPr>
         <p:txBody>
           <a:bodyPr/>
           <a:lstStyle/>
           <a:p>
             <a:r>
               <a:rPr lang="en-US" altLang="ko-KR" dirty="0"/>
-              <a:t>Class Hierarchy</a:t>
+              <a:t>Dll hierarchies (serialization)</a:t>
             </a:r>
             <a:endParaRPr lang="ko-KR" altLang="en-US" dirty="0"/>
           </a:p>
@@ -3694,75 +3900,326 @@
       </p:sp>
       <p:sp>
         <p:nvSpPr>
-          <p:cNvPr id="4" name="TextBox 3">
-            <a:extLst>
-              <a:ext uri="{FF2B5EF4-FFF2-40B4-BE49-F238E27FC236}">
-                <a16:creationId xmlns:a16="http://schemas.microsoft.com/office/drawing/2014/main" id="{5EC05E0C-4669-18C2-61B3-DAF016E7D8AE}"/>
-              </a:ext>
-            </a:extLst>
-          </p:cNvPr>
-          <p:cNvSpPr txBox="1"/>
-          <p:nvPr>
-            <p:custDataLst>
-              <p:tags r:id="rId2"/>
-            </p:custDataLst>
-          </p:nvPr>
+          <p:cNvPr id="6" name="직사각형 5">
+            <a:extLst>
+              <a:ext uri="{FF2B5EF4-FFF2-40B4-BE49-F238E27FC236}">
+                <a16:creationId xmlns:a16="http://schemas.microsoft.com/office/drawing/2014/main" id="{D7655F9A-9955-E649-E867-A29152750651}"/>
+              </a:ext>
+            </a:extLst>
+          </p:cNvPr>
+          <p:cNvSpPr/>
+          <p:nvPr/>
         </p:nvSpPr>
         <p:spPr>
           <a:xfrm>
-            <a:off x="3088558" y="2292701"/>
-            <a:ext cx="1896673" cy="369332"/>
+            <a:off x="6865061" y="1816695"/>
+            <a:ext cx="2734811" cy="1740716"/>
           </a:xfrm>
           <a:prstGeom prst="rect">
             <a:avLst/>
           </a:prstGeom>
-          <a:solidFill>
-            <a:schemeClr val="accent5">
-              <a:lumMod val="40000"/>
-              <a:lumOff val="60000"/>
-            </a:schemeClr>
-          </a:solidFill>
-        </p:spPr>
-        <p:txBody>
-          <a:bodyPr wrap="none" rtlCol="0">
-            <a:spAutoFit/>
-          </a:bodyPr>
-          <a:lstStyle/>
-          <a:p>
-            <a:r>
-              <a:rPr lang="en-US" altLang="ko-KR" dirty="0" err="1"/>
-              <a:t>DsNamedObject</a:t>
+        </p:spPr>
+        <p:style>
+          <a:lnRef idx="1">
+            <a:schemeClr val="accent4"/>
+          </a:lnRef>
+          <a:fillRef idx="2">
+            <a:schemeClr val="accent4"/>
+          </a:fillRef>
+          <a:effectRef idx="1">
+            <a:schemeClr val="accent4"/>
+          </a:effectRef>
+          <a:fontRef idx="minor">
+            <a:schemeClr val="dk1"/>
+          </a:fontRef>
+        </p:style>
+        <p:txBody>
+          <a:bodyPr rtlCol="0" anchor="t"/>
+          <a:lstStyle/>
+          <a:p>
+            <a:pPr algn="ctr"/>
+            <a:r>
+              <a:rPr lang="en-US" altLang="ko-KR" dirty="0"/>
+              <a:t>Ev2.Core</a:t>
             </a:r>
             <a:endParaRPr lang="ko-KR" altLang="en-US" dirty="0"/>
+          </a:p>
+        </p:txBody>
+      </p:sp>
+      <p:sp>
+        <p:nvSpPr>
+          <p:cNvPr id="8" name="사각형: 둥근 모서리 7">
+            <a:extLst>
+              <a:ext uri="{FF2B5EF4-FFF2-40B4-BE49-F238E27FC236}">
+                <a16:creationId xmlns:a16="http://schemas.microsoft.com/office/drawing/2014/main" id="{029C70EB-DFE0-2BF6-90A0-A538E08DE842}"/>
+              </a:ext>
+            </a:extLst>
+          </p:cNvPr>
+          <p:cNvSpPr/>
+          <p:nvPr/>
+        </p:nvSpPr>
+        <p:spPr>
+          <a:xfrm>
+            <a:off x="6986704" y="2341009"/>
+            <a:ext cx="851482" cy="931178"/>
+          </a:xfrm>
+          <a:prstGeom prst="roundRect">
+            <a:avLst/>
+          </a:prstGeom>
+        </p:spPr>
+        <p:style>
+          <a:lnRef idx="1">
+            <a:schemeClr val="accent5"/>
+          </a:lnRef>
+          <a:fillRef idx="2">
+            <a:schemeClr val="accent5"/>
+          </a:fillRef>
+          <a:effectRef idx="1">
+            <a:schemeClr val="accent5"/>
+          </a:effectRef>
+          <a:fontRef idx="minor">
+            <a:schemeClr val="dk1"/>
+          </a:fontRef>
+        </p:style>
+        <p:txBody>
+          <a:bodyPr rtlCol="0" anchor="ctr"/>
+          <a:lstStyle/>
+          <a:p>
+            <a:pPr algn="ctr"/>
+            <a:r>
+              <a:rPr lang="en-US" altLang="ko-KR" sz="1000" b="1" dirty="0"/>
+              <a:t>Memory Instance</a:t>
+            </a:r>
+          </a:p>
+          <a:p>
+            <a:pPr algn="ctr"/>
+            <a:endParaRPr lang="en-US" altLang="ko-KR" sz="1000" dirty="0"/>
+          </a:p>
+          <a:p>
+            <a:pPr algn="ctr"/>
+            <a:r>
+              <a:rPr lang="en-US" altLang="ko-KR" sz="700" dirty="0"/>
+              <a:t>DsSystem</a:t>
+            </a:r>
+          </a:p>
+          <a:p>
+            <a:pPr algn="ctr"/>
+            <a:r>
+              <a:rPr lang="en-US" altLang="ko-KR" sz="700" dirty="0"/>
+              <a:t>DsWork</a:t>
+            </a:r>
+          </a:p>
+          <a:p>
+            <a:pPr algn="ctr"/>
+            <a:r>
+              <a:rPr lang="en-US" altLang="ko-KR" sz="700" dirty="0"/>
+              <a:t>DsFlow</a:t>
+            </a:r>
+          </a:p>
+          <a:p>
+            <a:pPr algn="ctr"/>
+            <a:r>
+              <a:rPr lang="en-US" altLang="ko-KR" sz="700" b="1" dirty="0"/>
+              <a:t>…</a:t>
+            </a:r>
+            <a:endParaRPr lang="ko-KR" altLang="en-US" sz="700" b="1" dirty="0"/>
+          </a:p>
+        </p:txBody>
+      </p:sp>
+      <p:sp>
+        <p:nvSpPr>
+          <p:cNvPr id="9" name="사각형: 둥근 모서리 8">
+            <a:extLst>
+              <a:ext uri="{FF2B5EF4-FFF2-40B4-BE49-F238E27FC236}">
+                <a16:creationId xmlns:a16="http://schemas.microsoft.com/office/drawing/2014/main" id="{37B36A1B-BC0C-6737-663F-72B7B8B6A71B}"/>
+              </a:ext>
+            </a:extLst>
+          </p:cNvPr>
+          <p:cNvSpPr/>
+          <p:nvPr/>
+        </p:nvSpPr>
+        <p:spPr>
+          <a:xfrm>
+            <a:off x="8442193" y="2614432"/>
+            <a:ext cx="1083576" cy="395682"/>
+          </a:xfrm>
+          <a:prstGeom prst="roundRect">
+            <a:avLst/>
+          </a:prstGeom>
+        </p:spPr>
+        <p:style>
+          <a:lnRef idx="1">
+            <a:schemeClr val="accent5"/>
+          </a:lnRef>
+          <a:fillRef idx="2">
+            <a:schemeClr val="accent5"/>
+          </a:fillRef>
+          <a:effectRef idx="1">
+            <a:schemeClr val="accent5"/>
+          </a:effectRef>
+          <a:fontRef idx="minor">
+            <a:schemeClr val="dk1"/>
+          </a:fontRef>
+        </p:style>
+        <p:txBody>
+          <a:bodyPr rtlCol="0" anchor="ctr"/>
+          <a:lstStyle/>
+          <a:p>
+            <a:pPr algn="ctr"/>
+            <a:r>
+              <a:rPr lang="en-US" altLang="ko-KR" sz="1000" b="1" dirty="0"/>
+              <a:t>Newtonsoft</a:t>
+            </a:r>
+          </a:p>
+          <a:p>
+            <a:pPr algn="ctr"/>
+            <a:r>
+              <a:rPr lang="en-US" altLang="ko-KR" sz="1000" b="1" dirty="0"/>
+              <a:t>Json</a:t>
+            </a:r>
+            <a:endParaRPr lang="ko-KR" altLang="en-US" sz="700" b="1" dirty="0"/>
+          </a:p>
+        </p:txBody>
+      </p:sp>
+      <p:sp>
+        <p:nvSpPr>
+          <p:cNvPr id="11" name="직사각형 10">
+            <a:extLst>
+              <a:ext uri="{FF2B5EF4-FFF2-40B4-BE49-F238E27FC236}">
+                <a16:creationId xmlns:a16="http://schemas.microsoft.com/office/drawing/2014/main" id="{C85C4C61-CAA9-9EE0-58EF-EE65DDF2ADE6}"/>
+              </a:ext>
+            </a:extLst>
+          </p:cNvPr>
+          <p:cNvSpPr/>
+          <p:nvPr/>
+        </p:nvSpPr>
+        <p:spPr>
+          <a:xfrm>
+            <a:off x="2246835" y="5208887"/>
+            <a:ext cx="2838994" cy="1409354"/>
+          </a:xfrm>
+          <a:prstGeom prst="rect">
+            <a:avLst/>
+          </a:prstGeom>
+        </p:spPr>
+        <p:style>
+          <a:lnRef idx="1">
+            <a:schemeClr val="accent4"/>
+          </a:lnRef>
+          <a:fillRef idx="2">
+            <a:schemeClr val="accent4"/>
+          </a:fillRef>
+          <a:effectRef idx="1">
+            <a:schemeClr val="accent4"/>
+          </a:effectRef>
+          <a:fontRef idx="minor">
+            <a:schemeClr val="dk1"/>
+          </a:fontRef>
+        </p:style>
+        <p:txBody>
+          <a:bodyPr rtlCol="0" anchor="b"/>
+          <a:lstStyle/>
+          <a:p>
+            <a:pPr algn="ctr"/>
+            <a:r>
+              <a:rPr lang="en-US" altLang="ko-KR" dirty="0"/>
+              <a:t>Ev2.Aas</a:t>
+            </a:r>
+            <a:endParaRPr lang="ko-KR" altLang="en-US" dirty="0"/>
+          </a:p>
+        </p:txBody>
+      </p:sp>
+      <p:sp>
+        <p:nvSpPr>
+          <p:cNvPr id="13" name="사각형: 둥근 모서리 12">
+            <a:extLst>
+              <a:ext uri="{FF2B5EF4-FFF2-40B4-BE49-F238E27FC236}">
+                <a16:creationId xmlns:a16="http://schemas.microsoft.com/office/drawing/2014/main" id="{F2DB7C11-93B2-49F5-BB4B-C350C866BD70}"/>
+              </a:ext>
+            </a:extLst>
+          </p:cNvPr>
+          <p:cNvSpPr/>
+          <p:nvPr/>
+        </p:nvSpPr>
+        <p:spPr>
+          <a:xfrm>
+            <a:off x="3728730" y="5606898"/>
+            <a:ext cx="1083576" cy="395682"/>
+          </a:xfrm>
+          <a:prstGeom prst="roundRect">
+            <a:avLst/>
+          </a:prstGeom>
+        </p:spPr>
+        <p:style>
+          <a:lnRef idx="1">
+            <a:schemeClr val="accent5"/>
+          </a:lnRef>
+          <a:fillRef idx="2">
+            <a:schemeClr val="accent5"/>
+          </a:fillRef>
+          <a:effectRef idx="1">
+            <a:schemeClr val="accent5"/>
+          </a:effectRef>
+          <a:fontRef idx="minor">
+            <a:schemeClr val="dk1"/>
+          </a:fontRef>
+        </p:style>
+        <p:txBody>
+          <a:bodyPr rtlCol="0" anchor="ctr"/>
+          <a:lstStyle/>
+          <a:p>
+            <a:pPr algn="ctr"/>
+            <a:r>
+              <a:rPr lang="en-US" altLang="ko-KR" sz="1000" b="1" dirty="0"/>
+              <a:t>AAS </a:t>
+            </a:r>
+            <a:r>
+              <a:rPr lang="ko-KR" altLang="en-US" sz="1000" b="1" dirty="0"/>
+              <a:t>용</a:t>
+            </a:r>
+            <a:endParaRPr lang="en-US" altLang="ko-KR" sz="1000" b="1" dirty="0"/>
+          </a:p>
+          <a:p>
+            <a:pPr algn="ctr"/>
+            <a:r>
+              <a:rPr lang="en-US" altLang="ko-KR" sz="1000" b="1" dirty="0"/>
+              <a:t>Json</a:t>
+            </a:r>
+            <a:endParaRPr lang="ko-KR" altLang="en-US" sz="700" b="1" dirty="0"/>
           </a:p>
         </p:txBody>
       </p:sp>
       <p:cxnSp>
         <p:nvCxnSpPr>
-          <p:cNvPr id="5" name="직선 화살표 연결선 110">
-            <a:extLst>
-              <a:ext uri="{FF2B5EF4-FFF2-40B4-BE49-F238E27FC236}">
-                <a16:creationId xmlns:a16="http://schemas.microsoft.com/office/drawing/2014/main" id="{ED8DDD34-38AA-5AAB-3CFE-B7D44271C266}"/>
+          <p:cNvPr id="16" name="직선 화살표 연결선 15">
+            <a:extLst>
+              <a:ext uri="{FF2B5EF4-FFF2-40B4-BE49-F238E27FC236}">
+                <a16:creationId xmlns:a16="http://schemas.microsoft.com/office/drawing/2014/main" id="{C272DAC9-42D7-F484-954D-D4668033B4A5}"/>
               </a:ext>
             </a:extLst>
           </p:cNvPr>
           <p:cNvCxnSpPr>
             <a:cxnSpLocks/>
-            <a:stCxn id="4" idx="2"/>
-            <a:endCxn id="8" idx="0"/>
+            <a:stCxn id="8" idx="2"/>
+            <a:endCxn id="13" idx="0"/>
           </p:cNvCxnSpPr>
           <p:nvPr/>
         </p:nvCxnSpPr>
         <p:spPr>
           <a:xfrm flipH="1">
-            <a:off x="1715537" y="2662033"/>
-            <a:ext cx="2321358" cy="440625"/>
+            <a:off x="4270518" y="3272187"/>
+            <a:ext cx="3141927" cy="2334711"/>
           </a:xfrm>
           <a:prstGeom prst="straightConnector1">
             <a:avLst/>
           </a:prstGeom>
-          <a:ln>
-            <a:headEnd type="none"/>
+          <a:ln w="76200">
+            <a:solidFill>
+              <a:schemeClr val="accent5">
+                <a:lumMod val="75000"/>
+              </a:schemeClr>
+            </a:solidFill>
+            <a:headEnd type="triangle"/>
             <a:tailEnd type="triangle"/>
           </a:ln>
         </p:spPr>
@@ -3781,77 +4238,37 @@
           </a:fontRef>
         </p:style>
       </p:cxnSp>
-      <p:sp>
-        <p:nvSpPr>
-          <p:cNvPr id="8" name="TextBox 7">
-            <a:extLst>
-              <a:ext uri="{FF2B5EF4-FFF2-40B4-BE49-F238E27FC236}">
-                <a16:creationId xmlns:a16="http://schemas.microsoft.com/office/drawing/2014/main" id="{3985EAE0-58A3-0010-604D-517EE6B14D73}"/>
-              </a:ext>
-            </a:extLst>
-          </p:cNvPr>
-          <p:cNvSpPr txBox="1"/>
-          <p:nvPr>
-            <p:custDataLst>
-              <p:tags r:id="rId3"/>
-            </p:custDataLst>
-          </p:nvPr>
-        </p:nvSpPr>
-        <p:spPr>
-          <a:xfrm>
-            <a:off x="1122105" y="3102658"/>
-            <a:ext cx="1186863" cy="369332"/>
-          </a:xfrm>
-          <a:prstGeom prst="rect">
-            <a:avLst/>
-          </a:prstGeom>
-          <a:solidFill>
-            <a:schemeClr val="accent5">
-              <a:lumMod val="40000"/>
-              <a:lumOff val="60000"/>
-            </a:schemeClr>
-          </a:solidFill>
-        </p:spPr>
-        <p:txBody>
-          <a:bodyPr wrap="none" rtlCol="0">
-            <a:spAutoFit/>
-          </a:bodyPr>
-          <a:lstStyle/>
-          <a:p>
-            <a:r>
-              <a:rPr lang="en-US" altLang="ko-KR" dirty="0" err="1"/>
-              <a:t>DsSystem</a:t>
-            </a:r>
-            <a:endParaRPr lang="ko-KR" altLang="en-US" dirty="0"/>
-          </a:p>
-        </p:txBody>
-      </p:sp>
       <p:cxnSp>
         <p:nvCxnSpPr>
-          <p:cNvPr id="10" name="직선 화살표 연결선 110">
-            <a:extLst>
-              <a:ext uri="{FF2B5EF4-FFF2-40B4-BE49-F238E27FC236}">
-                <a16:creationId xmlns:a16="http://schemas.microsoft.com/office/drawing/2014/main" id="{7DBCD048-93A1-7B1C-C95D-72EC9AC257EE}"/>
+          <p:cNvPr id="18" name="직선 화살표 연결선 17">
+            <a:extLst>
+              <a:ext uri="{FF2B5EF4-FFF2-40B4-BE49-F238E27FC236}">
+                <a16:creationId xmlns:a16="http://schemas.microsoft.com/office/drawing/2014/main" id="{275C95E7-A226-952F-0043-AFB644FB13EB}"/>
               </a:ext>
             </a:extLst>
           </p:cNvPr>
           <p:cNvCxnSpPr>
             <a:cxnSpLocks/>
-            <a:stCxn id="4" idx="2"/>
-            <a:endCxn id="11" idx="0"/>
+            <a:stCxn id="9" idx="1"/>
+            <a:endCxn id="8" idx="3"/>
           </p:cNvCxnSpPr>
           <p:nvPr/>
         </p:nvCxnSpPr>
         <p:spPr>
-          <a:xfrm flipH="1">
-            <a:off x="2965347" y="2662033"/>
-            <a:ext cx="1071548" cy="440625"/>
+          <a:xfrm flipH="1" flipV="1">
+            <a:off x="7838186" y="2806598"/>
+            <a:ext cx="604007" cy="5675"/>
           </a:xfrm>
           <a:prstGeom prst="straightConnector1">
             <a:avLst/>
           </a:prstGeom>
-          <a:ln>
-            <a:headEnd type="none"/>
+          <a:ln w="50800">
+            <a:solidFill>
+              <a:schemeClr val="accent5">
+                <a:lumMod val="75000"/>
+              </a:schemeClr>
+            </a:solidFill>
+            <a:headEnd type="triangle"/>
             <a:tailEnd type="triangle"/>
           </a:ln>
         </p:spPr>
@@ -3872,75 +4289,134 @@
       </p:cxnSp>
       <p:sp>
         <p:nvSpPr>
-          <p:cNvPr id="11" name="TextBox 10">
-            <a:extLst>
-              <a:ext uri="{FF2B5EF4-FFF2-40B4-BE49-F238E27FC236}">
-                <a16:creationId xmlns:a16="http://schemas.microsoft.com/office/drawing/2014/main" id="{FA626F62-87B0-CC0B-D463-CFE2DA8BDC3A}"/>
-              </a:ext>
-            </a:extLst>
-          </p:cNvPr>
-          <p:cNvSpPr txBox="1"/>
-          <p:nvPr>
-            <p:custDataLst>
-              <p:tags r:id="rId4"/>
-            </p:custDataLst>
-          </p:nvPr>
+          <p:cNvPr id="21" name="직사각형 20">
+            <a:extLst>
+              <a:ext uri="{FF2B5EF4-FFF2-40B4-BE49-F238E27FC236}">
+                <a16:creationId xmlns:a16="http://schemas.microsoft.com/office/drawing/2014/main" id="{17495DB8-A79B-790A-26A4-26DCD7D3B03E}"/>
+              </a:ext>
+            </a:extLst>
+          </p:cNvPr>
+          <p:cNvSpPr/>
+          <p:nvPr/>
         </p:nvSpPr>
         <p:spPr>
           <a:xfrm>
-            <a:off x="2501117" y="3102658"/>
-            <a:ext cx="928459" cy="369332"/>
+            <a:off x="9007867" y="4866929"/>
+            <a:ext cx="1641565" cy="1409354"/>
           </a:xfrm>
           <a:prstGeom prst="rect">
             <a:avLst/>
           </a:prstGeom>
-          <a:solidFill>
-            <a:schemeClr val="accent5">
-              <a:lumMod val="40000"/>
-              <a:lumOff val="60000"/>
-            </a:schemeClr>
-          </a:solidFill>
-        </p:spPr>
-        <p:txBody>
-          <a:bodyPr wrap="none" rtlCol="0">
-            <a:spAutoFit/>
-          </a:bodyPr>
-          <a:lstStyle/>
-          <a:p>
-            <a:r>
-              <a:rPr lang="en-US" altLang="ko-KR" dirty="0" err="1"/>
-              <a:t>DsFlow</a:t>
+          <a:ln>
+            <a:prstDash val="dash"/>
+          </a:ln>
+        </p:spPr>
+        <p:style>
+          <a:lnRef idx="2">
+            <a:schemeClr val="dk1"/>
+          </a:lnRef>
+          <a:fillRef idx="1">
+            <a:schemeClr val="lt1"/>
+          </a:fillRef>
+          <a:effectRef idx="0">
+            <a:schemeClr val="dk1"/>
+          </a:effectRef>
+          <a:fontRef idx="minor">
+            <a:schemeClr val="dk1"/>
+          </a:fontRef>
+        </p:style>
+        <p:txBody>
+          <a:bodyPr rtlCol="0" anchor="b"/>
+          <a:lstStyle/>
+          <a:p>
+            <a:pPr algn="ctr"/>
+            <a:r>
+              <a:rPr lang="en-US" altLang="ko-KR" dirty="0"/>
+              <a:t>Ev2.Parser</a:t>
             </a:r>
             <a:endParaRPr lang="ko-KR" altLang="en-US" dirty="0"/>
+          </a:p>
+        </p:txBody>
+      </p:sp>
+      <p:sp>
+        <p:nvSpPr>
+          <p:cNvPr id="22" name="사각형: 둥근 모서리 21">
+            <a:extLst>
+              <a:ext uri="{FF2B5EF4-FFF2-40B4-BE49-F238E27FC236}">
+                <a16:creationId xmlns:a16="http://schemas.microsoft.com/office/drawing/2014/main" id="{BBA54D2A-FFD5-D618-BF0C-D8A26E5EDF25}"/>
+              </a:ext>
+            </a:extLst>
+          </p:cNvPr>
+          <p:cNvSpPr/>
+          <p:nvPr/>
+        </p:nvSpPr>
+        <p:spPr>
+          <a:xfrm>
+            <a:off x="9292334" y="5264940"/>
+            <a:ext cx="1083576" cy="395682"/>
+          </a:xfrm>
+          <a:prstGeom prst="roundRect">
+            <a:avLst/>
+          </a:prstGeom>
+        </p:spPr>
+        <p:style>
+          <a:lnRef idx="1">
+            <a:schemeClr val="accent5"/>
+          </a:lnRef>
+          <a:fillRef idx="2">
+            <a:schemeClr val="accent5"/>
+          </a:fillRef>
+          <a:effectRef idx="1">
+            <a:schemeClr val="accent5"/>
+          </a:effectRef>
+          <a:fontRef idx="minor">
+            <a:schemeClr val="dk1"/>
+          </a:fontRef>
+        </p:style>
+        <p:txBody>
+          <a:bodyPr rtlCol="0" anchor="ctr"/>
+          <a:lstStyle/>
+          <a:p>
+            <a:pPr algn="ctr"/>
+            <a:r>
+              <a:rPr lang="en-US" altLang="ko-KR" sz="1000" b="1" dirty="0"/>
+              <a:t>*.ds</a:t>
+            </a:r>
+            <a:endParaRPr lang="ko-KR" altLang="en-US" sz="700" b="1" dirty="0"/>
           </a:p>
         </p:txBody>
       </p:sp>
       <p:cxnSp>
         <p:nvCxnSpPr>
-          <p:cNvPr id="13" name="직선 화살표 연결선 110">
-            <a:extLst>
-              <a:ext uri="{FF2B5EF4-FFF2-40B4-BE49-F238E27FC236}">
-                <a16:creationId xmlns:a16="http://schemas.microsoft.com/office/drawing/2014/main" id="{9189EF36-223C-12BB-7222-417E5D26C7F5}"/>
+          <p:cNvPr id="23" name="직선 화살표 연결선 22">
+            <a:extLst>
+              <a:ext uri="{FF2B5EF4-FFF2-40B4-BE49-F238E27FC236}">
+                <a16:creationId xmlns:a16="http://schemas.microsoft.com/office/drawing/2014/main" id="{291C38AE-5340-036D-CD0E-7DC70BCC00A5}"/>
               </a:ext>
             </a:extLst>
           </p:cNvPr>
           <p:cNvCxnSpPr>
             <a:cxnSpLocks/>
-            <a:stCxn id="16" idx="2"/>
-            <a:endCxn id="14" idx="0"/>
+            <a:stCxn id="8" idx="2"/>
+            <a:endCxn id="22" idx="0"/>
           </p:cNvCxnSpPr>
           <p:nvPr/>
         </p:nvCxnSpPr>
         <p:spPr>
-          <a:xfrm flipH="1">
-            <a:off x="4206815" y="3471990"/>
-            <a:ext cx="841704" cy="1042638"/>
+          <a:xfrm>
+            <a:off x="7412445" y="3272187"/>
+            <a:ext cx="2421677" cy="1992753"/>
           </a:xfrm>
           <a:prstGeom prst="straightConnector1">
             <a:avLst/>
           </a:prstGeom>
-          <a:ln>
-            <a:headEnd type="none"/>
+          <a:ln w="76200">
+            <a:solidFill>
+              <a:schemeClr val="accent5">
+                <a:lumMod val="75000"/>
+              </a:schemeClr>
+            </a:solidFill>
+            <a:headEnd type="triangle"/>
             <a:tailEnd type="triangle"/>
           </a:ln>
         </p:spPr>
@@ -3961,75 +4437,89 @@
       </p:cxnSp>
       <p:sp>
         <p:nvSpPr>
-          <p:cNvPr id="14" name="TextBox 13">
-            <a:extLst>
-              <a:ext uri="{FF2B5EF4-FFF2-40B4-BE49-F238E27FC236}">
-                <a16:creationId xmlns:a16="http://schemas.microsoft.com/office/drawing/2014/main" id="{6A93C037-5D2C-D5B7-5DAD-3B169F77C89C}"/>
-              </a:ext>
-            </a:extLst>
-          </p:cNvPr>
-          <p:cNvSpPr txBox="1"/>
-          <p:nvPr>
-            <p:custDataLst>
-              <p:tags r:id="rId5"/>
-            </p:custDataLst>
-          </p:nvPr>
+          <p:cNvPr id="27" name="사각형: 둥근 모서리 26">
+            <a:extLst>
+              <a:ext uri="{FF2B5EF4-FFF2-40B4-BE49-F238E27FC236}">
+                <a16:creationId xmlns:a16="http://schemas.microsoft.com/office/drawing/2014/main" id="{24BFD229-5CBE-6456-2115-B4333FFCDA67}"/>
+              </a:ext>
+            </a:extLst>
+          </p:cNvPr>
+          <p:cNvSpPr/>
+          <p:nvPr/>
         </p:nvSpPr>
         <p:spPr>
           <a:xfrm>
-            <a:off x="3707094" y="4514628"/>
-            <a:ext cx="999441" cy="369332"/>
-          </a:xfrm>
-          <a:prstGeom prst="rect">
+            <a:off x="2304011" y="5606898"/>
+            <a:ext cx="796263" cy="395682"/>
+          </a:xfrm>
+          <a:prstGeom prst="roundRect">
             <a:avLst/>
           </a:prstGeom>
-          <a:solidFill>
-            <a:schemeClr val="accent5">
-              <a:lumMod val="40000"/>
-              <a:lumOff val="60000"/>
-            </a:schemeClr>
-          </a:solidFill>
-        </p:spPr>
-        <p:txBody>
-          <a:bodyPr wrap="none" rtlCol="0">
-            <a:spAutoFit/>
-          </a:bodyPr>
-          <a:lstStyle/>
-          <a:p>
-            <a:r>
-              <a:rPr lang="en-US" altLang="ko-KR" dirty="0" err="1"/>
-              <a:t>DsWork</a:t>
-            </a:r>
-            <a:endParaRPr lang="ko-KR" altLang="en-US" dirty="0"/>
+        </p:spPr>
+        <p:style>
+          <a:lnRef idx="1">
+            <a:schemeClr val="accent5"/>
+          </a:lnRef>
+          <a:fillRef idx="2">
+            <a:schemeClr val="accent5"/>
+          </a:fillRef>
+          <a:effectRef idx="1">
+            <a:schemeClr val="accent5"/>
+          </a:effectRef>
+          <a:fontRef idx="minor">
+            <a:schemeClr val="dk1"/>
+          </a:fontRef>
+        </p:style>
+        <p:txBody>
+          <a:bodyPr rtlCol="0" anchor="ctr"/>
+          <a:lstStyle/>
+          <a:p>
+            <a:pPr algn="ctr"/>
+            <a:r>
+              <a:rPr lang="en-US" altLang="ko-KR" sz="1000" b="1" dirty="0"/>
+              <a:t>AAS</a:t>
+            </a:r>
+          </a:p>
+          <a:p>
+            <a:pPr algn="ctr"/>
+            <a:r>
+              <a:rPr lang="en-US" altLang="ko-KR" sz="1000" b="1" dirty="0"/>
+              <a:t>XML</a:t>
+            </a:r>
           </a:p>
         </p:txBody>
       </p:sp>
       <p:cxnSp>
         <p:nvCxnSpPr>
-          <p:cNvPr id="15" name="직선 화살표 연결선 110">
-            <a:extLst>
-              <a:ext uri="{FF2B5EF4-FFF2-40B4-BE49-F238E27FC236}">
-                <a16:creationId xmlns:a16="http://schemas.microsoft.com/office/drawing/2014/main" id="{0654FBAE-329D-2DA3-D08A-A59CB95B5FA7}"/>
+          <p:cNvPr id="28" name="직선 화살표 연결선 27">
+            <a:extLst>
+              <a:ext uri="{FF2B5EF4-FFF2-40B4-BE49-F238E27FC236}">
+                <a16:creationId xmlns:a16="http://schemas.microsoft.com/office/drawing/2014/main" id="{93236243-D532-425E-8098-BF413871A501}"/>
               </a:ext>
             </a:extLst>
           </p:cNvPr>
           <p:cNvCxnSpPr>
             <a:cxnSpLocks/>
-            <a:stCxn id="4" idx="2"/>
-            <a:endCxn id="16" idx="0"/>
+            <a:stCxn id="13" idx="1"/>
+            <a:endCxn id="27" idx="3"/>
           </p:cNvCxnSpPr>
           <p:nvPr/>
         </p:nvCxnSpPr>
         <p:spPr>
-          <a:xfrm>
-            <a:off x="4036895" y="2662033"/>
-            <a:ext cx="1011624" cy="440625"/>
+          <a:xfrm flipH="1">
+            <a:off x="3100274" y="5804739"/>
+            <a:ext cx="628456" cy="0"/>
           </a:xfrm>
           <a:prstGeom prst="straightConnector1">
             <a:avLst/>
           </a:prstGeom>
-          <a:ln>
-            <a:headEnd type="none"/>
+          <a:ln w="50800">
+            <a:solidFill>
+              <a:schemeClr val="accent5">
+                <a:lumMod val="75000"/>
+              </a:schemeClr>
+            </a:solidFill>
+            <a:headEnd type="triangle"/>
             <a:tailEnd type="triangle"/>
           </a:ln>
         </p:spPr>
@@ -4050,24 +4540,955 @@
       </p:cxnSp>
       <p:sp>
         <p:nvSpPr>
-          <p:cNvPr id="16" name="TextBox 15">
-            <a:extLst>
-              <a:ext uri="{FF2B5EF4-FFF2-40B4-BE49-F238E27FC236}">
-                <a16:creationId xmlns:a16="http://schemas.microsoft.com/office/drawing/2014/main" id="{6619801A-8E88-F4C8-E7F2-984C64398985}"/>
+          <p:cNvPr id="32" name="TextBox 31">
+            <a:extLst>
+              <a:ext uri="{FF2B5EF4-FFF2-40B4-BE49-F238E27FC236}">
+                <a16:creationId xmlns:a16="http://schemas.microsoft.com/office/drawing/2014/main" id="{B7FD237A-22EC-5B42-EA8B-A7119A4B314A}"/>
               </a:ext>
             </a:extLst>
           </p:cNvPr>
           <p:cNvSpPr txBox="1"/>
+          <p:nvPr/>
+        </p:nvSpPr>
+        <p:spPr>
+          <a:xfrm>
+            <a:off x="9326826" y="1756385"/>
+            <a:ext cx="2163866" cy="1892826"/>
+          </a:xfrm>
+          <a:prstGeom prst="rect">
+            <a:avLst/>
+          </a:prstGeom>
+          <a:noFill/>
+        </p:spPr>
+        <p:txBody>
+          <a:bodyPr wrap="square">
+            <a:spAutoFit/>
+          </a:bodyPr>
+          <a:lstStyle/>
+          <a:p>
+            <a:r>
+              <a:rPr lang="ko-KR" altLang="en-US" sz="900" dirty="0"/>
+              <a:t>          "Case": "Work",</a:t>
+            </a:r>
+          </a:p>
+          <a:p>
+            <a:r>
+              <a:rPr lang="ko-KR" altLang="en-US" sz="900" dirty="0"/>
+              <a:t>          "Fields": [</a:t>
+            </a:r>
+          </a:p>
+          <a:p>
+            <a:r>
+              <a:rPr lang="ko-KR" altLang="en-US" sz="900" dirty="0"/>
+              <a:t>            {</a:t>
+            </a:r>
+          </a:p>
+          <a:p>
+            <a:r>
+              <a:rPr lang="ko-KR" altLang="en-US" sz="900" dirty="0"/>
+              <a:t>              "Name": "F1W1",</a:t>
+            </a:r>
+          </a:p>
+          <a:p>
+            <a:r>
+              <a:rPr lang="ko-KR" altLang="en-US" sz="900" dirty="0"/>
+              <a:t>              "Vertices": [</a:t>
+            </a:r>
+          </a:p>
+          <a:p>
+            <a:r>
+              <a:rPr lang="ko-KR" altLang="en-US" sz="900" dirty="0"/>
+              <a:t>                {</a:t>
+            </a:r>
+          </a:p>
+          <a:p>
+            <a:r>
+              <a:rPr lang="ko-KR" altLang="en-US" sz="900" dirty="0"/>
+              <a:t>                  "Case": "Action",</a:t>
+            </a:r>
+          </a:p>
+          <a:p>
+            <a:r>
+              <a:rPr lang="ko-KR" altLang="en-US" sz="900" dirty="0"/>
+              <a:t>                  "Fields": [</a:t>
+            </a:r>
+          </a:p>
+          <a:p>
+            <a:r>
+              <a:rPr lang="ko-KR" altLang="en-US" sz="900" dirty="0"/>
+              <a:t>                    {</a:t>
+            </a:r>
+          </a:p>
+          <a:p>
+            <a:r>
+              <a:rPr lang="ko-KR" altLang="en-US" sz="900" dirty="0"/>
+              <a:t>                      "Name": "F1W1C1",</a:t>
+            </a:r>
+          </a:p>
+          <a:p>
+            <a:r>
+              <a:rPr lang="ko-KR" altLang="en-US" sz="900" dirty="0"/>
+              <a:t>                      "IsDisabled": false,</a:t>
+            </a:r>
+          </a:p>
+          <a:p>
+            <a:r>
+              <a:rPr lang="ko-KR" altLang="en-US" sz="900" dirty="0"/>
+              <a:t>                      "IsPush": false</a:t>
+            </a:r>
+          </a:p>
+          <a:p>
+            <a:r>
+              <a:rPr lang="ko-KR" altLang="en-US" sz="900" dirty="0"/>
+              <a:t>                    }</a:t>
+            </a:r>
+          </a:p>
+        </p:txBody>
+      </p:sp>
+      <p:sp>
+        <p:nvSpPr>
+          <p:cNvPr id="35" name="TextBox 34">
+            <a:extLst>
+              <a:ext uri="{FF2B5EF4-FFF2-40B4-BE49-F238E27FC236}">
+                <a16:creationId xmlns:a16="http://schemas.microsoft.com/office/drawing/2014/main" id="{45ACAE35-8425-095B-804B-CB14BECADB37}"/>
+              </a:ext>
+            </a:extLst>
+          </p:cNvPr>
+          <p:cNvSpPr txBox="1"/>
+          <p:nvPr/>
+        </p:nvSpPr>
+        <p:spPr>
+          <a:xfrm>
+            <a:off x="3917842" y="1478124"/>
+            <a:ext cx="2944868" cy="4401205"/>
+          </a:xfrm>
+          <a:prstGeom prst="rect">
+            <a:avLst/>
+          </a:prstGeom>
+          <a:noFill/>
+        </p:spPr>
+        <p:txBody>
+          <a:bodyPr wrap="square">
+            <a:spAutoFit/>
+          </a:bodyPr>
+          <a:lstStyle/>
+          <a:p>
+            <a:r>
+              <a:rPr lang="en-US" altLang="ko-KR" sz="800" dirty="0"/>
+              <a:t>"modelType": "SubmodelElementCollection",</a:t>
+            </a:r>
+          </a:p>
+          <a:p>
+            <a:r>
+              <a:rPr lang="en-US" altLang="ko-KR" sz="800" dirty="0"/>
+              <a:t>"idShort": "Work",</a:t>
+            </a:r>
+          </a:p>
+          <a:p>
+            <a:r>
+              <a:rPr lang="en-US" altLang="ko-KR" sz="800" dirty="0"/>
+              <a:t>"value": [</a:t>
+            </a:r>
+          </a:p>
+          <a:p>
+            <a:r>
+              <a:rPr lang="en-US" altLang="ko-KR" sz="800" dirty="0"/>
+              <a:t>  {</a:t>
+            </a:r>
+          </a:p>
+          <a:p>
+            <a:r>
+              <a:rPr lang="en-US" altLang="ko-KR" sz="800" dirty="0"/>
+              <a:t>    "modelType": "Property",</a:t>
+            </a:r>
+          </a:p>
+          <a:p>
+            <a:r>
+              <a:rPr lang="en-US" altLang="ko-KR" sz="800" dirty="0"/>
+              <a:t>    "idShort": "Name",</a:t>
+            </a:r>
+          </a:p>
+          <a:p>
+            <a:r>
+              <a:rPr lang="en-US" altLang="ko-KR" sz="800" dirty="0"/>
+              <a:t>    "valueType": "xs:string",</a:t>
+            </a:r>
+          </a:p>
+          <a:p>
+            <a:r>
+              <a:rPr lang="en-US" altLang="ko-KR" sz="800" dirty="0"/>
+              <a:t>    "value": "F1W1"</a:t>
+            </a:r>
+          </a:p>
+          <a:p>
+            <a:r>
+              <a:rPr lang="en-US" altLang="ko-KR" sz="800" dirty="0"/>
+              <a:t>  },</a:t>
+            </a:r>
+          </a:p>
+          <a:p>
+            <a:r>
+              <a:rPr lang="en-US" altLang="ko-KR" sz="800" dirty="0"/>
+              <a:t>  {</a:t>
+            </a:r>
+          </a:p>
+          <a:p>
+            <a:r>
+              <a:rPr lang="en-US" altLang="ko-KR" sz="800" dirty="0"/>
+              <a:t>    "modelType": "SubmodelElementCollection",</a:t>
+            </a:r>
+          </a:p>
+          <a:p>
+            <a:r>
+              <a:rPr lang="en-US" altLang="ko-KR" sz="800" dirty="0"/>
+              <a:t>    "idShort": "Graph",</a:t>
+            </a:r>
+          </a:p>
+          <a:p>
+            <a:r>
+              <a:rPr lang="en-US" altLang="ko-KR" sz="800" dirty="0"/>
+              <a:t>    "value": [</a:t>
+            </a:r>
+          </a:p>
+          <a:p>
+            <a:r>
+              <a:rPr lang="en-US" altLang="ko-KR" sz="800" dirty="0"/>
+              <a:t>      {</a:t>
+            </a:r>
+          </a:p>
+          <a:p>
+            <a:r>
+              <a:rPr lang="en-US" altLang="ko-KR" sz="800" dirty="0"/>
+              <a:t>        "modelType": "SubmodelElementCollection",</a:t>
+            </a:r>
+          </a:p>
+          <a:p>
+            <a:r>
+              <a:rPr lang="en-US" altLang="ko-KR" sz="800" dirty="0"/>
+              <a:t>        "idShort": "Vertices",</a:t>
+            </a:r>
+          </a:p>
+          <a:p>
+            <a:r>
+              <a:rPr lang="en-US" altLang="ko-KR" sz="800" dirty="0"/>
+              <a:t>        "value": [</a:t>
+            </a:r>
+          </a:p>
+          <a:p>
+            <a:r>
+              <a:rPr lang="en-US" altLang="ko-KR" sz="800" dirty="0"/>
+              <a:t>          {</a:t>
+            </a:r>
+          </a:p>
+          <a:p>
+            <a:r>
+              <a:rPr lang="en-US" altLang="ko-KR" sz="800" dirty="0"/>
+              <a:t>            "modelType": "SubmodelElementCollection",</a:t>
+            </a:r>
+          </a:p>
+          <a:p>
+            <a:r>
+              <a:rPr lang="en-US" altLang="ko-KR" sz="800" dirty="0"/>
+              <a:t>            "idShort": "Action",</a:t>
+            </a:r>
+          </a:p>
+          <a:p>
+            <a:r>
+              <a:rPr lang="en-US" altLang="ko-KR" sz="800" dirty="0"/>
+              <a:t>            "value": [</a:t>
+            </a:r>
+          </a:p>
+          <a:p>
+            <a:r>
+              <a:rPr lang="en-US" altLang="ko-KR" sz="800" dirty="0"/>
+              <a:t>              {</a:t>
+            </a:r>
+          </a:p>
+          <a:p>
+            <a:r>
+              <a:rPr lang="en-US" altLang="ko-KR" sz="800" dirty="0"/>
+              <a:t>                "modelType": "Property",</a:t>
+            </a:r>
+          </a:p>
+          <a:p>
+            <a:r>
+              <a:rPr lang="en-US" altLang="ko-KR" sz="800" dirty="0"/>
+              <a:t>                "idShort": "Name",</a:t>
+            </a:r>
+          </a:p>
+          <a:p>
+            <a:r>
+              <a:rPr lang="en-US" altLang="ko-KR" sz="800" dirty="0"/>
+              <a:t>                "valueType": "xs:string",</a:t>
+            </a:r>
+          </a:p>
+          <a:p>
+            <a:r>
+              <a:rPr lang="en-US" altLang="ko-KR" sz="800" dirty="0"/>
+              <a:t>                "value": "F1W1C1"</a:t>
+            </a:r>
+          </a:p>
+          <a:p>
+            <a:r>
+              <a:rPr lang="en-US" altLang="ko-KR" sz="800" dirty="0"/>
+              <a:t>              },</a:t>
+            </a:r>
+          </a:p>
+          <a:p>
+            <a:r>
+              <a:rPr lang="en-US" altLang="ko-KR" sz="800" dirty="0"/>
+              <a:t>              {</a:t>
+            </a:r>
+          </a:p>
+          <a:p>
+            <a:r>
+              <a:rPr lang="en-US" altLang="ko-KR" sz="800" dirty="0"/>
+              <a:t>                "modelType": "Property",</a:t>
+            </a:r>
+          </a:p>
+          <a:p>
+            <a:r>
+              <a:rPr lang="en-US" altLang="ko-KR" sz="800" dirty="0"/>
+              <a:t>                "idShort": "IsDisable",</a:t>
+            </a:r>
+          </a:p>
+          <a:p>
+            <a:r>
+              <a:rPr lang="en-US" altLang="ko-KR" sz="800" dirty="0"/>
+              <a:t>                "valueType": "xs:boolean",</a:t>
+            </a:r>
+          </a:p>
+          <a:p>
+            <a:r>
+              <a:rPr lang="en-US" altLang="ko-KR" sz="800" dirty="0"/>
+              <a:t>                "value": "False"</a:t>
+            </a:r>
+          </a:p>
+          <a:p>
+            <a:r>
+              <a:rPr lang="en-US" altLang="ko-KR" sz="800" dirty="0"/>
+              <a:t>              }</a:t>
+            </a:r>
+          </a:p>
+          <a:p>
+            <a:r>
+              <a:rPr lang="en-US" altLang="ko-KR" sz="800" dirty="0"/>
+              <a:t>            ]</a:t>
+            </a:r>
+          </a:p>
+          <a:p>
+            <a:r>
+              <a:rPr lang="en-US" altLang="ko-KR" sz="800" dirty="0"/>
+              <a:t>          }</a:t>
+            </a:r>
+            <a:endParaRPr lang="ko-KR" altLang="en-US" sz="800" dirty="0"/>
+          </a:p>
+        </p:txBody>
+      </p:sp>
+      <p:sp>
+        <p:nvSpPr>
+          <p:cNvPr id="47" name="TextBox 46">
+            <a:extLst>
+              <a:ext uri="{FF2B5EF4-FFF2-40B4-BE49-F238E27FC236}">
+                <a16:creationId xmlns:a16="http://schemas.microsoft.com/office/drawing/2014/main" id="{26F9978F-C8BA-D9AB-4099-9CC2FADFE09B}"/>
+              </a:ext>
+            </a:extLst>
+          </p:cNvPr>
+          <p:cNvSpPr txBox="1"/>
+          <p:nvPr/>
+        </p:nvSpPr>
+        <p:spPr>
+          <a:xfrm>
+            <a:off x="368651" y="1524430"/>
+            <a:ext cx="2731623" cy="3662541"/>
+          </a:xfrm>
+          <a:prstGeom prst="rect">
+            <a:avLst/>
+          </a:prstGeom>
+          <a:noFill/>
+        </p:spPr>
+        <p:txBody>
+          <a:bodyPr wrap="square">
+            <a:spAutoFit/>
+          </a:bodyPr>
+          <a:lstStyle/>
+          <a:p>
+            <a:r>
+              <a:rPr lang="en-US" altLang="ko-KR" sz="800" dirty="0"/>
+              <a:t>&lt;submodelElementCollection&gt;</a:t>
+            </a:r>
+          </a:p>
+          <a:p>
+            <a:r>
+              <a:rPr lang="en-US" altLang="ko-KR" sz="800" dirty="0"/>
+              <a:t>    &lt;idShort&gt;Work&lt;/idShort&gt;</a:t>
+            </a:r>
+          </a:p>
+          <a:p>
+            <a:r>
+              <a:rPr lang="en-US" altLang="ko-KR" sz="800" dirty="0"/>
+              <a:t>    &lt;value&gt;</a:t>
+            </a:r>
+          </a:p>
+          <a:p>
+            <a:r>
+              <a:rPr lang="en-US" altLang="ko-KR" sz="800" dirty="0"/>
+              <a:t>    &lt;property&gt;</a:t>
+            </a:r>
+          </a:p>
+          <a:p>
+            <a:r>
+              <a:rPr lang="en-US" altLang="ko-KR" sz="800" dirty="0"/>
+              <a:t>        &lt;idShort&gt;Name&lt;/idShort&gt;</a:t>
+            </a:r>
+          </a:p>
+          <a:p>
+            <a:r>
+              <a:rPr lang="en-US" altLang="ko-KR" sz="800" dirty="0"/>
+              <a:t>        &lt;valueType&gt;xs:string&lt;/valueType&gt;</a:t>
+            </a:r>
+          </a:p>
+          <a:p>
+            <a:r>
+              <a:rPr lang="en-US" altLang="ko-KR" sz="800" dirty="0"/>
+              <a:t>        &lt;value&gt;F1W1&lt;/value&gt;</a:t>
+            </a:r>
+          </a:p>
+          <a:p>
+            <a:r>
+              <a:rPr lang="en-US" altLang="ko-KR" sz="800" dirty="0"/>
+              <a:t>    &lt;/property&gt;</a:t>
+            </a:r>
+          </a:p>
+          <a:p>
+            <a:r>
+              <a:rPr lang="en-US" altLang="ko-KR" sz="800" dirty="0"/>
+              <a:t>    &lt;submodelElementCollection&gt;</a:t>
+            </a:r>
+          </a:p>
+          <a:p>
+            <a:r>
+              <a:rPr lang="en-US" altLang="ko-KR" sz="800" dirty="0"/>
+              <a:t>        &lt;idShort&gt;Graph&lt;/idShort&gt;</a:t>
+            </a:r>
+          </a:p>
+          <a:p>
+            <a:r>
+              <a:rPr lang="en-US" altLang="ko-KR" sz="800" dirty="0"/>
+              <a:t>        &lt;value&gt;</a:t>
+            </a:r>
+          </a:p>
+          <a:p>
+            <a:r>
+              <a:rPr lang="en-US" altLang="ko-KR" sz="800" dirty="0"/>
+              <a:t>        &lt;submodelElementCollection&gt;</a:t>
+            </a:r>
+          </a:p>
+          <a:p>
+            <a:r>
+              <a:rPr lang="en-US" altLang="ko-KR" sz="800" dirty="0"/>
+              <a:t>            &lt;idShort&gt;Vertices&lt;/idShort&gt;</a:t>
+            </a:r>
+          </a:p>
+          <a:p>
+            <a:r>
+              <a:rPr lang="en-US" altLang="ko-KR" sz="800" dirty="0"/>
+              <a:t>            &lt;value&gt;</a:t>
+            </a:r>
+          </a:p>
+          <a:p>
+            <a:r>
+              <a:rPr lang="en-US" altLang="ko-KR" sz="800" dirty="0"/>
+              <a:t>            &lt;submodelElementCollection&gt;</a:t>
+            </a:r>
+          </a:p>
+          <a:p>
+            <a:r>
+              <a:rPr lang="en-US" altLang="ko-KR" sz="800" dirty="0"/>
+              <a:t>                &lt;idShort&gt;Action&lt;/idShort&gt;</a:t>
+            </a:r>
+          </a:p>
+          <a:p>
+            <a:r>
+              <a:rPr lang="en-US" altLang="ko-KR" sz="800" dirty="0"/>
+              <a:t>                &lt;value&gt;</a:t>
+            </a:r>
+          </a:p>
+          <a:p>
+            <a:r>
+              <a:rPr lang="en-US" altLang="ko-KR" sz="800" dirty="0"/>
+              <a:t>                &lt;property&gt;</a:t>
+            </a:r>
+          </a:p>
+          <a:p>
+            <a:r>
+              <a:rPr lang="en-US" altLang="ko-KR" sz="800" dirty="0"/>
+              <a:t>                    &lt;idShort&gt;Name&lt;/idShort&gt;</a:t>
+            </a:r>
+          </a:p>
+          <a:p>
+            <a:r>
+              <a:rPr lang="en-US" altLang="ko-KR" sz="800" dirty="0"/>
+              <a:t>                    &lt;valueType&gt;xs:string&lt;/valueType&gt;</a:t>
+            </a:r>
+          </a:p>
+          <a:p>
+            <a:r>
+              <a:rPr lang="en-US" altLang="ko-KR" sz="800" dirty="0"/>
+              <a:t>                    &lt;value&gt;F1W1C1&lt;/value&gt;</a:t>
+            </a:r>
+          </a:p>
+          <a:p>
+            <a:r>
+              <a:rPr lang="en-US" altLang="ko-KR" sz="800" dirty="0"/>
+              <a:t>                &lt;/property&gt;</a:t>
+            </a:r>
+          </a:p>
+          <a:p>
+            <a:r>
+              <a:rPr lang="en-US" altLang="ko-KR" sz="800" dirty="0"/>
+              <a:t>                &lt;property&gt;</a:t>
+            </a:r>
+          </a:p>
+          <a:p>
+            <a:r>
+              <a:rPr lang="en-US" altLang="ko-KR" sz="800" dirty="0"/>
+              <a:t>                    &lt;idShort&gt;IsDisable&lt;/idShort&gt;</a:t>
+            </a:r>
+          </a:p>
+          <a:p>
+            <a:r>
+              <a:rPr lang="en-US" altLang="ko-KR" sz="800" dirty="0"/>
+              <a:t>                    &lt;valueType&gt;xs:boolean&lt;/valueType&gt;</a:t>
+            </a:r>
+          </a:p>
+          <a:p>
+            <a:r>
+              <a:rPr lang="en-US" altLang="ko-KR" sz="800" dirty="0"/>
+              <a:t>                    &lt;value&gt;False&lt;/value&gt;</a:t>
+            </a:r>
+          </a:p>
+          <a:p>
+            <a:r>
+              <a:rPr lang="en-US" altLang="ko-KR" sz="800" dirty="0"/>
+              <a:t>                &lt;/property&gt;</a:t>
+            </a:r>
+          </a:p>
+          <a:p>
+            <a:r>
+              <a:rPr lang="en-US" altLang="ko-KR" sz="800" dirty="0"/>
+              <a:t>                &lt;/value&gt;</a:t>
+            </a:r>
+          </a:p>
+          <a:p>
+            <a:r>
+              <a:rPr lang="en-US" altLang="ko-KR" sz="800" dirty="0"/>
+              <a:t>            &lt;/submodelElementCollection&gt;</a:t>
+            </a:r>
+          </a:p>
+        </p:txBody>
+      </p:sp>
+    </p:spTree>
+    <p:extLst>
+      <p:ext uri="{BB962C8B-B14F-4D97-AF65-F5344CB8AC3E}">
+        <p14:creationId xmlns:p14="http://schemas.microsoft.com/office/powerpoint/2010/main" val="3689005085"/>
+      </p:ext>
+    </p:extLst>
+  </p:cSld>
+  <p:clrMapOvr>
+    <a:masterClrMapping/>
+  </p:clrMapOvr>
+</p:sld>
+</file>
+
+<file path=ppt/slides/slide4.xml><?xml version="1.0" encoding="utf-8"?>
+<p:sld xmlns:a="http://schemas.openxmlformats.org/drawingml/2006/main" xmlns:r="http://schemas.openxmlformats.org/officeDocument/2006/relationships" xmlns:p="http://schemas.openxmlformats.org/presentationml/2006/main">
+  <p:cSld>
+    <p:spTree>
+      <p:nvGrpSpPr>
+        <p:cNvPr id="1" name=""/>
+        <p:cNvGrpSpPr/>
+        <p:nvPr/>
+      </p:nvGrpSpPr>
+      <p:grpSpPr>
+        <a:xfrm>
+          <a:off x="0" y="0"/>
+          <a:ext cx="0" cy="0"/>
+          <a:chOff x="0" y="0"/>
+          <a:chExt cx="0" cy="0"/>
+        </a:xfrm>
+      </p:grpSpPr>
+      <p:sp>
+        <p:nvSpPr>
+          <p:cNvPr id="2" name="제목 1">
+            <a:extLst>
+              <a:ext uri="{FF2B5EF4-FFF2-40B4-BE49-F238E27FC236}">
+                <a16:creationId xmlns:a16="http://schemas.microsoft.com/office/drawing/2014/main" id="{17D9A494-574C-30A5-5B25-76C882771572}"/>
+              </a:ext>
+            </a:extLst>
+          </p:cNvPr>
+          <p:cNvSpPr>
+            <a:spLocks noGrp="1"/>
+          </p:cNvSpPr>
+          <p:nvPr>
+            <p:ph type="title"/>
+          </p:nvPr>
+        </p:nvSpPr>
+        <p:spPr/>
+        <p:txBody>
+          <a:bodyPr/>
+          <a:lstStyle/>
+          <a:p>
+            <a:r>
+              <a:rPr lang="en-US" altLang="ko-KR" dirty="0"/>
+              <a:t>Json serialize </a:t>
+            </a:r>
+            <a:r>
+              <a:rPr lang="ko-KR" altLang="en-US" dirty="0"/>
+              <a:t>유의사항</a:t>
+            </a:r>
+          </a:p>
+        </p:txBody>
+      </p:sp>
+      <p:sp>
+        <p:nvSpPr>
+          <p:cNvPr id="3" name="내용 개체 틀 2">
+            <a:extLst>
+              <a:ext uri="{FF2B5EF4-FFF2-40B4-BE49-F238E27FC236}">
+                <a16:creationId xmlns:a16="http://schemas.microsoft.com/office/drawing/2014/main" id="{146754B7-6B9F-85C9-07B3-78FCDB2C14B4}"/>
+              </a:ext>
+            </a:extLst>
+          </p:cNvPr>
+          <p:cNvSpPr>
+            <a:spLocks noGrp="1"/>
+          </p:cNvSpPr>
+          <p:nvPr>
+            <p:ph idx="1"/>
+          </p:nvPr>
+        </p:nvSpPr>
+        <p:spPr/>
+        <p:txBody>
+          <a:bodyPr/>
+          <a:lstStyle/>
+          <a:p>
+            <a:r>
+              <a:rPr lang="en-US" altLang="ko-KR" dirty="0"/>
+              <a:t>OO </a:t>
+            </a:r>
+            <a:r>
+              <a:rPr lang="ko-KR" altLang="en-US" dirty="0"/>
+              <a:t>의 </a:t>
+            </a:r>
+            <a:r>
+              <a:rPr lang="en-US" altLang="ko-KR" dirty="0"/>
+              <a:t>Polymorphism </a:t>
+            </a:r>
+            <a:r>
+              <a:rPr lang="ko-KR" altLang="en-US" dirty="0"/>
+              <a:t>지원 어려움 </a:t>
+            </a:r>
+            <a:r>
+              <a:rPr lang="en-US" altLang="ko-KR" dirty="0"/>
+              <a:t>(Type name full </a:t>
+            </a:r>
+            <a:r>
+              <a:rPr lang="ko-KR" altLang="en-US" dirty="0"/>
+              <a:t>로 적을 경우 유지 보수 문제</a:t>
+            </a:r>
+            <a:r>
+              <a:rPr lang="en-US" altLang="ko-KR" dirty="0"/>
+              <a:t>)</a:t>
+            </a:r>
+          </a:p>
+          <a:p>
+            <a:pPr marL="457200" lvl="1" indent="0">
+              <a:buNone/>
+            </a:pPr>
+            <a:r>
+              <a:rPr lang="en-US" altLang="ko-KR" dirty="0">
+                <a:sym typeface="Wingdings" panose="05000000000000000000" pitchFamily="2" charset="2"/>
+              </a:rPr>
+              <a:t> </a:t>
+            </a:r>
+            <a:r>
+              <a:rPr lang="en-US" altLang="ko-KR" dirty="0"/>
+              <a:t>Discriminated Union</a:t>
+            </a:r>
+            <a:endParaRPr lang="ko-KR" altLang="en-US" dirty="0"/>
+          </a:p>
+        </p:txBody>
+      </p:sp>
+    </p:spTree>
+    <p:extLst>
+      <p:ext uri="{BB962C8B-B14F-4D97-AF65-F5344CB8AC3E}">
+        <p14:creationId xmlns:p14="http://schemas.microsoft.com/office/powerpoint/2010/main" val="706024561"/>
+      </p:ext>
+    </p:extLst>
+  </p:cSld>
+  <p:clrMapOvr>
+    <a:masterClrMapping/>
+  </p:clrMapOvr>
+</p:sld>
+</file>
+
+<file path=ppt/slides/slide5.xml><?xml version="1.0" encoding="utf-8"?>
+<p:sld xmlns:a="http://schemas.openxmlformats.org/drawingml/2006/main" xmlns:r="http://schemas.openxmlformats.org/officeDocument/2006/relationships" xmlns:p="http://schemas.openxmlformats.org/presentationml/2006/main">
+  <p:cSld>
+    <p:spTree>
+      <p:nvGrpSpPr>
+        <p:cNvPr id="1" name=""/>
+        <p:cNvGrpSpPr/>
+        <p:nvPr/>
+      </p:nvGrpSpPr>
+      <p:grpSpPr>
+        <a:xfrm>
+          <a:off x="0" y="0"/>
+          <a:ext cx="0" cy="0"/>
+          <a:chOff x="0" y="0"/>
+          <a:chExt cx="0" cy="0"/>
+        </a:xfrm>
+      </p:grpSpPr>
+      <p:sp>
+        <p:nvSpPr>
+          <p:cNvPr id="2" name="제목 1">
+            <a:extLst>
+              <a:ext uri="{FF2B5EF4-FFF2-40B4-BE49-F238E27FC236}">
+                <a16:creationId xmlns:a16="http://schemas.microsoft.com/office/drawing/2014/main" id="{520FC220-B3A0-85F1-F2EA-98BBFFDCFBEC}"/>
+              </a:ext>
+            </a:extLst>
+          </p:cNvPr>
+          <p:cNvSpPr>
+            <a:spLocks noGrp="1"/>
+          </p:cNvSpPr>
+          <p:nvPr>
+            <p:ph type="title"/>
+          </p:nvPr>
+        </p:nvSpPr>
+        <p:spPr/>
+        <p:txBody>
+          <a:bodyPr/>
+          <a:lstStyle/>
+          <a:p>
+            <a:r>
+              <a:rPr lang="en-US" altLang="ko-KR" dirty="0"/>
+              <a:t>AAS Json vs </a:t>
+            </a:r>
+            <a:r>
+              <a:rPr lang="ko-KR" altLang="en-US" dirty="0"/>
+              <a:t>일반 </a:t>
+            </a:r>
+            <a:r>
+              <a:rPr lang="en-US" altLang="ko-KR" dirty="0"/>
+              <a:t>Json</a:t>
+            </a:r>
+            <a:endParaRPr lang="ko-KR" altLang="en-US" dirty="0"/>
+          </a:p>
+        </p:txBody>
+      </p:sp>
+      <p:sp>
+        <p:nvSpPr>
+          <p:cNvPr id="3" name="내용 개체 틀 2">
+            <a:extLst>
+              <a:ext uri="{FF2B5EF4-FFF2-40B4-BE49-F238E27FC236}">
+                <a16:creationId xmlns:a16="http://schemas.microsoft.com/office/drawing/2014/main" id="{284401A1-1EA0-FCE8-3820-B5A2E9E5B576}"/>
+              </a:ext>
+            </a:extLst>
+          </p:cNvPr>
+          <p:cNvSpPr>
+            <a:spLocks noGrp="1"/>
+          </p:cNvSpPr>
+          <p:nvPr>
+            <p:ph idx="1"/>
+          </p:nvPr>
+        </p:nvSpPr>
+        <p:spPr/>
+        <p:txBody>
+          <a:bodyPr/>
+          <a:lstStyle/>
+          <a:p>
+            <a:r>
+              <a:rPr lang="en-US" altLang="ko-KR" dirty="0"/>
+              <a:t>AAS Json </a:t>
+            </a:r>
+            <a:r>
+              <a:rPr lang="ko-KR" altLang="en-US" dirty="0"/>
+              <a:t>의 경우</a:t>
+            </a:r>
+            <a:r>
+              <a:rPr lang="en-US" altLang="ko-KR" dirty="0"/>
+              <a:t>, property(</a:t>
+            </a:r>
+            <a:r>
+              <a:rPr lang="ko-KR" altLang="en-US" dirty="0"/>
+              <a:t>속성</a:t>
+            </a:r>
+            <a:r>
+              <a:rPr lang="en-US" altLang="ko-KR" dirty="0"/>
+              <a:t>) </a:t>
+            </a:r>
+            <a:r>
+              <a:rPr lang="ko-KR" altLang="en-US" dirty="0"/>
+              <a:t>이름을 지을 수 없다</a:t>
+            </a:r>
+            <a:r>
+              <a:rPr lang="en-US" altLang="ko-KR" dirty="0"/>
+              <a:t>.</a:t>
+            </a:r>
+          </a:p>
+          <a:p>
+            <a:pPr lvl="1"/>
+            <a:r>
+              <a:rPr lang="ko-KR" altLang="en-US" dirty="0"/>
+              <a:t>상대적으로 길고 복잡해 짐</a:t>
+            </a:r>
+            <a:endParaRPr lang="en-US" altLang="ko-KR" dirty="0"/>
+          </a:p>
+          <a:p>
+            <a:r>
+              <a:rPr lang="en-US" altLang="ko-KR" dirty="0"/>
+              <a:t>AAS Json </a:t>
+            </a:r>
+            <a:r>
+              <a:rPr lang="en-US" altLang="ko-KR" dirty="0">
+                <a:sym typeface="Wingdings" panose="05000000000000000000" pitchFamily="2" charset="2"/>
+              </a:rPr>
+              <a:t> AAS</a:t>
+            </a:r>
+            <a:r>
+              <a:rPr lang="ko-KR" altLang="en-US" dirty="0">
+                <a:sym typeface="Wingdings" panose="05000000000000000000" pitchFamily="2" charset="2"/>
+              </a:rPr>
+              <a:t> </a:t>
+            </a:r>
+            <a:r>
+              <a:rPr lang="en-US" altLang="ko-KR" dirty="0">
+                <a:sym typeface="Wingdings" panose="05000000000000000000" pitchFamily="2" charset="2"/>
+              </a:rPr>
+              <a:t>Xml</a:t>
+            </a:r>
+            <a:r>
+              <a:rPr lang="ko-KR" altLang="en-US" dirty="0">
+                <a:sym typeface="Wingdings" panose="05000000000000000000" pitchFamily="2" charset="2"/>
+              </a:rPr>
+              <a:t> 은 비교적 전환이 쉬움</a:t>
+            </a:r>
+            <a:endParaRPr lang="en-US" altLang="ko-KR" dirty="0">
+              <a:sym typeface="Wingdings" panose="05000000000000000000" pitchFamily="2" charset="2"/>
+            </a:endParaRPr>
+          </a:p>
+          <a:p>
+            <a:pPr lvl="1"/>
+            <a:r>
+              <a:rPr lang="en-US" altLang="ko-KR" dirty="0"/>
+              <a:t>AasCore.Aas3_0 </a:t>
+            </a:r>
+            <a:r>
+              <a:rPr lang="ko-KR" altLang="en-US" dirty="0"/>
+              <a:t>이용</a:t>
+            </a:r>
+            <a:endParaRPr lang="en-US" altLang="ko-KR" dirty="0"/>
+          </a:p>
+          <a:p>
+            <a:pPr lvl="2"/>
+            <a:r>
+              <a:rPr lang="ko-KR" altLang="en-US" dirty="0"/>
+              <a:t>내부적으로는 </a:t>
+            </a:r>
+            <a:r>
+              <a:rPr lang="en-US" altLang="ko-KR" dirty="0"/>
+              <a:t>System.Text.Json </a:t>
+            </a:r>
+            <a:r>
+              <a:rPr lang="ko-KR" altLang="en-US" dirty="0"/>
+              <a:t>을 이용</a:t>
+            </a:r>
+            <a:endParaRPr lang="en-US" altLang="ko-KR" dirty="0"/>
+          </a:p>
+          <a:p>
+            <a:pPr lvl="2"/>
+            <a:endParaRPr lang="ko-KR" altLang="en-US" dirty="0"/>
+          </a:p>
+        </p:txBody>
+      </p:sp>
+    </p:spTree>
+    <p:extLst>
+      <p:ext uri="{BB962C8B-B14F-4D97-AF65-F5344CB8AC3E}">
+        <p14:creationId xmlns:p14="http://schemas.microsoft.com/office/powerpoint/2010/main" val="2890065953"/>
+      </p:ext>
+    </p:extLst>
+  </p:cSld>
+  <p:clrMapOvr>
+    <a:masterClrMapping/>
+  </p:clrMapOvr>
+</p:sld>
+</file>
+
+<file path=ppt/slides/slide6.xml><?xml version="1.0" encoding="utf-8"?>
+<p:sld xmlns:a="http://schemas.openxmlformats.org/drawingml/2006/main" xmlns:r="http://schemas.openxmlformats.org/officeDocument/2006/relationships" xmlns:p="http://schemas.openxmlformats.org/presentationml/2006/main">
+  <p:cSld>
+    <p:spTree>
+      <p:nvGrpSpPr>
+        <p:cNvPr id="1" name=""/>
+        <p:cNvGrpSpPr/>
+        <p:nvPr/>
+      </p:nvGrpSpPr>
+      <p:grpSpPr>
+        <a:xfrm>
+          <a:off x="0" y="0"/>
+          <a:ext cx="0" cy="0"/>
+          <a:chOff x="0" y="0"/>
+          <a:chExt cx="0" cy="0"/>
+        </a:xfrm>
+      </p:grpSpPr>
+      <p:sp>
+        <p:nvSpPr>
+          <p:cNvPr id="2" name="Title 1">
+            <a:extLst>
+              <a:ext uri="{FF2B5EF4-FFF2-40B4-BE49-F238E27FC236}">
+                <a16:creationId xmlns:a16="http://schemas.microsoft.com/office/drawing/2014/main" id="{6E5FF25C-1B37-6D7C-B51D-3752923B471C}"/>
+              </a:ext>
+            </a:extLst>
+          </p:cNvPr>
+          <p:cNvSpPr>
+            <a:spLocks noGrp="1"/>
+          </p:cNvSpPr>
+          <p:nvPr>
+            <p:ph type="title"/>
+          </p:nvPr>
+        </p:nvSpPr>
+        <p:spPr/>
+        <p:txBody>
+          <a:bodyPr/>
+          <a:lstStyle/>
+          <a:p>
+            <a:r>
+              <a:rPr lang="en-US" altLang="ko-KR" dirty="0"/>
+              <a:t>Class Hierarchy</a:t>
+            </a:r>
+            <a:endParaRPr lang="ko-KR" altLang="en-US" dirty="0"/>
+          </a:p>
+        </p:txBody>
+      </p:sp>
+      <p:sp>
+        <p:nvSpPr>
+          <p:cNvPr id="4" name="TextBox 3">
+            <a:extLst>
+              <a:ext uri="{FF2B5EF4-FFF2-40B4-BE49-F238E27FC236}">
+                <a16:creationId xmlns:a16="http://schemas.microsoft.com/office/drawing/2014/main" id="{5EC05E0C-4669-18C2-61B3-DAF016E7D8AE}"/>
+              </a:ext>
+            </a:extLst>
+          </p:cNvPr>
+          <p:cNvSpPr txBox="1"/>
           <p:nvPr>
             <p:custDataLst>
-              <p:tags r:id="rId6"/>
+              <p:tags r:id="rId2"/>
             </p:custDataLst>
           </p:nvPr>
         </p:nvSpPr>
         <p:spPr>
           <a:xfrm>
-            <a:off x="4630327" y="3102658"/>
-            <a:ext cx="836383" cy="369332"/>
+            <a:off x="3088558" y="2292701"/>
+            <a:ext cx="1896673" cy="369332"/>
           </a:xfrm>
           <a:prstGeom prst="rect">
             <a:avLst/>
@@ -4087,7 +5508,7 @@
           <a:p>
             <a:r>
               <a:rPr lang="en-US" altLang="ko-KR" dirty="0"/>
-              <a:t>Vertex</a:t>
+              <a:t>DsNamedObject</a:t>
             </a:r>
             <a:endParaRPr lang="ko-KR" altLang="en-US" dirty="0"/>
           </a:p>
@@ -4095,24 +5516,24 @@
       </p:sp>
       <p:cxnSp>
         <p:nvCxnSpPr>
-          <p:cNvPr id="18" name="직선 화살표 연결선 110">
-            <a:extLst>
-              <a:ext uri="{FF2B5EF4-FFF2-40B4-BE49-F238E27FC236}">
-                <a16:creationId xmlns:a16="http://schemas.microsoft.com/office/drawing/2014/main" id="{C576C58D-AF12-55FB-56E9-7B065DF313F1}"/>
+          <p:cNvPr id="5" name="직선 화살표 연결선 110">
+            <a:extLst>
+              <a:ext uri="{FF2B5EF4-FFF2-40B4-BE49-F238E27FC236}">
+                <a16:creationId xmlns:a16="http://schemas.microsoft.com/office/drawing/2014/main" id="{ED8DDD34-38AA-5AAB-3CFE-B7D44271C266}"/>
               </a:ext>
             </a:extLst>
           </p:cNvPr>
           <p:cNvCxnSpPr>
             <a:cxnSpLocks/>
-            <a:stCxn id="16" idx="2"/>
-            <a:endCxn id="19" idx="0"/>
+            <a:stCxn id="4" idx="2"/>
+            <a:endCxn id="8" idx="0"/>
           </p:cNvCxnSpPr>
           <p:nvPr/>
         </p:nvCxnSpPr>
         <p:spPr>
-          <a:xfrm>
-            <a:off x="5048519" y="3471990"/>
-            <a:ext cx="347074" cy="1042638"/>
+          <a:xfrm flipH="1">
+            <a:off x="1715537" y="2662033"/>
+            <a:ext cx="2321358" cy="440625"/>
           </a:xfrm>
           <a:prstGeom prst="straightConnector1">
             <a:avLst/>
@@ -4139,24 +5560,24 @@
       </p:cxnSp>
       <p:sp>
         <p:nvSpPr>
-          <p:cNvPr id="19" name="TextBox 18">
-            <a:extLst>
-              <a:ext uri="{FF2B5EF4-FFF2-40B4-BE49-F238E27FC236}">
-                <a16:creationId xmlns:a16="http://schemas.microsoft.com/office/drawing/2014/main" id="{BDE3E0D8-B2CA-99C1-952A-01895F8C932F}"/>
+          <p:cNvPr id="8" name="TextBox 7">
+            <a:extLst>
+              <a:ext uri="{FF2B5EF4-FFF2-40B4-BE49-F238E27FC236}">
+                <a16:creationId xmlns:a16="http://schemas.microsoft.com/office/drawing/2014/main" id="{3985EAE0-58A3-0010-604D-517EE6B14D73}"/>
               </a:ext>
             </a:extLst>
           </p:cNvPr>
           <p:cNvSpPr txBox="1"/>
           <p:nvPr>
             <p:custDataLst>
-              <p:tags r:id="rId7"/>
+              <p:tags r:id="rId3"/>
             </p:custDataLst>
           </p:nvPr>
         </p:nvSpPr>
         <p:spPr>
           <a:xfrm>
-            <a:off x="4934569" y="4514628"/>
-            <a:ext cx="922047" cy="369332"/>
+            <a:off x="1122105" y="3102658"/>
+            <a:ext cx="1186863" cy="369332"/>
           </a:xfrm>
           <a:prstGeom prst="rect">
             <a:avLst/>
@@ -4175,8 +5596,8 @@
           <a:lstStyle/>
           <a:p>
             <a:r>
-              <a:rPr lang="en-US" altLang="ko-KR" dirty="0" err="1"/>
-              <a:t>DsCoin</a:t>
+              <a:rPr lang="en-US" altLang="ko-KR" dirty="0"/>
+              <a:t>DsSystem</a:t>
             </a:r>
             <a:endParaRPr lang="ko-KR" altLang="en-US" dirty="0"/>
           </a:p>
@@ -4184,24 +5605,24 @@
       </p:sp>
       <p:cxnSp>
         <p:nvCxnSpPr>
-          <p:cNvPr id="21" name="직선 화살표 연결선 110">
-            <a:extLst>
-              <a:ext uri="{FF2B5EF4-FFF2-40B4-BE49-F238E27FC236}">
-                <a16:creationId xmlns:a16="http://schemas.microsoft.com/office/drawing/2014/main" id="{8B406E38-F12B-527F-C06F-69BD36B0094D}"/>
+          <p:cNvPr id="10" name="직선 화살표 연결선 110">
+            <a:extLst>
+              <a:ext uri="{FF2B5EF4-FFF2-40B4-BE49-F238E27FC236}">
+                <a16:creationId xmlns:a16="http://schemas.microsoft.com/office/drawing/2014/main" id="{7DBCD048-93A1-7B1C-C95D-72EC9AC257EE}"/>
               </a:ext>
             </a:extLst>
           </p:cNvPr>
           <p:cNvCxnSpPr>
             <a:cxnSpLocks/>
-            <a:stCxn id="19" idx="2"/>
-            <a:endCxn id="22" idx="0"/>
+            <a:stCxn id="4" idx="2"/>
+            <a:endCxn id="11" idx="0"/>
           </p:cNvCxnSpPr>
           <p:nvPr/>
         </p:nvCxnSpPr>
         <p:spPr>
           <a:xfrm flipH="1">
-            <a:off x="3461207" y="4883960"/>
-            <a:ext cx="1934386" cy="488640"/>
+            <a:off x="2965347" y="2662033"/>
+            <a:ext cx="1071548" cy="440625"/>
           </a:xfrm>
           <a:prstGeom prst="straightConnector1">
             <a:avLst/>
@@ -4228,24 +5649,24 @@
       </p:cxnSp>
       <p:sp>
         <p:nvSpPr>
-          <p:cNvPr id="22" name="TextBox 21">
-            <a:extLst>
-              <a:ext uri="{FF2B5EF4-FFF2-40B4-BE49-F238E27FC236}">
-                <a16:creationId xmlns:a16="http://schemas.microsoft.com/office/drawing/2014/main" id="{6B91DCFE-5059-078D-178D-4BE02727F220}"/>
+          <p:cNvPr id="11" name="TextBox 10">
+            <a:extLst>
+              <a:ext uri="{FF2B5EF4-FFF2-40B4-BE49-F238E27FC236}">
+                <a16:creationId xmlns:a16="http://schemas.microsoft.com/office/drawing/2014/main" id="{FA626F62-87B0-CC0B-D463-CFE2DA8BDC3A}"/>
               </a:ext>
             </a:extLst>
           </p:cNvPr>
           <p:cNvSpPr txBox="1"/>
           <p:nvPr>
             <p:custDataLst>
-              <p:tags r:id="rId8"/>
+              <p:tags r:id="rId4"/>
             </p:custDataLst>
           </p:nvPr>
         </p:nvSpPr>
         <p:spPr>
           <a:xfrm>
-            <a:off x="2902400" y="5372600"/>
-            <a:ext cx="1117614" cy="369332"/>
+            <a:off x="2501117" y="3102658"/>
+            <a:ext cx="928459" cy="369332"/>
           </a:xfrm>
           <a:prstGeom prst="rect">
             <a:avLst/>
@@ -4264,8 +5685,8 @@
           <a:lstStyle/>
           <a:p>
             <a:r>
-              <a:rPr lang="en-US" altLang="ko-KR" dirty="0" err="1"/>
-              <a:t>DsAction</a:t>
+              <a:rPr lang="en-US" altLang="ko-KR" dirty="0"/>
+              <a:t>DsFlow</a:t>
             </a:r>
             <a:endParaRPr lang="ko-KR" altLang="en-US" dirty="0"/>
           </a:p>
@@ -4273,24 +5694,24 @@
       </p:sp>
       <p:cxnSp>
         <p:nvCxnSpPr>
-          <p:cNvPr id="25" name="직선 화살표 연결선 110">
-            <a:extLst>
-              <a:ext uri="{FF2B5EF4-FFF2-40B4-BE49-F238E27FC236}">
-                <a16:creationId xmlns:a16="http://schemas.microsoft.com/office/drawing/2014/main" id="{323E067D-880B-D190-CAE2-0F0AC016A619}"/>
+          <p:cNvPr id="13" name="직선 화살표 연결선 110">
+            <a:extLst>
+              <a:ext uri="{FF2B5EF4-FFF2-40B4-BE49-F238E27FC236}">
+                <a16:creationId xmlns:a16="http://schemas.microsoft.com/office/drawing/2014/main" id="{9189EF36-223C-12BB-7222-417E5D26C7F5}"/>
               </a:ext>
             </a:extLst>
           </p:cNvPr>
           <p:cNvCxnSpPr>
             <a:cxnSpLocks/>
-            <a:stCxn id="19" idx="2"/>
-            <a:endCxn id="26" idx="0"/>
+            <a:stCxn id="16" idx="2"/>
+            <a:endCxn id="14" idx="0"/>
           </p:cNvCxnSpPr>
           <p:nvPr/>
         </p:nvCxnSpPr>
         <p:spPr>
           <a:xfrm flipH="1">
-            <a:off x="4835595" y="4883960"/>
-            <a:ext cx="559998" cy="471230"/>
+            <a:off x="4206815" y="3471990"/>
+            <a:ext cx="841704" cy="1042638"/>
           </a:xfrm>
           <a:prstGeom prst="straightConnector1">
             <a:avLst/>
@@ -4317,24 +5738,24 @@
       </p:cxnSp>
       <p:sp>
         <p:nvSpPr>
-          <p:cNvPr id="26" name="TextBox 25">
-            <a:extLst>
-              <a:ext uri="{FF2B5EF4-FFF2-40B4-BE49-F238E27FC236}">
-                <a16:creationId xmlns:a16="http://schemas.microsoft.com/office/drawing/2014/main" id="{F36442B4-AC9A-B3F7-994F-8A0E859CC179}"/>
+          <p:cNvPr id="14" name="TextBox 13">
+            <a:extLst>
+              <a:ext uri="{FF2B5EF4-FFF2-40B4-BE49-F238E27FC236}">
+                <a16:creationId xmlns:a16="http://schemas.microsoft.com/office/drawing/2014/main" id="{6A93C037-5D2C-D5B7-5DAD-3B169F77C89C}"/>
               </a:ext>
             </a:extLst>
           </p:cNvPr>
           <p:cNvSpPr txBox="1"/>
           <p:nvPr>
             <p:custDataLst>
-              <p:tags r:id="rId9"/>
+              <p:tags r:id="rId5"/>
             </p:custDataLst>
           </p:nvPr>
         </p:nvSpPr>
         <p:spPr>
           <a:xfrm>
-            <a:off x="4193624" y="5355190"/>
-            <a:ext cx="1283941" cy="369332"/>
+            <a:off x="3707094" y="4514628"/>
+            <a:ext cx="999441" cy="369332"/>
           </a:xfrm>
           <a:prstGeom prst="rect">
             <a:avLst/>
@@ -4353,8 +5774,8 @@
           <a:lstStyle/>
           <a:p>
             <a:r>
-              <a:rPr lang="en-US" altLang="ko-KR" dirty="0" err="1"/>
-              <a:t>DsAutoPre</a:t>
+              <a:rPr lang="en-US" altLang="ko-KR" dirty="0"/>
+              <a:t>DsWork</a:t>
             </a:r>
             <a:endParaRPr lang="ko-KR" altLang="en-US" dirty="0"/>
           </a:p>
@@ -4362,24 +5783,24 @@
       </p:sp>
       <p:cxnSp>
         <p:nvCxnSpPr>
-          <p:cNvPr id="27" name="직선 화살표 연결선 110">
-            <a:extLst>
-              <a:ext uri="{FF2B5EF4-FFF2-40B4-BE49-F238E27FC236}">
-                <a16:creationId xmlns:a16="http://schemas.microsoft.com/office/drawing/2014/main" id="{B33507B7-69E0-76C1-4D62-18B449041279}"/>
+          <p:cNvPr id="15" name="직선 화살표 연결선 110">
+            <a:extLst>
+              <a:ext uri="{FF2B5EF4-FFF2-40B4-BE49-F238E27FC236}">
+                <a16:creationId xmlns:a16="http://schemas.microsoft.com/office/drawing/2014/main" id="{0654FBAE-329D-2DA3-D08A-A59CB95B5FA7}"/>
               </a:ext>
             </a:extLst>
           </p:cNvPr>
           <p:cNvCxnSpPr>
             <a:cxnSpLocks/>
-            <a:stCxn id="19" idx="2"/>
-            <a:endCxn id="28" idx="0"/>
+            <a:stCxn id="4" idx="2"/>
+            <a:endCxn id="16" idx="0"/>
           </p:cNvCxnSpPr>
           <p:nvPr/>
         </p:nvCxnSpPr>
         <p:spPr>
           <a:xfrm>
-            <a:off x="5395593" y="4883960"/>
-            <a:ext cx="664499" cy="471230"/>
+            <a:off x="4036895" y="2662033"/>
+            <a:ext cx="1011624" cy="440625"/>
           </a:xfrm>
           <a:prstGeom prst="straightConnector1">
             <a:avLst/>
@@ -4406,24 +5827,24 @@
       </p:cxnSp>
       <p:sp>
         <p:nvSpPr>
-          <p:cNvPr id="28" name="TextBox 27">
-            <a:extLst>
-              <a:ext uri="{FF2B5EF4-FFF2-40B4-BE49-F238E27FC236}">
-                <a16:creationId xmlns:a16="http://schemas.microsoft.com/office/drawing/2014/main" id="{E887DAE9-4108-5302-EACF-ACF2CA7AE288}"/>
+          <p:cNvPr id="16" name="TextBox 15">
+            <a:extLst>
+              <a:ext uri="{FF2B5EF4-FFF2-40B4-BE49-F238E27FC236}">
+                <a16:creationId xmlns:a16="http://schemas.microsoft.com/office/drawing/2014/main" id="{6619801A-8E88-F4C8-E7F2-984C64398985}"/>
               </a:ext>
             </a:extLst>
           </p:cNvPr>
           <p:cNvSpPr txBox="1"/>
           <p:nvPr>
             <p:custDataLst>
-              <p:tags r:id="rId10"/>
+              <p:tags r:id="rId6"/>
             </p:custDataLst>
           </p:nvPr>
         </p:nvSpPr>
         <p:spPr>
           <a:xfrm>
-            <a:off x="5517315" y="5355190"/>
-            <a:ext cx="1085554" cy="369332"/>
+            <a:off x="4630327" y="3102658"/>
+            <a:ext cx="836383" cy="369332"/>
           </a:xfrm>
           <a:prstGeom prst="rect">
             <a:avLst/>
@@ -4442,8 +5863,8 @@
           <a:lstStyle/>
           <a:p>
             <a:r>
-              <a:rPr lang="en-US" altLang="ko-KR" dirty="0" err="1"/>
-              <a:t>DsSafety</a:t>
+              <a:rPr lang="en-US" altLang="ko-KR" dirty="0"/>
+              <a:t>Vertex</a:t>
             </a:r>
             <a:endParaRPr lang="ko-KR" altLang="en-US" dirty="0"/>
           </a:p>
@@ -4451,24 +5872,24 @@
       </p:sp>
       <p:cxnSp>
         <p:nvCxnSpPr>
-          <p:cNvPr id="29" name="직선 화살표 연결선 110">
-            <a:extLst>
-              <a:ext uri="{FF2B5EF4-FFF2-40B4-BE49-F238E27FC236}">
-                <a16:creationId xmlns:a16="http://schemas.microsoft.com/office/drawing/2014/main" id="{D863F9DD-B8FA-F110-4DDE-143BE98C2225}"/>
+          <p:cNvPr id="18" name="직선 화살표 연결선 110">
+            <a:extLst>
+              <a:ext uri="{FF2B5EF4-FFF2-40B4-BE49-F238E27FC236}">
+                <a16:creationId xmlns:a16="http://schemas.microsoft.com/office/drawing/2014/main" id="{C576C58D-AF12-55FB-56E9-7B065DF313F1}"/>
               </a:ext>
             </a:extLst>
           </p:cNvPr>
           <p:cNvCxnSpPr>
             <a:cxnSpLocks/>
-            <a:stCxn id="19" idx="2"/>
-            <a:endCxn id="30" idx="0"/>
+            <a:stCxn id="16" idx="2"/>
+            <a:endCxn id="19" idx="0"/>
           </p:cNvCxnSpPr>
           <p:nvPr/>
         </p:nvCxnSpPr>
         <p:spPr>
           <a:xfrm>
-            <a:off x="5395593" y="4883960"/>
-            <a:ext cx="2197172" cy="471230"/>
+            <a:off x="5048519" y="3471990"/>
+            <a:ext cx="347074" cy="1042638"/>
           </a:xfrm>
           <a:prstGeom prst="straightConnector1">
             <a:avLst/>
@@ -4495,24 +5916,24 @@
       </p:cxnSp>
       <p:sp>
         <p:nvSpPr>
-          <p:cNvPr id="30" name="TextBox 29">
-            <a:extLst>
-              <a:ext uri="{FF2B5EF4-FFF2-40B4-BE49-F238E27FC236}">
-                <a16:creationId xmlns:a16="http://schemas.microsoft.com/office/drawing/2014/main" id="{2BC27644-232D-C9D9-37D4-516ED9309E79}"/>
+          <p:cNvPr id="19" name="TextBox 18">
+            <a:extLst>
+              <a:ext uri="{FF2B5EF4-FFF2-40B4-BE49-F238E27FC236}">
+                <a16:creationId xmlns:a16="http://schemas.microsoft.com/office/drawing/2014/main" id="{BDE3E0D8-B2CA-99C1-952A-01895F8C932F}"/>
               </a:ext>
             </a:extLst>
           </p:cNvPr>
           <p:cNvSpPr txBox="1"/>
           <p:nvPr>
             <p:custDataLst>
-              <p:tags r:id="rId11"/>
+              <p:tags r:id="rId7"/>
             </p:custDataLst>
           </p:nvPr>
         </p:nvSpPr>
         <p:spPr>
           <a:xfrm>
-            <a:off x="6826369" y="5355190"/>
-            <a:ext cx="1532792" cy="369332"/>
+            <a:off x="4934569" y="4514628"/>
+            <a:ext cx="922047" cy="369332"/>
           </a:xfrm>
           <a:prstGeom prst="rect">
             <a:avLst/>
@@ -4531,8 +5952,8 @@
           <a:lstStyle/>
           <a:p>
             <a:r>
-              <a:rPr lang="en-US" altLang="ko-KR" dirty="0" err="1"/>
-              <a:t>DsCommand</a:t>
+              <a:rPr lang="en-US" altLang="ko-KR" dirty="0"/>
+              <a:t>DsCoin</a:t>
             </a:r>
             <a:endParaRPr lang="ko-KR" altLang="en-US" dirty="0"/>
           </a:p>
@@ -4540,24 +5961,24 @@
       </p:sp>
       <p:cxnSp>
         <p:nvCxnSpPr>
-          <p:cNvPr id="34" name="직선 화살표 연결선 110">
-            <a:extLst>
-              <a:ext uri="{FF2B5EF4-FFF2-40B4-BE49-F238E27FC236}">
-                <a16:creationId xmlns:a16="http://schemas.microsoft.com/office/drawing/2014/main" id="{B9F02110-E4D8-A6E8-58CE-CBE588C3983E}"/>
+          <p:cNvPr id="21" name="직선 화살표 연결선 110">
+            <a:extLst>
+              <a:ext uri="{FF2B5EF4-FFF2-40B4-BE49-F238E27FC236}">
+                <a16:creationId xmlns:a16="http://schemas.microsoft.com/office/drawing/2014/main" id="{8B406E38-F12B-527F-C06F-69BD36B0094D}"/>
               </a:ext>
             </a:extLst>
           </p:cNvPr>
           <p:cNvCxnSpPr>
             <a:cxnSpLocks/>
             <a:stCxn id="19" idx="2"/>
-            <a:endCxn id="35" idx="0"/>
+            <a:endCxn id="22" idx="0"/>
           </p:cNvCxnSpPr>
           <p:nvPr/>
         </p:nvCxnSpPr>
         <p:spPr>
-          <a:xfrm>
-            <a:off x="5395593" y="4883960"/>
-            <a:ext cx="3781612" cy="471230"/>
+          <a:xfrm flipH="1">
+            <a:off x="3461207" y="4883960"/>
+            <a:ext cx="1934386" cy="488640"/>
           </a:xfrm>
           <a:prstGeom prst="straightConnector1">
             <a:avLst/>
@@ -4584,24 +6005,24 @@
       </p:cxnSp>
       <p:sp>
         <p:nvSpPr>
-          <p:cNvPr id="35" name="TextBox 34">
-            <a:extLst>
-              <a:ext uri="{FF2B5EF4-FFF2-40B4-BE49-F238E27FC236}">
-                <a16:creationId xmlns:a16="http://schemas.microsoft.com/office/drawing/2014/main" id="{7D1CEED5-6AE4-ACCA-DCC5-6E8DCAE0C452}"/>
+          <p:cNvPr id="22" name="TextBox 21">
+            <a:extLst>
+              <a:ext uri="{FF2B5EF4-FFF2-40B4-BE49-F238E27FC236}">
+                <a16:creationId xmlns:a16="http://schemas.microsoft.com/office/drawing/2014/main" id="{6B91DCFE-5059-078D-178D-4BE02727F220}"/>
               </a:ext>
             </a:extLst>
           </p:cNvPr>
           <p:cNvSpPr txBox="1"/>
           <p:nvPr>
             <p:custDataLst>
-              <p:tags r:id="rId12"/>
+              <p:tags r:id="rId8"/>
             </p:custDataLst>
           </p:nvPr>
         </p:nvSpPr>
         <p:spPr>
           <a:xfrm>
-            <a:off x="8483104" y="5355190"/>
-            <a:ext cx="1388201" cy="369332"/>
+            <a:off x="2902400" y="5372600"/>
+            <a:ext cx="1117614" cy="369332"/>
           </a:xfrm>
           <a:prstGeom prst="rect">
             <a:avLst/>
@@ -4620,77 +6041,33 @@
           <a:lstStyle/>
           <a:p>
             <a:r>
-              <a:rPr lang="en-US" altLang="ko-KR" dirty="0" err="1"/>
-              <a:t>DsOperator</a:t>
+              <a:rPr lang="en-US" altLang="ko-KR" dirty="0"/>
+              <a:t>DsAction</a:t>
             </a:r>
             <a:endParaRPr lang="ko-KR" altLang="en-US" dirty="0"/>
-          </a:p>
-        </p:txBody>
-      </p:sp>
-      <p:sp>
-        <p:nvSpPr>
-          <p:cNvPr id="41" name="TextBox 40">
-            <a:extLst>
-              <a:ext uri="{FF2B5EF4-FFF2-40B4-BE49-F238E27FC236}">
-                <a16:creationId xmlns:a16="http://schemas.microsoft.com/office/drawing/2014/main" id="{A61C99B1-E5AB-D91F-FF3F-D2681E1FECB9}"/>
-              </a:ext>
-            </a:extLst>
-          </p:cNvPr>
-          <p:cNvSpPr txBox="1"/>
-          <p:nvPr/>
-        </p:nvSpPr>
-        <p:spPr>
-          <a:xfrm>
-            <a:off x="5592551" y="2343372"/>
-            <a:ext cx="1339192" cy="276999"/>
-          </a:xfrm>
-          <a:prstGeom prst="rect">
-            <a:avLst/>
-          </a:prstGeom>
-          <a:noFill/>
-        </p:spPr>
-        <p:txBody>
-          <a:bodyPr wrap="square">
-            <a:spAutoFit/>
-          </a:bodyPr>
-          <a:lstStyle/>
-          <a:p>
-            <a:r>
-              <a:rPr lang="en-US" altLang="ko-KR" sz="1200" dirty="0" err="1">
-                <a:solidFill>
-                  <a:srgbClr val="2B91AF"/>
-                </a:solidFill>
-                <a:highlight>
-                  <a:srgbClr val="FFFFFF"/>
-                </a:highlight>
-                <a:latin typeface="Cascadia Mono" panose="020B0609020000020004" pitchFamily="49" charset="0"/>
-              </a:rPr>
-              <a:t>INamedVertex</a:t>
-            </a:r>
-            <a:endParaRPr lang="ko-KR" altLang="en-US" sz="1200" dirty="0"/>
           </a:p>
         </p:txBody>
       </p:sp>
       <p:cxnSp>
         <p:nvCxnSpPr>
-          <p:cNvPr id="42" name="직선 화살표 연결선 110">
-            <a:extLst>
-              <a:ext uri="{FF2B5EF4-FFF2-40B4-BE49-F238E27FC236}">
-                <a16:creationId xmlns:a16="http://schemas.microsoft.com/office/drawing/2014/main" id="{70103023-F7E9-DBA4-66A0-2D63D094D429}"/>
+          <p:cNvPr id="25" name="직선 화살표 연결선 110">
+            <a:extLst>
+              <a:ext uri="{FF2B5EF4-FFF2-40B4-BE49-F238E27FC236}">
+                <a16:creationId xmlns:a16="http://schemas.microsoft.com/office/drawing/2014/main" id="{323E067D-880B-D190-CAE2-0F0AC016A619}"/>
               </a:ext>
             </a:extLst>
           </p:cNvPr>
           <p:cNvCxnSpPr>
             <a:cxnSpLocks/>
-            <a:stCxn id="41" idx="2"/>
-            <a:endCxn id="16" idx="0"/>
+            <a:stCxn id="19" idx="2"/>
+            <a:endCxn id="26" idx="0"/>
           </p:cNvCxnSpPr>
           <p:nvPr/>
         </p:nvCxnSpPr>
         <p:spPr>
           <a:xfrm flipH="1">
-            <a:off x="5048519" y="2620371"/>
-            <a:ext cx="1213628" cy="482287"/>
+            <a:off x="4835595" y="4883960"/>
+            <a:ext cx="559998" cy="471230"/>
           </a:xfrm>
           <a:prstGeom prst="straightConnector1">
             <a:avLst/>
@@ -4717,68 +6094,69 @@
       </p:cxnSp>
       <p:sp>
         <p:nvSpPr>
-          <p:cNvPr id="49" name="TextBox 48">
-            <a:extLst>
-              <a:ext uri="{FF2B5EF4-FFF2-40B4-BE49-F238E27FC236}">
-                <a16:creationId xmlns:a16="http://schemas.microsoft.com/office/drawing/2014/main" id="{0AAB2E9D-748E-63D6-ECE6-4A7ECB3EC555}"/>
+          <p:cNvPr id="26" name="TextBox 25">
+            <a:extLst>
+              <a:ext uri="{FF2B5EF4-FFF2-40B4-BE49-F238E27FC236}">
+                <a16:creationId xmlns:a16="http://schemas.microsoft.com/office/drawing/2014/main" id="{F36442B4-AC9A-B3F7-994F-8A0E859CC179}"/>
               </a:ext>
             </a:extLst>
           </p:cNvPr>
           <p:cNvSpPr txBox="1"/>
-          <p:nvPr/>
+          <p:nvPr>
+            <p:custDataLst>
+              <p:tags r:id="rId9"/>
+            </p:custDataLst>
+          </p:nvPr>
         </p:nvSpPr>
         <p:spPr>
           <a:xfrm>
-            <a:off x="5497037" y="1619395"/>
-            <a:ext cx="765110" cy="276999"/>
+            <a:off x="4193624" y="5355190"/>
+            <a:ext cx="1283941" cy="369332"/>
           </a:xfrm>
           <a:prstGeom prst="rect">
             <a:avLst/>
           </a:prstGeom>
-          <a:noFill/>
-        </p:spPr>
-        <p:txBody>
-          <a:bodyPr wrap="square">
+          <a:solidFill>
+            <a:schemeClr val="accent5">
+              <a:lumMod val="40000"/>
+              <a:lumOff val="60000"/>
+            </a:schemeClr>
+          </a:solidFill>
+        </p:spPr>
+        <p:txBody>
+          <a:bodyPr wrap="none" rtlCol="0">
             <a:spAutoFit/>
           </a:bodyPr>
           <a:lstStyle/>
           <a:p>
             <a:r>
-              <a:rPr lang="en-US" altLang="ko-KR" sz="1200" dirty="0" err="1">
-                <a:solidFill>
-                  <a:srgbClr val="2B91AF"/>
-                </a:solidFill>
-                <a:highlight>
-                  <a:srgbClr val="FFFFFF"/>
-                </a:highlight>
-                <a:latin typeface="Cascadia Mono" panose="020B0609020000020004" pitchFamily="49" charset="0"/>
-              </a:rPr>
-              <a:t>INamed</a:t>
-            </a:r>
-            <a:endParaRPr lang="ko-KR" altLang="en-US" sz="1200" dirty="0"/>
+              <a:rPr lang="en-US" altLang="ko-KR" dirty="0"/>
+              <a:t>DsAutoPre</a:t>
+            </a:r>
+            <a:endParaRPr lang="ko-KR" altLang="en-US" dirty="0"/>
           </a:p>
         </p:txBody>
       </p:sp>
       <p:cxnSp>
         <p:nvCxnSpPr>
-          <p:cNvPr id="50" name="직선 화살표 연결선 110">
-            <a:extLst>
-              <a:ext uri="{FF2B5EF4-FFF2-40B4-BE49-F238E27FC236}">
-                <a16:creationId xmlns:a16="http://schemas.microsoft.com/office/drawing/2014/main" id="{B2A668E8-10E9-2022-144D-EA7AF91FDD9D}"/>
+          <p:cNvPr id="27" name="직선 화살표 연결선 110">
+            <a:extLst>
+              <a:ext uri="{FF2B5EF4-FFF2-40B4-BE49-F238E27FC236}">
+                <a16:creationId xmlns:a16="http://schemas.microsoft.com/office/drawing/2014/main" id="{B33507B7-69E0-76C1-4D62-18B449041279}"/>
               </a:ext>
             </a:extLst>
           </p:cNvPr>
           <p:cNvCxnSpPr>
             <a:cxnSpLocks/>
-            <a:stCxn id="49" idx="2"/>
-            <a:endCxn id="41" idx="0"/>
+            <a:stCxn id="19" idx="2"/>
+            <a:endCxn id="28" idx="0"/>
           </p:cNvCxnSpPr>
           <p:nvPr/>
         </p:nvCxnSpPr>
         <p:spPr>
           <a:xfrm>
-            <a:off x="5879592" y="1896394"/>
-            <a:ext cx="382555" cy="446978"/>
+            <a:off x="5395593" y="4883960"/>
+            <a:ext cx="664499" cy="471230"/>
           </a:xfrm>
           <a:prstGeom prst="straightConnector1">
             <a:avLst/>
@@ -4805,10 +6183,233 @@
       </p:cxnSp>
       <p:sp>
         <p:nvSpPr>
-          <p:cNvPr id="51" name="TextBox 50">
-            <a:extLst>
-              <a:ext uri="{FF2B5EF4-FFF2-40B4-BE49-F238E27FC236}">
-                <a16:creationId xmlns:a16="http://schemas.microsoft.com/office/drawing/2014/main" id="{F0953D1C-2201-3527-542A-37F50B9335AB}"/>
+          <p:cNvPr id="28" name="TextBox 27">
+            <a:extLst>
+              <a:ext uri="{FF2B5EF4-FFF2-40B4-BE49-F238E27FC236}">
+                <a16:creationId xmlns:a16="http://schemas.microsoft.com/office/drawing/2014/main" id="{E887DAE9-4108-5302-EACF-ACF2CA7AE288}"/>
+              </a:ext>
+            </a:extLst>
+          </p:cNvPr>
+          <p:cNvSpPr txBox="1"/>
+          <p:nvPr>
+            <p:custDataLst>
+              <p:tags r:id="rId10"/>
+            </p:custDataLst>
+          </p:nvPr>
+        </p:nvSpPr>
+        <p:spPr>
+          <a:xfrm>
+            <a:off x="5517315" y="5355190"/>
+            <a:ext cx="1085554" cy="369332"/>
+          </a:xfrm>
+          <a:prstGeom prst="rect">
+            <a:avLst/>
+          </a:prstGeom>
+          <a:solidFill>
+            <a:schemeClr val="accent5">
+              <a:lumMod val="40000"/>
+              <a:lumOff val="60000"/>
+            </a:schemeClr>
+          </a:solidFill>
+        </p:spPr>
+        <p:txBody>
+          <a:bodyPr wrap="none" rtlCol="0">
+            <a:spAutoFit/>
+          </a:bodyPr>
+          <a:lstStyle/>
+          <a:p>
+            <a:r>
+              <a:rPr lang="en-US" altLang="ko-KR" dirty="0"/>
+              <a:t>DsSafety</a:t>
+            </a:r>
+            <a:endParaRPr lang="ko-KR" altLang="en-US" dirty="0"/>
+          </a:p>
+        </p:txBody>
+      </p:sp>
+      <p:cxnSp>
+        <p:nvCxnSpPr>
+          <p:cNvPr id="29" name="직선 화살표 연결선 110">
+            <a:extLst>
+              <a:ext uri="{FF2B5EF4-FFF2-40B4-BE49-F238E27FC236}">
+                <a16:creationId xmlns:a16="http://schemas.microsoft.com/office/drawing/2014/main" id="{D863F9DD-B8FA-F110-4DDE-143BE98C2225}"/>
+              </a:ext>
+            </a:extLst>
+          </p:cNvPr>
+          <p:cNvCxnSpPr>
+            <a:cxnSpLocks/>
+            <a:stCxn id="19" idx="2"/>
+            <a:endCxn id="30" idx="0"/>
+          </p:cNvCxnSpPr>
+          <p:nvPr/>
+        </p:nvCxnSpPr>
+        <p:spPr>
+          <a:xfrm>
+            <a:off x="5395593" y="4883960"/>
+            <a:ext cx="2197172" cy="471230"/>
+          </a:xfrm>
+          <a:prstGeom prst="straightConnector1">
+            <a:avLst/>
+          </a:prstGeom>
+          <a:ln>
+            <a:headEnd type="none"/>
+            <a:tailEnd type="triangle"/>
+          </a:ln>
+        </p:spPr>
+        <p:style>
+          <a:lnRef idx="2">
+            <a:schemeClr val="accent1"/>
+          </a:lnRef>
+          <a:fillRef idx="0">
+            <a:schemeClr val="accent1"/>
+          </a:fillRef>
+          <a:effectRef idx="1">
+            <a:schemeClr val="accent1"/>
+          </a:effectRef>
+          <a:fontRef idx="minor">
+            <a:schemeClr val="tx1"/>
+          </a:fontRef>
+        </p:style>
+      </p:cxnSp>
+      <p:sp>
+        <p:nvSpPr>
+          <p:cNvPr id="30" name="TextBox 29">
+            <a:extLst>
+              <a:ext uri="{FF2B5EF4-FFF2-40B4-BE49-F238E27FC236}">
+                <a16:creationId xmlns:a16="http://schemas.microsoft.com/office/drawing/2014/main" id="{2BC27644-232D-C9D9-37D4-516ED9309E79}"/>
+              </a:ext>
+            </a:extLst>
+          </p:cNvPr>
+          <p:cNvSpPr txBox="1"/>
+          <p:nvPr>
+            <p:custDataLst>
+              <p:tags r:id="rId11"/>
+            </p:custDataLst>
+          </p:nvPr>
+        </p:nvSpPr>
+        <p:spPr>
+          <a:xfrm>
+            <a:off x="6826369" y="5355190"/>
+            <a:ext cx="1532792" cy="369332"/>
+          </a:xfrm>
+          <a:prstGeom prst="rect">
+            <a:avLst/>
+          </a:prstGeom>
+          <a:solidFill>
+            <a:schemeClr val="accent5">
+              <a:lumMod val="40000"/>
+              <a:lumOff val="60000"/>
+            </a:schemeClr>
+          </a:solidFill>
+        </p:spPr>
+        <p:txBody>
+          <a:bodyPr wrap="none" rtlCol="0">
+            <a:spAutoFit/>
+          </a:bodyPr>
+          <a:lstStyle/>
+          <a:p>
+            <a:r>
+              <a:rPr lang="en-US" altLang="ko-KR" dirty="0"/>
+              <a:t>DsCommand</a:t>
+            </a:r>
+            <a:endParaRPr lang="ko-KR" altLang="en-US" dirty="0"/>
+          </a:p>
+        </p:txBody>
+      </p:sp>
+      <p:cxnSp>
+        <p:nvCxnSpPr>
+          <p:cNvPr id="34" name="직선 화살표 연결선 110">
+            <a:extLst>
+              <a:ext uri="{FF2B5EF4-FFF2-40B4-BE49-F238E27FC236}">
+                <a16:creationId xmlns:a16="http://schemas.microsoft.com/office/drawing/2014/main" id="{B9F02110-E4D8-A6E8-58CE-CBE588C3983E}"/>
+              </a:ext>
+            </a:extLst>
+          </p:cNvPr>
+          <p:cNvCxnSpPr>
+            <a:cxnSpLocks/>
+            <a:stCxn id="19" idx="2"/>
+            <a:endCxn id="35" idx="0"/>
+          </p:cNvCxnSpPr>
+          <p:nvPr/>
+        </p:nvCxnSpPr>
+        <p:spPr>
+          <a:xfrm>
+            <a:off x="5395593" y="4883960"/>
+            <a:ext cx="3781612" cy="471230"/>
+          </a:xfrm>
+          <a:prstGeom prst="straightConnector1">
+            <a:avLst/>
+          </a:prstGeom>
+          <a:ln>
+            <a:headEnd type="none"/>
+            <a:tailEnd type="triangle"/>
+          </a:ln>
+        </p:spPr>
+        <p:style>
+          <a:lnRef idx="2">
+            <a:schemeClr val="accent1"/>
+          </a:lnRef>
+          <a:fillRef idx="0">
+            <a:schemeClr val="accent1"/>
+          </a:fillRef>
+          <a:effectRef idx="1">
+            <a:schemeClr val="accent1"/>
+          </a:effectRef>
+          <a:fontRef idx="minor">
+            <a:schemeClr val="tx1"/>
+          </a:fontRef>
+        </p:style>
+      </p:cxnSp>
+      <p:sp>
+        <p:nvSpPr>
+          <p:cNvPr id="35" name="TextBox 34">
+            <a:extLst>
+              <a:ext uri="{FF2B5EF4-FFF2-40B4-BE49-F238E27FC236}">
+                <a16:creationId xmlns:a16="http://schemas.microsoft.com/office/drawing/2014/main" id="{7D1CEED5-6AE4-ACCA-DCC5-6E8DCAE0C452}"/>
+              </a:ext>
+            </a:extLst>
+          </p:cNvPr>
+          <p:cNvSpPr txBox="1"/>
+          <p:nvPr>
+            <p:custDataLst>
+              <p:tags r:id="rId12"/>
+            </p:custDataLst>
+          </p:nvPr>
+        </p:nvSpPr>
+        <p:spPr>
+          <a:xfrm>
+            <a:off x="8483104" y="5355190"/>
+            <a:ext cx="1388201" cy="369332"/>
+          </a:xfrm>
+          <a:prstGeom prst="rect">
+            <a:avLst/>
+          </a:prstGeom>
+          <a:solidFill>
+            <a:schemeClr val="accent5">
+              <a:lumMod val="40000"/>
+              <a:lumOff val="60000"/>
+            </a:schemeClr>
+          </a:solidFill>
+        </p:spPr>
+        <p:txBody>
+          <a:bodyPr wrap="none" rtlCol="0">
+            <a:spAutoFit/>
+          </a:bodyPr>
+          <a:lstStyle/>
+          <a:p>
+            <a:r>
+              <a:rPr lang="en-US" altLang="ko-KR" dirty="0"/>
+              <a:t>DsOperator</a:t>
+            </a:r>
+            <a:endParaRPr lang="ko-KR" altLang="en-US" dirty="0"/>
+          </a:p>
+        </p:txBody>
+      </p:sp>
+      <p:sp>
+        <p:nvSpPr>
+          <p:cNvPr id="41" name="TextBox 40">
+            <a:extLst>
+              <a:ext uri="{FF2B5EF4-FFF2-40B4-BE49-F238E27FC236}">
+                <a16:creationId xmlns:a16="http://schemas.microsoft.com/office/drawing/2014/main" id="{A61C99B1-E5AB-D91F-FF3F-D2681E1FECB9}"/>
               </a:ext>
             </a:extLst>
           </p:cNvPr>
@@ -4817,7 +6418,7 @@
         </p:nvSpPr>
         <p:spPr>
           <a:xfrm>
-            <a:off x="6602869" y="1619395"/>
+            <a:off x="5592551" y="2343372"/>
             <a:ext cx="1339192" cy="276999"/>
           </a:xfrm>
           <a:prstGeom prst="rect">
@@ -4832,7 +6433,183 @@
           <a:lstStyle/>
           <a:p>
             <a:r>
-              <a:rPr lang="en-US" altLang="ko-KR" sz="1200" dirty="0" err="1">
+              <a:rPr lang="en-US" altLang="ko-KR" sz="1200" dirty="0">
+                <a:solidFill>
+                  <a:srgbClr val="2B91AF"/>
+                </a:solidFill>
+                <a:highlight>
+                  <a:srgbClr val="FFFFFF"/>
+                </a:highlight>
+                <a:latin typeface="Cascadia Mono" panose="020B0609020000020004" pitchFamily="49" charset="0"/>
+              </a:rPr>
+              <a:t>INamedVertex</a:t>
+            </a:r>
+            <a:endParaRPr lang="ko-KR" altLang="en-US" sz="1200" dirty="0"/>
+          </a:p>
+        </p:txBody>
+      </p:sp>
+      <p:cxnSp>
+        <p:nvCxnSpPr>
+          <p:cNvPr id="42" name="직선 화살표 연결선 110">
+            <a:extLst>
+              <a:ext uri="{FF2B5EF4-FFF2-40B4-BE49-F238E27FC236}">
+                <a16:creationId xmlns:a16="http://schemas.microsoft.com/office/drawing/2014/main" id="{70103023-F7E9-DBA4-66A0-2D63D094D429}"/>
+              </a:ext>
+            </a:extLst>
+          </p:cNvPr>
+          <p:cNvCxnSpPr>
+            <a:cxnSpLocks/>
+            <a:stCxn id="41" idx="2"/>
+            <a:endCxn id="16" idx="0"/>
+          </p:cNvCxnSpPr>
+          <p:nvPr/>
+        </p:nvCxnSpPr>
+        <p:spPr>
+          <a:xfrm flipH="1">
+            <a:off x="5048519" y="2620371"/>
+            <a:ext cx="1213628" cy="482287"/>
+          </a:xfrm>
+          <a:prstGeom prst="straightConnector1">
+            <a:avLst/>
+          </a:prstGeom>
+          <a:ln>
+            <a:headEnd type="none"/>
+            <a:tailEnd type="triangle"/>
+          </a:ln>
+        </p:spPr>
+        <p:style>
+          <a:lnRef idx="2">
+            <a:schemeClr val="accent1"/>
+          </a:lnRef>
+          <a:fillRef idx="0">
+            <a:schemeClr val="accent1"/>
+          </a:fillRef>
+          <a:effectRef idx="1">
+            <a:schemeClr val="accent1"/>
+          </a:effectRef>
+          <a:fontRef idx="minor">
+            <a:schemeClr val="tx1"/>
+          </a:fontRef>
+        </p:style>
+      </p:cxnSp>
+      <p:sp>
+        <p:nvSpPr>
+          <p:cNvPr id="49" name="TextBox 48">
+            <a:extLst>
+              <a:ext uri="{FF2B5EF4-FFF2-40B4-BE49-F238E27FC236}">
+                <a16:creationId xmlns:a16="http://schemas.microsoft.com/office/drawing/2014/main" id="{0AAB2E9D-748E-63D6-ECE6-4A7ECB3EC555}"/>
+              </a:ext>
+            </a:extLst>
+          </p:cNvPr>
+          <p:cNvSpPr txBox="1"/>
+          <p:nvPr/>
+        </p:nvSpPr>
+        <p:spPr>
+          <a:xfrm>
+            <a:off x="4985231" y="1637082"/>
+            <a:ext cx="765110" cy="276999"/>
+          </a:xfrm>
+          <a:prstGeom prst="rect">
+            <a:avLst/>
+          </a:prstGeom>
+          <a:noFill/>
+        </p:spPr>
+        <p:txBody>
+          <a:bodyPr wrap="square">
+            <a:spAutoFit/>
+          </a:bodyPr>
+          <a:lstStyle/>
+          <a:p>
+            <a:r>
+              <a:rPr lang="en-US" altLang="ko-KR" sz="1200" dirty="0">
+                <a:solidFill>
+                  <a:srgbClr val="2B91AF"/>
+                </a:solidFill>
+                <a:highlight>
+                  <a:srgbClr val="FFFFFF"/>
+                </a:highlight>
+                <a:latin typeface="Cascadia Mono" panose="020B0609020000020004" pitchFamily="49" charset="0"/>
+              </a:rPr>
+              <a:t>INamed</a:t>
+            </a:r>
+            <a:endParaRPr lang="ko-KR" altLang="en-US" sz="1200" dirty="0"/>
+          </a:p>
+        </p:txBody>
+      </p:sp>
+      <p:cxnSp>
+        <p:nvCxnSpPr>
+          <p:cNvPr id="50" name="직선 화살표 연결선 110">
+            <a:extLst>
+              <a:ext uri="{FF2B5EF4-FFF2-40B4-BE49-F238E27FC236}">
+                <a16:creationId xmlns:a16="http://schemas.microsoft.com/office/drawing/2014/main" id="{B2A668E8-10E9-2022-144D-EA7AF91FDD9D}"/>
+              </a:ext>
+            </a:extLst>
+          </p:cNvPr>
+          <p:cNvCxnSpPr>
+            <a:cxnSpLocks/>
+            <a:stCxn id="49" idx="2"/>
+            <a:endCxn id="41" idx="0"/>
+          </p:cNvCxnSpPr>
+          <p:nvPr/>
+        </p:nvCxnSpPr>
+        <p:spPr>
+          <a:xfrm>
+            <a:off x="5367786" y="1914081"/>
+            <a:ext cx="894361" cy="429291"/>
+          </a:xfrm>
+          <a:prstGeom prst="straightConnector1">
+            <a:avLst/>
+          </a:prstGeom>
+          <a:ln>
+            <a:headEnd type="none"/>
+            <a:tailEnd type="triangle"/>
+          </a:ln>
+        </p:spPr>
+        <p:style>
+          <a:lnRef idx="2">
+            <a:schemeClr val="accent1"/>
+          </a:lnRef>
+          <a:fillRef idx="0">
+            <a:schemeClr val="accent1"/>
+          </a:fillRef>
+          <a:effectRef idx="1">
+            <a:schemeClr val="accent1"/>
+          </a:effectRef>
+          <a:fontRef idx="minor">
+            <a:schemeClr val="tx1"/>
+          </a:fontRef>
+        </p:style>
+      </p:cxnSp>
+      <p:sp>
+        <p:nvSpPr>
+          <p:cNvPr id="51" name="TextBox 50">
+            <a:extLst>
+              <a:ext uri="{FF2B5EF4-FFF2-40B4-BE49-F238E27FC236}">
+                <a16:creationId xmlns:a16="http://schemas.microsoft.com/office/drawing/2014/main" id="{F0953D1C-2201-3527-542A-37F50B9335AB}"/>
+              </a:ext>
+            </a:extLst>
+          </p:cNvPr>
+          <p:cNvSpPr txBox="1"/>
+          <p:nvPr/>
+        </p:nvSpPr>
+        <p:spPr>
+          <a:xfrm>
+            <a:off x="6602869" y="1619395"/>
+            <a:ext cx="1339192" cy="276999"/>
+          </a:xfrm>
+          <a:prstGeom prst="rect">
+            <a:avLst/>
+          </a:prstGeom>
+          <a:noFill/>
+        </p:spPr>
+        <p:txBody>
+          <a:bodyPr wrap="square">
+            <a:spAutoFit/>
+          </a:bodyPr>
+          <a:lstStyle/>
+          <a:p>
+            <a:r>
+              <a:rPr lang="en-US" altLang="ko-KR" sz="1200" dirty="0">
                 <a:solidFill>
                   <a:srgbClr val="2B91AF"/>
                 </a:solidFill>
@@ -4909,8 +6686,8 @@
         </p:nvCxnSpPr>
         <p:spPr>
           <a:xfrm flipH="1">
-            <a:off x="4036895" y="1896394"/>
-            <a:ext cx="1842697" cy="396307"/>
+            <a:off x="4036895" y="1914081"/>
+            <a:ext cx="1330891" cy="378620"/>
           </a:xfrm>
           <a:prstGeom prst="straightConnector1">
             <a:avLst/>
@@ -4949,7 +6726,7 @@
         </p:nvSpPr>
         <p:spPr>
           <a:xfrm>
-            <a:off x="1255173" y="2620371"/>
+            <a:off x="630270" y="2246534"/>
             <a:ext cx="920725" cy="276999"/>
           </a:xfrm>
           <a:prstGeom prst="rect">
@@ -4964,7 +6741,7 @@
           <a:lstStyle/>
           <a:p>
             <a:r>
-              <a:rPr lang="en-US" altLang="ko-KR" sz="1200" dirty="0" err="1">
+              <a:rPr lang="en-US" altLang="ko-KR" sz="1200" dirty="0">
                 <a:solidFill>
                   <a:srgbClr val="2B91AF"/>
                 </a:solidFill>
@@ -4975,7 +6752,6 @@
               </a:rPr>
               <a:t>ISystem</a:t>
             </a:r>
-            <a:endParaRPr lang="ko-KR" altLang="en-US" sz="1200" dirty="0"/>
           </a:p>
         </p:txBody>
       </p:sp>
@@ -4997,8 +6773,8 @@
         </p:nvCxnSpPr>
         <p:spPr>
           <a:xfrm>
-            <a:off x="1715536" y="2897370"/>
-            <a:ext cx="1" cy="205288"/>
+            <a:off x="1090633" y="2523533"/>
+            <a:ext cx="624904" cy="579125"/>
           </a:xfrm>
           <a:prstGeom prst="straightConnector1">
             <a:avLst/>
@@ -5038,7 +6814,7 @@
         <p:spPr>
           <a:xfrm>
             <a:off x="3421680" y="3982132"/>
-            <a:ext cx="920725" cy="276999"/>
+            <a:ext cx="920725" cy="461665"/>
           </a:xfrm>
           <a:prstGeom prst="rect">
             <a:avLst/>
@@ -5052,7 +6828,7 @@
           <a:lstStyle/>
           <a:p>
             <a:r>
-              <a:rPr lang="en-US" altLang="ko-KR" sz="1200" dirty="0" err="1">
+              <a:rPr lang="en-US" altLang="ko-KR" sz="1200" dirty="0">
                 <a:solidFill>
                   <a:srgbClr val="2B91AF"/>
                 </a:solidFill>
@@ -5063,6 +6839,20 @@
               </a:rPr>
               <a:t>IWork</a:t>
             </a:r>
+          </a:p>
+          <a:p>
+            <a:r>
+              <a:rPr lang="en-US" altLang="ko-KR" sz="1200" dirty="0">
+                <a:solidFill>
+                  <a:srgbClr val="2B91AF"/>
+                </a:solidFill>
+                <a:highlight>
+                  <a:srgbClr val="FFFFFF"/>
+                </a:highlight>
+                <a:latin typeface="Cascadia Mono" panose="020B0609020000020004" pitchFamily="49" charset="0"/>
+              </a:rPr>
+              <a:t>IGraph</a:t>
+            </a:r>
             <a:endParaRPr lang="ko-KR" altLang="en-US" sz="1200" dirty="0"/>
           </a:p>
         </p:txBody>
@@ -5085,8 +6875,110 @@
         </p:nvCxnSpPr>
         <p:spPr>
           <a:xfrm>
-            <a:off x="3882043" y="4259131"/>
-            <a:ext cx="324772" cy="255497"/>
+            <a:off x="3882043" y="4443797"/>
+            <a:ext cx="324772" cy="70831"/>
+          </a:xfrm>
+          <a:prstGeom prst="straightConnector1">
+            <a:avLst/>
+          </a:prstGeom>
+          <a:ln>
+            <a:headEnd type="none"/>
+            <a:tailEnd type="triangle"/>
+          </a:ln>
+        </p:spPr>
+        <p:style>
+          <a:lnRef idx="2">
+            <a:schemeClr val="accent1"/>
+          </a:lnRef>
+          <a:fillRef idx="0">
+            <a:schemeClr val="accent1"/>
+          </a:fillRef>
+          <a:effectRef idx="1">
+            <a:schemeClr val="accent1"/>
+          </a:effectRef>
+          <a:fontRef idx="minor">
+            <a:schemeClr val="tx1"/>
+          </a:fontRef>
+        </p:style>
+      </p:cxnSp>
+      <p:sp>
+        <p:nvSpPr>
+          <p:cNvPr id="7" name="TextBox 6">
+            <a:extLst>
+              <a:ext uri="{FF2B5EF4-FFF2-40B4-BE49-F238E27FC236}">
+                <a16:creationId xmlns:a16="http://schemas.microsoft.com/office/drawing/2014/main" id="{4A3CB38A-6873-4CAF-7318-403F9ADA5D9D}"/>
+              </a:ext>
+            </a:extLst>
+          </p:cNvPr>
+          <p:cNvSpPr txBox="1"/>
+          <p:nvPr/>
+        </p:nvSpPr>
+        <p:spPr>
+          <a:xfrm>
+            <a:off x="1742483" y="2243207"/>
+            <a:ext cx="920725" cy="461665"/>
+          </a:xfrm>
+          <a:prstGeom prst="rect">
+            <a:avLst/>
+          </a:prstGeom>
+          <a:noFill/>
+        </p:spPr>
+        <p:txBody>
+          <a:bodyPr wrap="square">
+            <a:spAutoFit/>
+          </a:bodyPr>
+          <a:lstStyle/>
+          <a:p>
+            <a:r>
+              <a:rPr lang="en-US" altLang="ko-KR" sz="1200" dirty="0">
+                <a:solidFill>
+                  <a:srgbClr val="2B91AF"/>
+                </a:solidFill>
+                <a:highlight>
+                  <a:srgbClr val="FFFFFF"/>
+                </a:highlight>
+                <a:latin typeface="Cascadia Mono" panose="020B0609020000020004" pitchFamily="49" charset="0"/>
+              </a:rPr>
+              <a:t>IFlow</a:t>
+            </a:r>
+          </a:p>
+          <a:p>
+            <a:r>
+              <a:rPr lang="en-US" altLang="ko-KR" sz="1200" dirty="0">
+                <a:solidFill>
+                  <a:srgbClr val="2B91AF"/>
+                </a:solidFill>
+                <a:highlight>
+                  <a:srgbClr val="FFFFFF"/>
+                </a:highlight>
+                <a:latin typeface="Cascadia Mono" panose="020B0609020000020004" pitchFamily="49" charset="0"/>
+              </a:rPr>
+              <a:t>IGraph</a:t>
+            </a:r>
+            <a:endParaRPr lang="ko-KR" altLang="en-US" sz="1200" dirty="0"/>
+          </a:p>
+        </p:txBody>
+      </p:sp>
+      <p:cxnSp>
+        <p:nvCxnSpPr>
+          <p:cNvPr id="9" name="직선 화살표 연결선 110">
+            <a:extLst>
+              <a:ext uri="{FF2B5EF4-FFF2-40B4-BE49-F238E27FC236}">
+                <a16:creationId xmlns:a16="http://schemas.microsoft.com/office/drawing/2014/main" id="{19B2BEDA-938A-49B9-01B4-60B740774D10}"/>
+              </a:ext>
+            </a:extLst>
+          </p:cNvPr>
+          <p:cNvCxnSpPr>
+            <a:cxnSpLocks/>
+            <a:stCxn id="7" idx="2"/>
+            <a:endCxn id="11" idx="0"/>
+          </p:cNvCxnSpPr>
+          <p:nvPr/>
+        </p:nvCxnSpPr>
+        <p:spPr>
+          <a:xfrm>
+            <a:off x="2202846" y="2704872"/>
+            <a:ext cx="762501" cy="397786"/>
           </a:xfrm>
           <a:prstGeom prst="straightConnector1">
             <a:avLst/>
@@ -5175,6 +7067,18 @@
 </p:tagLst>
 </file>
 
+<file path=ppt/tags/tag17.xml><?xml version="1.0" encoding="utf-8"?>
+<p:tagLst xmlns:a="http://schemas.openxmlformats.org/drawingml/2006/main" xmlns:r="http://schemas.openxmlformats.org/officeDocument/2006/relationships" xmlns:p="http://schemas.openxmlformats.org/presentationml/2006/main">
+  <p:tag name="PROPREAL" val="{&#10;  &quot;GoingTime&quot;: 0,&#10;  &quot;DelayTime&quot;: 0,&#10;  &quot;Motion&quot;: null,&#10;  &quot;Script&quot;: null,&#10;  &quot;NoTrans&quot;: false,&#10;  &quot;IsInitialFinished&quot;: false,&#10;  &quot;IsTokenSource&quot;: false,&#10;  &quot;RepeatCounter&quot;: 1&#10;}"/>
+</p:tagLst>
+</file>
+
+<file path=ppt/tags/tag18.xml><?xml version="1.0" encoding="utf-8"?>
+<p:tagLst xmlns:a="http://schemas.openxmlformats.org/drawingml/2006/main" xmlns:r="http://schemas.openxmlformats.org/officeDocument/2006/relationships" xmlns:p="http://schemas.openxmlformats.org/presentationml/2006/main">
+  <p:tag name="PROPREAL" val="{&#10;  &quot;GoingTime&quot;: 0,&#10;  &quot;DelayTime&quot;: 0,&#10;  &quot;Motion&quot;: null,&#10;  &quot;Script&quot;: null,&#10;  &quot;NoTrans&quot;: false,&#10;  &quot;IsInitialFinished&quot;: false,&#10;  &quot;IsTokenSource&quot;: false,&#10;  &quot;RepeatCounter&quot;: 1&#10;}"/>
+</p:tagLst>
+</file>
+
 <file path=ppt/tags/tag2.xml><?xml version="1.0" encoding="utf-8"?>
 <p:tagLst xmlns:a="http://schemas.openxmlformats.org/drawingml/2006/main" xmlns:r="http://schemas.openxmlformats.org/officeDocument/2006/relationships" xmlns:p="http://schemas.openxmlformats.org/presentationml/2006/main">
   <p:tag name="PROPSLIDE" val="{&#10;  &quot;ApiSpecs&quot;: {},&#10;  &quot;UserConfirmedLoadDevices&quot;: [],&#10;  &quot;GuessedLoadDevices&quot;: [],&#10;  &quot;UseMacroExapnsion&quot;: false,&#10;  &quot;MacroExpansions&quot;: {}&#10;}"/>
@@ -5195,7 +7099,7 @@
 
 <file path=ppt/tags/tag5.xml><?xml version="1.0" encoding="utf-8"?>
 <p:tagLst xmlns:a="http://schemas.openxmlformats.org/drawingml/2006/main" xmlns:r="http://schemas.openxmlformats.org/officeDocument/2006/relationships" xmlns:p="http://schemas.openxmlformats.org/presentationml/2006/main">
-  <p:tag name="PROPSLIDE" val="{&#10;  &quot;UseMacroExapnsion&quot;: false,&#10;  &quot;MacroExpansions&quot;: {}&#10;}"/>
+  <p:tag name="PROPREAL" val="{&#10;  &quot;GoingTime&quot;: 0,&#10;  &quot;DelayTime&quot;: 0,&#10;  &quot;Motion&quot;: null,&#10;  &quot;Script&quot;: null,&#10;  &quot;NoTrans&quot;: false,&#10;  &quot;IsInitialFinished&quot;: false,&#10;  &quot;IsTokenSource&quot;: false,&#10;  &quot;RepeatCounter&quot;: 1&#10;}"/>
 </p:tagLst>
 </file>
 
@@ -5207,7 +7111,7 @@
 
 <file path=ppt/tags/tag7.xml><?xml version="1.0" encoding="utf-8"?>
 <p:tagLst xmlns:a="http://schemas.openxmlformats.org/drawingml/2006/main" xmlns:r="http://schemas.openxmlformats.org/officeDocument/2006/relationships" xmlns:p="http://schemas.openxmlformats.org/presentationml/2006/main">
-  <p:tag name="PROPREAL" val="{&#10;  &quot;GoingTime&quot;: 0,&#10;  &quot;DelayTime&quot;: 0,&#10;  &quot;Motion&quot;: null,&#10;  &quot;Script&quot;: null,&#10;  &quot;NoTrans&quot;: false,&#10;  &quot;IsInitialFinished&quot;: false,&#10;  &quot;IsTokenSource&quot;: false,&#10;  &quot;RepeatCounter&quot;: 1&#10;}"/>
+  <p:tag name="PROPSLIDE" val="{&#10;  &quot;UseMacroExapnsion&quot;: false,&#10;  &quot;MacroExpansions&quot;: {}&#10;}"/>
 </p:tagLst>
 </file>
 

</xml_diff>

<commit_message>
- Graph<> : Search key 변경 : INamed -> IVertexKey 적용
</commit_message>
<xml_diff>
--- a/docs/Manuals/Developers/Hierarrchies.pptx
+++ b/docs/Manuals/Developers/Hierarrchies.pptx
@@ -11,11 +11,12 @@
     <p:sldId id="267" r:id="rId5"/>
     <p:sldId id="268" r:id="rId6"/>
     <p:sldId id="265" r:id="rId7"/>
+    <p:sldId id="269" r:id="rId8"/>
   </p:sldIdLst>
   <p:sldSz cx="12192000" cy="6858000"/>
   <p:notesSz cx="6858000" cy="9144000"/>
   <p:custDataLst>
-    <p:tags r:id="rId8"/>
+    <p:tags r:id="rId9"/>
   </p:custDataLst>
   <p:defaultTextStyle>
     <a:defPPr>
@@ -269,7 +270,7 @@
           <a:p>
             <a:fld id="{658CC5F2-894C-457A-B848-A71CF30B605A}" type="datetimeFigureOut">
               <a:rPr lang="ko-KR" altLang="en-US" smtClean="0"/>
-              <a:t>2025-02-01</a:t>
+              <a:t>2025-02-03</a:t>
             </a:fld>
             <a:endParaRPr lang="ko-KR" altLang="en-US" dirty="0"/>
           </a:p>
@@ -469,7 +470,7 @@
           <a:p>
             <a:fld id="{658CC5F2-894C-457A-B848-A71CF30B605A}" type="datetimeFigureOut">
               <a:rPr lang="ko-KR" altLang="en-US" smtClean="0"/>
-              <a:t>2025-02-01</a:t>
+              <a:t>2025-02-03</a:t>
             </a:fld>
             <a:endParaRPr lang="ko-KR" altLang="en-US" dirty="0"/>
           </a:p>
@@ -679,7 +680,7 @@
           <a:p>
             <a:fld id="{658CC5F2-894C-457A-B848-A71CF30B605A}" type="datetimeFigureOut">
               <a:rPr lang="ko-KR" altLang="en-US" smtClean="0"/>
-              <a:t>2025-02-01</a:t>
+              <a:t>2025-02-03</a:t>
             </a:fld>
             <a:endParaRPr lang="ko-KR" altLang="en-US" dirty="0"/>
           </a:p>
@@ -879,7 +880,7 @@
           <a:p>
             <a:fld id="{658CC5F2-894C-457A-B848-A71CF30B605A}" type="datetimeFigureOut">
               <a:rPr lang="ko-KR" altLang="en-US" smtClean="0"/>
-              <a:t>2025-02-01</a:t>
+              <a:t>2025-02-03</a:t>
             </a:fld>
             <a:endParaRPr lang="ko-KR" altLang="en-US" dirty="0"/>
           </a:p>
@@ -1155,7 +1156,7 @@
           <a:p>
             <a:fld id="{658CC5F2-894C-457A-B848-A71CF30B605A}" type="datetimeFigureOut">
               <a:rPr lang="ko-KR" altLang="en-US" smtClean="0"/>
-              <a:t>2025-02-01</a:t>
+              <a:t>2025-02-03</a:t>
             </a:fld>
             <a:endParaRPr lang="ko-KR" altLang="en-US" dirty="0"/>
           </a:p>
@@ -1423,7 +1424,7 @@
           <a:p>
             <a:fld id="{658CC5F2-894C-457A-B848-A71CF30B605A}" type="datetimeFigureOut">
               <a:rPr lang="ko-KR" altLang="en-US" smtClean="0"/>
-              <a:t>2025-02-01</a:t>
+              <a:t>2025-02-03</a:t>
             </a:fld>
             <a:endParaRPr lang="ko-KR" altLang="en-US" dirty="0"/>
           </a:p>
@@ -1838,7 +1839,7 @@
           <a:p>
             <a:fld id="{658CC5F2-894C-457A-B848-A71CF30B605A}" type="datetimeFigureOut">
               <a:rPr lang="ko-KR" altLang="en-US" smtClean="0"/>
-              <a:t>2025-02-01</a:t>
+              <a:t>2025-02-03</a:t>
             </a:fld>
             <a:endParaRPr lang="ko-KR" altLang="en-US" dirty="0"/>
           </a:p>
@@ -1980,7 +1981,7 @@
           <a:p>
             <a:fld id="{658CC5F2-894C-457A-B848-A71CF30B605A}" type="datetimeFigureOut">
               <a:rPr lang="ko-KR" altLang="en-US" smtClean="0"/>
-              <a:t>2025-02-01</a:t>
+              <a:t>2025-02-03</a:t>
             </a:fld>
             <a:endParaRPr lang="ko-KR" altLang="en-US" dirty="0"/>
           </a:p>
@@ -2093,7 +2094,7 @@
           <a:p>
             <a:fld id="{658CC5F2-894C-457A-B848-A71CF30B605A}" type="datetimeFigureOut">
               <a:rPr lang="ko-KR" altLang="en-US" smtClean="0"/>
-              <a:t>2025-02-01</a:t>
+              <a:t>2025-02-03</a:t>
             </a:fld>
             <a:endParaRPr lang="ko-KR" altLang="en-US" dirty="0"/>
           </a:p>
@@ -2406,7 +2407,7 @@
           <a:p>
             <a:fld id="{658CC5F2-894C-457A-B848-A71CF30B605A}" type="datetimeFigureOut">
               <a:rPr lang="ko-KR" altLang="en-US" smtClean="0"/>
-              <a:t>2025-02-01</a:t>
+              <a:t>2025-02-03</a:t>
             </a:fld>
             <a:endParaRPr lang="ko-KR" altLang="en-US" dirty="0"/>
           </a:p>
@@ -2695,7 +2696,7 @@
           <a:p>
             <a:fld id="{658CC5F2-894C-457A-B848-A71CF30B605A}" type="datetimeFigureOut">
               <a:rPr lang="ko-KR" altLang="en-US" smtClean="0"/>
-              <a:t>2025-02-01</a:t>
+              <a:t>2025-02-03</a:t>
             </a:fld>
             <a:endParaRPr lang="ko-KR" altLang="en-US" dirty="0"/>
           </a:p>
@@ -2938,7 +2939,7 @@
           <a:p>
             <a:fld id="{658CC5F2-894C-457A-B848-A71CF30B605A}" type="datetimeFigureOut">
               <a:rPr lang="ko-KR" altLang="en-US" smtClean="0"/>
-              <a:t>2025-02-01</a:t>
+              <a:t>2025-02-03</a:t>
             </a:fld>
             <a:endParaRPr lang="ko-KR" altLang="en-US" dirty="0"/>
           </a:p>
@@ -7010,6 +7011,1610 @@
     <p:extLst>
       <p:ext uri="{BB962C8B-B14F-4D97-AF65-F5344CB8AC3E}">
         <p14:creationId xmlns:p14="http://schemas.microsoft.com/office/powerpoint/2010/main" val="241606752"/>
+      </p:ext>
+    </p:extLst>
+  </p:cSld>
+  <p:clrMapOvr>
+    <a:masterClrMapping/>
+  </p:clrMapOvr>
+</p:sld>
+</file>
+
+<file path=ppt/slides/slide7.xml><?xml version="1.0" encoding="utf-8"?>
+<p:sld xmlns:a="http://schemas.openxmlformats.org/drawingml/2006/main" xmlns:r="http://schemas.openxmlformats.org/officeDocument/2006/relationships" xmlns:p="http://schemas.openxmlformats.org/presentationml/2006/main">
+  <p:cSld>
+    <p:spTree>
+      <p:nvGrpSpPr>
+        <p:cNvPr id="1" name=""/>
+        <p:cNvGrpSpPr/>
+        <p:nvPr/>
+      </p:nvGrpSpPr>
+      <p:grpSpPr>
+        <a:xfrm>
+          <a:off x="0" y="0"/>
+          <a:ext cx="0" cy="0"/>
+          <a:chOff x="0" y="0"/>
+          <a:chExt cx="0" cy="0"/>
+        </a:xfrm>
+      </p:grpSpPr>
+      <p:sp>
+        <p:nvSpPr>
+          <p:cNvPr id="2" name="제목 1">
+            <a:extLst>
+              <a:ext uri="{FF2B5EF4-FFF2-40B4-BE49-F238E27FC236}">
+                <a16:creationId xmlns:a16="http://schemas.microsoft.com/office/drawing/2014/main" id="{FB09FC9F-0F70-BE4D-08C5-C8FA64BDB454}"/>
+              </a:ext>
+            </a:extLst>
+          </p:cNvPr>
+          <p:cNvSpPr>
+            <a:spLocks noGrp="1"/>
+          </p:cNvSpPr>
+          <p:nvPr>
+            <p:ph type="title"/>
+          </p:nvPr>
+        </p:nvSpPr>
+        <p:spPr/>
+        <p:txBody>
+          <a:bodyPr/>
+          <a:lstStyle/>
+          <a:p>
+            <a:r>
+              <a:rPr lang="en-US" altLang="ko-KR" dirty="0" err="1"/>
+              <a:t>Guid</a:t>
+            </a:r>
+            <a:r>
+              <a:rPr lang="en-US" altLang="ko-KR" dirty="0"/>
+              <a:t> </a:t>
+            </a:r>
+            <a:r>
+              <a:rPr lang="ko-KR" altLang="en-US" dirty="0"/>
+              <a:t>사용 고려사항</a:t>
+            </a:r>
+          </a:p>
+        </p:txBody>
+      </p:sp>
+      <mc:AlternateContent xmlns:mc="http://schemas.openxmlformats.org/markup-compatibility/2006">
+        <mc:Choice xmlns:a14="http://schemas.microsoft.com/office/drawing/2010/main" Requires="a14">
+          <p:sp>
+            <p:nvSpPr>
+              <p:cNvPr id="3" name="내용 개체 틀 2">
+                <a:extLst>
+                  <a:ext uri="{FF2B5EF4-FFF2-40B4-BE49-F238E27FC236}">
+                    <a16:creationId xmlns:a16="http://schemas.microsoft.com/office/drawing/2014/main" id="{3AFDFF6F-89F8-B588-3C5F-4785ACFC342D}"/>
+                  </a:ext>
+                </a:extLst>
+              </p:cNvPr>
+              <p:cNvSpPr>
+                <a:spLocks noGrp="1"/>
+              </p:cNvSpPr>
+              <p:nvPr>
+                <p:ph idx="1"/>
+              </p:nvPr>
+            </p:nvSpPr>
+            <p:spPr>
+              <a:xfrm>
+                <a:off x="5813570" y="1825625"/>
+                <a:ext cx="5540229" cy="4351338"/>
+              </a:xfrm>
+            </p:spPr>
+            <p:txBody>
+              <a:bodyPr>
+                <a:normAutofit/>
+              </a:bodyPr>
+              <a:lstStyle/>
+              <a:p>
+                <a14:m>
+                  <m:oMath xmlns:m="http://schemas.openxmlformats.org/officeDocument/2006/math">
+                    <m:sSub>
+                      <m:sSubPr>
+                        <m:ctrlPr>
+                          <a:rPr lang="en-US" altLang="ko-KR" sz="1600" b="0" i="1" smtClean="0">
+                            <a:latin typeface="Cambria Math" panose="02040503050406030204" pitchFamily="18" charset="0"/>
+                          </a:rPr>
+                        </m:ctrlPr>
+                      </m:sSubPr>
+                      <m:e>
+                        <m:r>
+                          <a:rPr lang="en-US" altLang="ko-KR" sz="1600" b="0" i="1" smtClean="0">
+                            <a:latin typeface="Cambria Math" panose="02040503050406030204" pitchFamily="18" charset="0"/>
+                          </a:rPr>
+                          <m:t>𝐺</m:t>
+                        </m:r>
+                      </m:e>
+                      <m:sub>
+                        <m:r>
+                          <a:rPr lang="en-US" altLang="ko-KR" sz="1600" b="0" i="1" smtClean="0">
+                            <a:latin typeface="Cambria Math" panose="02040503050406030204" pitchFamily="18" charset="0"/>
+                          </a:rPr>
+                          <m:t>𝑛</m:t>
+                        </m:r>
+                      </m:sub>
+                    </m:sSub>
+                  </m:oMath>
+                </a14:m>
+                <a:r>
+                  <a:rPr lang="ko-KR" altLang="en-US" sz="1600" dirty="0"/>
+                  <a:t> </a:t>
+                </a:r>
+                <a:r>
+                  <a:rPr lang="en-US" altLang="ko-KR" sz="1600" dirty="0"/>
+                  <a:t>: </a:t>
+                </a:r>
+                <a:r>
+                  <a:rPr lang="en-US" altLang="ko-KR" sz="1600" dirty="0" err="1"/>
+                  <a:t>Guid</a:t>
+                </a:r>
+                <a:r>
+                  <a:rPr lang="en-US" altLang="ko-KR" sz="1600" dirty="0"/>
+                  <a:t> n</a:t>
+                </a:r>
+              </a:p>
+              <a:p>
+                <a14:m>
+                  <m:oMath xmlns:m="http://schemas.openxmlformats.org/officeDocument/2006/math">
+                    <m:sSub>
+                      <m:sSubPr>
+                        <m:ctrlPr>
+                          <a:rPr lang="en-US" altLang="ko-KR" sz="1600" b="0" i="1" smtClean="0">
+                            <a:latin typeface="Cambria Math" panose="02040503050406030204" pitchFamily="18" charset="0"/>
+                          </a:rPr>
+                        </m:ctrlPr>
+                      </m:sSubPr>
+                      <m:e>
+                        <m:r>
+                          <a:rPr lang="en-US" altLang="ko-KR" sz="1600" b="0" i="1" smtClean="0">
+                            <a:latin typeface="Cambria Math" panose="02040503050406030204" pitchFamily="18" charset="0"/>
+                          </a:rPr>
+                          <m:t>𝐶</m:t>
+                        </m:r>
+                      </m:e>
+                      <m:sub>
+                        <m:r>
+                          <a:rPr lang="en-US" altLang="ko-KR" sz="1600" b="0" i="1" smtClean="0">
+                            <a:latin typeface="Cambria Math" panose="02040503050406030204" pitchFamily="18" charset="0"/>
+                          </a:rPr>
+                          <m:t>𝑚</m:t>
+                        </m:r>
+                      </m:sub>
+                    </m:sSub>
+                  </m:oMath>
+                </a14:m>
+                <a:r>
+                  <a:rPr lang="en-US" altLang="ko-KR" sz="1600" dirty="0"/>
+                  <a:t>: </a:t>
+                </a:r>
+                <a:r>
+                  <a:rPr lang="ko-KR" altLang="en-US" sz="1600" dirty="0"/>
+                  <a:t>기존 개념상 </a:t>
+                </a:r>
+                <a:r>
+                  <a:rPr lang="en-US" altLang="ko-KR" sz="1600" dirty="0"/>
+                  <a:t>Call m</a:t>
+                </a:r>
+              </a:p>
+              <a:p>
+                <a14:m>
+                  <m:oMath xmlns:m="http://schemas.openxmlformats.org/officeDocument/2006/math">
+                    <m:sSub>
+                      <m:sSubPr>
+                        <m:ctrlPr>
+                          <a:rPr lang="en-US" altLang="ko-KR" sz="1600" b="0" i="1" smtClean="0">
+                            <a:latin typeface="Cambria Math" panose="02040503050406030204" pitchFamily="18" charset="0"/>
+                          </a:rPr>
+                        </m:ctrlPr>
+                      </m:sSubPr>
+                      <m:e>
+                        <m:r>
+                          <a:rPr lang="en-US" altLang="ko-KR" sz="1600" b="0" i="1" smtClean="0">
+                            <a:latin typeface="Cambria Math" panose="02040503050406030204" pitchFamily="18" charset="0"/>
+                          </a:rPr>
+                          <m:t>𝐺</m:t>
+                        </m:r>
+                      </m:e>
+                      <m:sub>
+                        <m:r>
+                          <a:rPr lang="en-US" altLang="ko-KR" sz="1600" b="0" i="1" smtClean="0">
+                            <a:latin typeface="Cambria Math" panose="02040503050406030204" pitchFamily="18" charset="0"/>
+                          </a:rPr>
+                          <m:t>𝑛</m:t>
+                        </m:r>
+                      </m:sub>
+                    </m:sSub>
+                    <m:d>
+                      <m:dPr>
+                        <m:ctrlPr>
+                          <a:rPr lang="en-US" altLang="ko-KR" sz="1600" b="0" i="1" smtClean="0">
+                            <a:latin typeface="Cambria Math" panose="02040503050406030204" pitchFamily="18" charset="0"/>
+                          </a:rPr>
+                        </m:ctrlPr>
+                      </m:dPr>
+                      <m:e>
+                        <m:sSub>
+                          <m:sSubPr>
+                            <m:ctrlPr>
+                              <a:rPr lang="en-US" altLang="ko-KR" sz="1600" b="0" i="1" smtClean="0">
+                                <a:latin typeface="Cambria Math" panose="02040503050406030204" pitchFamily="18" charset="0"/>
+                              </a:rPr>
+                            </m:ctrlPr>
+                          </m:sSubPr>
+                          <m:e>
+                            <m:r>
+                              <a:rPr lang="en-US" altLang="ko-KR" sz="1600" b="0" i="1" smtClean="0">
+                                <a:latin typeface="Cambria Math" panose="02040503050406030204" pitchFamily="18" charset="0"/>
+                              </a:rPr>
+                              <m:t>𝐶</m:t>
+                            </m:r>
+                          </m:e>
+                          <m:sub>
+                            <m:r>
+                              <a:rPr lang="en-US" altLang="ko-KR" sz="1600" b="0" i="1" smtClean="0">
+                                <a:latin typeface="Cambria Math" panose="02040503050406030204" pitchFamily="18" charset="0"/>
+                              </a:rPr>
+                              <m:t>𝑚</m:t>
+                            </m:r>
+                          </m:sub>
+                        </m:sSub>
+                      </m:e>
+                    </m:d>
+                  </m:oMath>
+                </a14:m>
+                <a:r>
+                  <a:rPr lang="ko-KR" altLang="en-US" sz="1600" dirty="0"/>
+                  <a:t> </a:t>
+                </a:r>
+                <a:r>
+                  <a:rPr lang="en-US" altLang="ko-KR" sz="1600" dirty="0"/>
+                  <a:t>: Call m </a:t>
+                </a:r>
+                <a:r>
+                  <a:rPr lang="ko-KR" altLang="en-US" sz="1600" dirty="0"/>
+                  <a:t>에 대한 </a:t>
+                </a:r>
+                <a:r>
+                  <a:rPr lang="en-US" altLang="ko-KR" sz="1600" dirty="0" err="1"/>
+                  <a:t>Guid</a:t>
+                </a:r>
+                <a:r>
+                  <a:rPr lang="en-US" altLang="ko-KR" sz="1600" dirty="0"/>
+                  <a:t> n</a:t>
+                </a:r>
+              </a:p>
+              <a:p>
+                <a:endParaRPr lang="ko-KR" altLang="en-US" sz="1600" dirty="0"/>
+              </a:p>
+              <a:p>
+                <a:r>
+                  <a:rPr lang="ko-KR" altLang="en-US" sz="1600" dirty="0"/>
+                  <a:t>장점</a:t>
+                </a:r>
+                <a:endParaRPr lang="en-US" altLang="ko-KR" sz="1600" dirty="0"/>
+              </a:p>
+              <a:p>
+                <a:pPr lvl="1"/>
+                <a:r>
+                  <a:rPr lang="en-US" altLang="ko-KR" sz="1400" dirty="0"/>
+                  <a:t>Graph </a:t>
+                </a:r>
+                <a:r>
+                  <a:rPr lang="ko-KR" altLang="en-US" sz="1400" dirty="0"/>
+                  <a:t>상의 </a:t>
+                </a:r>
+                <a:r>
+                  <a:rPr lang="en-US" altLang="ko-KR" sz="1400" dirty="0" err="1"/>
+                  <a:t>uniq</a:t>
+                </a:r>
+                <a:r>
+                  <a:rPr lang="en-US" altLang="ko-KR" sz="1400" dirty="0"/>
+                  <a:t> vertex</a:t>
+                </a:r>
+              </a:p>
+              <a:p>
+                <a:r>
+                  <a:rPr lang="ko-KR" altLang="en-US" sz="1600" dirty="0"/>
+                  <a:t>단점</a:t>
+                </a:r>
+                <a:endParaRPr lang="en-US" altLang="ko-KR" sz="1600" dirty="0"/>
+              </a:p>
+              <a:p>
+                <a:pPr lvl="1"/>
+                <a14:m>
+                  <m:oMath xmlns:m="http://schemas.openxmlformats.org/officeDocument/2006/math">
+                    <m:sSub>
+                      <m:sSubPr>
+                        <m:ctrlPr>
+                          <a:rPr lang="en-US" altLang="ko-KR" sz="1400" b="0" i="1" smtClean="0">
+                            <a:latin typeface="Cambria Math" panose="02040503050406030204" pitchFamily="18" charset="0"/>
+                          </a:rPr>
+                        </m:ctrlPr>
+                      </m:sSubPr>
+                      <m:e>
+                        <m:r>
+                          <a:rPr lang="en-US" altLang="ko-KR" sz="1400" b="0" i="1" smtClean="0">
+                            <a:latin typeface="Cambria Math" panose="02040503050406030204" pitchFamily="18" charset="0"/>
+                          </a:rPr>
+                          <m:t>𝐺</m:t>
+                        </m:r>
+                      </m:e>
+                      <m:sub>
+                        <m:r>
+                          <a:rPr lang="en-US" altLang="ko-KR" sz="1400" b="0" i="1" smtClean="0">
+                            <a:latin typeface="Cambria Math" panose="02040503050406030204" pitchFamily="18" charset="0"/>
+                          </a:rPr>
+                          <m:t>11</m:t>
+                        </m:r>
+                      </m:sub>
+                    </m:sSub>
+                    <m:r>
+                      <a:rPr lang="en-US" altLang="ko-KR" sz="1400" b="0" i="1" smtClean="0">
+                        <a:latin typeface="Cambria Math" panose="02040503050406030204" pitchFamily="18" charset="0"/>
+                      </a:rPr>
+                      <m:t> </m:t>
+                    </m:r>
+                    <m:r>
+                      <a:rPr lang="ko-KR" altLang="en-US" sz="1400" i="1">
+                        <a:latin typeface="Cambria Math" panose="02040503050406030204" pitchFamily="18" charset="0"/>
+                      </a:rPr>
+                      <m:t>수</m:t>
+                    </m:r>
+                  </m:oMath>
+                </a14:m>
+                <a:r>
+                  <a:rPr lang="ko-KR" altLang="en-US" sz="1400" dirty="0"/>
+                  <a:t>정시</a:t>
+                </a:r>
+                <a:r>
+                  <a:rPr lang="en-US" altLang="ko-KR" sz="1400" dirty="0"/>
+                  <a:t>?</a:t>
+                </a:r>
+                <a:r>
+                  <a:rPr lang="ko-KR" altLang="en-US" sz="1400" dirty="0"/>
+                  <a:t> </a:t>
+                </a:r>
+                <a14:m>
+                  <m:oMath xmlns:m="http://schemas.openxmlformats.org/officeDocument/2006/math">
+                    <m:sSub>
+                      <m:sSubPr>
+                        <m:ctrlPr>
+                          <a:rPr lang="en-US" altLang="ko-KR" sz="1400" i="1" smtClean="0">
+                            <a:latin typeface="Cambria Math" panose="02040503050406030204" pitchFamily="18" charset="0"/>
+                          </a:rPr>
+                        </m:ctrlPr>
+                      </m:sSubPr>
+                      <m:e>
+                        <m:r>
+                          <a:rPr lang="en-US" altLang="ko-KR" sz="1400" i="1">
+                            <a:latin typeface="Cambria Math" panose="02040503050406030204" pitchFamily="18" charset="0"/>
+                          </a:rPr>
+                          <m:t>𝐺</m:t>
+                        </m:r>
+                      </m:e>
+                      <m:sub>
+                        <m:r>
+                          <a:rPr lang="en-US" altLang="ko-KR" sz="1400" b="0" i="1" smtClean="0">
+                            <a:latin typeface="Cambria Math" panose="02040503050406030204" pitchFamily="18" charset="0"/>
+                          </a:rPr>
+                          <m:t>1</m:t>
+                        </m:r>
+                        <m:r>
+                          <a:rPr lang="en-US" altLang="ko-KR" sz="1400" b="0" i="1" smtClean="0">
+                            <a:latin typeface="Cambria Math" panose="02040503050406030204" pitchFamily="18" charset="0"/>
+                          </a:rPr>
+                          <m:t>1</m:t>
+                        </m:r>
+                      </m:sub>
+                    </m:sSub>
+                  </m:oMath>
+                </a14:m>
+                <a:r>
+                  <a:rPr lang="en-US" altLang="ko-KR" sz="1400" dirty="0"/>
+                  <a:t>, </a:t>
+                </a:r>
+                <a14:m>
+                  <m:oMath xmlns:m="http://schemas.openxmlformats.org/officeDocument/2006/math">
+                    <m:sSub>
+                      <m:sSubPr>
+                        <m:ctrlPr>
+                          <a:rPr lang="en-US" altLang="ko-KR" sz="1400" i="1">
+                            <a:latin typeface="Cambria Math" panose="02040503050406030204" pitchFamily="18" charset="0"/>
+                          </a:rPr>
+                        </m:ctrlPr>
+                      </m:sSubPr>
+                      <m:e>
+                        <m:r>
+                          <a:rPr lang="en-US" altLang="ko-KR" sz="1400" i="1">
+                            <a:latin typeface="Cambria Math" panose="02040503050406030204" pitchFamily="18" charset="0"/>
+                          </a:rPr>
+                          <m:t>𝐺</m:t>
+                        </m:r>
+                      </m:e>
+                      <m:sub>
+                        <m:r>
+                          <a:rPr lang="en-US" altLang="ko-KR" sz="1400" b="0" i="1" smtClean="0">
+                            <a:latin typeface="Cambria Math" panose="02040503050406030204" pitchFamily="18" charset="0"/>
+                          </a:rPr>
+                          <m:t>22</m:t>
+                        </m:r>
+                      </m:sub>
+                    </m:sSub>
+                  </m:oMath>
+                </a14:m>
+                <a:r>
+                  <a:rPr lang="en-US" altLang="ko-KR" sz="1400" dirty="0"/>
+                  <a:t> </a:t>
+                </a:r>
+                <a:r>
+                  <a:rPr lang="ko-KR" altLang="en-US" sz="1400" dirty="0"/>
+                  <a:t>모두 찾아 수정</a:t>
+                </a:r>
+                <a:r>
+                  <a:rPr lang="en-US" altLang="ko-KR" sz="1400" dirty="0"/>
+                  <a:t>? (</a:t>
+                </a:r>
+                <a:r>
+                  <a:rPr lang="ko-KR" altLang="en-US" sz="1400" dirty="0"/>
+                  <a:t>불가</a:t>
+                </a:r>
+                <a:r>
+                  <a:rPr lang="en-US" altLang="ko-KR" sz="1400" dirty="0"/>
+                  <a:t>?)</a:t>
+                </a:r>
+              </a:p>
+              <a:p>
+                <a:pPr lvl="1"/>
+                <a14:m>
+                  <m:oMath xmlns:m="http://schemas.openxmlformats.org/officeDocument/2006/math">
+                    <m:sSub>
+                      <m:sSubPr>
+                        <m:ctrlPr>
+                          <a:rPr lang="en-US" altLang="ko-KR" sz="1400" b="0" i="1" smtClean="0">
+                            <a:latin typeface="Cambria Math" panose="02040503050406030204" pitchFamily="18" charset="0"/>
+                          </a:rPr>
+                        </m:ctrlPr>
+                      </m:sSubPr>
+                      <m:e>
+                        <m:r>
+                          <a:rPr lang="en-US" altLang="ko-KR" sz="1400" b="0" i="1" smtClean="0">
+                            <a:latin typeface="Cambria Math" panose="02040503050406030204" pitchFamily="18" charset="0"/>
+                          </a:rPr>
+                          <m:t>𝐶</m:t>
+                        </m:r>
+                      </m:e>
+                      <m:sub>
+                        <m:r>
+                          <a:rPr lang="en-US" altLang="ko-KR" sz="1400" b="0" i="1" smtClean="0">
+                            <a:latin typeface="Cambria Math" panose="02040503050406030204" pitchFamily="18" charset="0"/>
+                          </a:rPr>
+                          <m:t>1</m:t>
+                        </m:r>
+                        <m:r>
+                          <a:rPr lang="en-US" altLang="ko-KR" sz="1400" b="0" i="1" smtClean="0">
+                            <a:latin typeface="Cambria Math" panose="02040503050406030204" pitchFamily="18" charset="0"/>
+                          </a:rPr>
+                          <m:t>1</m:t>
+                        </m:r>
+                      </m:sub>
+                    </m:sSub>
+                    <m:r>
+                      <a:rPr lang="en-US" altLang="ko-KR" sz="1400" b="0" i="1" smtClean="0">
+                        <a:latin typeface="Cambria Math" panose="02040503050406030204" pitchFamily="18" charset="0"/>
+                      </a:rPr>
+                      <m:t> </m:t>
+                    </m:r>
+                    <m:r>
+                      <a:rPr lang="ko-KR" altLang="en-US" sz="1400" i="1">
+                        <a:latin typeface="Cambria Math" panose="02040503050406030204" pitchFamily="18" charset="0"/>
+                      </a:rPr>
+                      <m:t>수</m:t>
+                    </m:r>
+                  </m:oMath>
+                </a14:m>
+                <a:r>
+                  <a:rPr lang="ko-KR" altLang="en-US" sz="1400" dirty="0"/>
+                  <a:t>정시</a:t>
+                </a:r>
+                <a:r>
+                  <a:rPr lang="en-US" altLang="ko-KR" sz="1400" dirty="0"/>
+                  <a:t>?</a:t>
+                </a:r>
+                <a:r>
+                  <a:rPr lang="ko-KR" altLang="en-US" sz="1400" dirty="0"/>
+                  <a:t> </a:t>
+                </a:r>
+                <a14:m>
+                  <m:oMath xmlns:m="http://schemas.openxmlformats.org/officeDocument/2006/math">
+                    <m:sSub>
+                      <m:sSubPr>
+                        <m:ctrlPr>
+                          <a:rPr lang="en-US" altLang="ko-KR" sz="1400" i="1" smtClean="0">
+                            <a:latin typeface="Cambria Math" panose="02040503050406030204" pitchFamily="18" charset="0"/>
+                          </a:rPr>
+                        </m:ctrlPr>
+                      </m:sSubPr>
+                      <m:e>
+                        <m:r>
+                          <a:rPr lang="en-US" altLang="ko-KR" sz="1400" i="1">
+                            <a:latin typeface="Cambria Math" panose="02040503050406030204" pitchFamily="18" charset="0"/>
+                          </a:rPr>
+                          <m:t>𝐺</m:t>
+                        </m:r>
+                      </m:e>
+                      <m:sub>
+                        <m:r>
+                          <a:rPr lang="en-US" altLang="ko-KR" sz="1400" b="0" i="1" smtClean="0">
+                            <a:latin typeface="Cambria Math" panose="02040503050406030204" pitchFamily="18" charset="0"/>
+                          </a:rPr>
+                          <m:t>1</m:t>
+                        </m:r>
+                        <m:r>
+                          <a:rPr lang="en-US" altLang="ko-KR" sz="1400" b="0" i="1" smtClean="0">
+                            <a:latin typeface="Cambria Math" panose="02040503050406030204" pitchFamily="18" charset="0"/>
+                          </a:rPr>
+                          <m:t>1</m:t>
+                        </m:r>
+                      </m:sub>
+                    </m:sSub>
+                  </m:oMath>
+                </a14:m>
+                <a:r>
+                  <a:rPr lang="en-US" altLang="ko-KR" sz="1400" dirty="0"/>
+                  <a:t>, </a:t>
+                </a:r>
+                <a14:m>
+                  <m:oMath xmlns:m="http://schemas.openxmlformats.org/officeDocument/2006/math">
+                    <m:sSub>
+                      <m:sSubPr>
+                        <m:ctrlPr>
+                          <a:rPr lang="en-US" altLang="ko-KR" sz="1400" i="1">
+                            <a:latin typeface="Cambria Math" panose="02040503050406030204" pitchFamily="18" charset="0"/>
+                          </a:rPr>
+                        </m:ctrlPr>
+                      </m:sSubPr>
+                      <m:e>
+                        <m:r>
+                          <a:rPr lang="en-US" altLang="ko-KR" sz="1400" i="1">
+                            <a:latin typeface="Cambria Math" panose="02040503050406030204" pitchFamily="18" charset="0"/>
+                          </a:rPr>
+                          <m:t>𝐺</m:t>
+                        </m:r>
+                      </m:e>
+                      <m:sub>
+                        <m:r>
+                          <a:rPr lang="en-US" altLang="ko-KR" sz="1400" b="0" i="1" smtClean="0">
+                            <a:latin typeface="Cambria Math" panose="02040503050406030204" pitchFamily="18" charset="0"/>
+                          </a:rPr>
+                          <m:t>2</m:t>
+                        </m:r>
+                        <m:r>
+                          <a:rPr lang="en-US" altLang="ko-KR" sz="1400" b="0" i="1" smtClean="0">
+                            <a:latin typeface="Cambria Math" panose="02040503050406030204" pitchFamily="18" charset="0"/>
+                          </a:rPr>
+                          <m:t>2</m:t>
+                        </m:r>
+                      </m:sub>
+                    </m:sSub>
+                  </m:oMath>
+                </a14:m>
+                <a:r>
+                  <a:rPr lang="en-US" altLang="ko-KR" sz="1400" dirty="0"/>
+                  <a:t> </a:t>
+                </a:r>
+                <a:r>
+                  <a:rPr lang="ko-KR" altLang="en-US" sz="1400" dirty="0"/>
+                  <a:t>모두 찾아 수정</a:t>
+                </a:r>
+                <a:r>
+                  <a:rPr lang="en-US" altLang="ko-KR" sz="1400" dirty="0"/>
+                  <a:t>? (</a:t>
+                </a:r>
+                <a:r>
+                  <a:rPr lang="ko-KR" altLang="en-US" sz="1400" dirty="0"/>
+                  <a:t>불가</a:t>
+                </a:r>
+                <a:r>
+                  <a:rPr lang="en-US" altLang="ko-KR" sz="1400" dirty="0"/>
+                  <a:t>?)</a:t>
+                </a:r>
+              </a:p>
+              <a:p>
+                <a:pPr lvl="1"/>
+                <a14:m>
+                  <m:oMath xmlns:m="http://schemas.openxmlformats.org/officeDocument/2006/math">
+                    <m:sSub>
+                      <m:sSubPr>
+                        <m:ctrlPr>
+                          <a:rPr lang="en-US" altLang="ko-KR" sz="1400" b="0" i="1" smtClean="0">
+                            <a:latin typeface="Cambria Math" panose="02040503050406030204" pitchFamily="18" charset="0"/>
+                          </a:rPr>
+                        </m:ctrlPr>
+                      </m:sSubPr>
+                      <m:e>
+                        <m:r>
+                          <a:rPr lang="en-US" altLang="ko-KR" sz="1400" b="0" i="1" smtClean="0">
+                            <a:latin typeface="Cambria Math" panose="02040503050406030204" pitchFamily="18" charset="0"/>
+                          </a:rPr>
+                          <m:t>𝐶</m:t>
+                        </m:r>
+                      </m:e>
+                      <m:sub>
+                        <m:r>
+                          <a:rPr lang="en-US" altLang="ko-KR" sz="1400" b="0" i="1" smtClean="0">
+                            <a:latin typeface="Cambria Math" panose="02040503050406030204" pitchFamily="18" charset="0"/>
+                          </a:rPr>
+                          <m:t>11</m:t>
+                        </m:r>
+                      </m:sub>
+                    </m:sSub>
+                    <m:r>
+                      <a:rPr lang="ko-KR" altLang="en-US" sz="1400" i="1">
+                        <a:latin typeface="Cambria Math" panose="02040503050406030204" pitchFamily="18" charset="0"/>
+                      </a:rPr>
+                      <m:t>의</m:t>
+                    </m:r>
+                  </m:oMath>
+                </a14:m>
+                <a:r>
+                  <a:rPr lang="ko-KR" altLang="en-US" sz="1400" dirty="0"/>
+                  <a:t> </a:t>
+                </a:r>
+                <a:r>
+                  <a:rPr lang="en-US" altLang="ko-KR" sz="1400" dirty="0"/>
+                  <a:t>safety </a:t>
+                </a:r>
+                <a:r>
+                  <a:rPr lang="ko-KR" altLang="en-US" sz="1400" dirty="0"/>
+                  <a:t>조건이 </a:t>
+                </a:r>
+                <a14:m>
+                  <m:oMath xmlns:m="http://schemas.openxmlformats.org/officeDocument/2006/math">
+                    <m:sSub>
+                      <m:sSubPr>
+                        <m:ctrlPr>
+                          <a:rPr lang="en-US" altLang="ko-KR" sz="1400" i="1">
+                            <a:latin typeface="Cambria Math" panose="02040503050406030204" pitchFamily="18" charset="0"/>
+                          </a:rPr>
+                        </m:ctrlPr>
+                      </m:sSubPr>
+                      <m:e>
+                        <m:r>
+                          <a:rPr lang="en-US" altLang="ko-KR" sz="1400" i="1">
+                            <a:latin typeface="Cambria Math" panose="02040503050406030204" pitchFamily="18" charset="0"/>
+                          </a:rPr>
+                          <m:t>𝐶</m:t>
+                        </m:r>
+                      </m:e>
+                      <m:sub>
+                        <m:r>
+                          <a:rPr lang="en-US" altLang="ko-KR" sz="1400" b="0" i="1" smtClean="0">
+                            <a:latin typeface="Cambria Math" panose="02040503050406030204" pitchFamily="18" charset="0"/>
+                          </a:rPr>
+                          <m:t>𝑥</m:t>
+                        </m:r>
+                      </m:sub>
+                    </m:sSub>
+                    <m:r>
+                      <a:rPr lang="ko-KR" altLang="en-US" sz="1400" i="1" smtClean="0">
+                        <a:latin typeface="Cambria Math" panose="02040503050406030204" pitchFamily="18" charset="0"/>
+                      </a:rPr>
+                      <m:t>라</m:t>
+                    </m:r>
+                  </m:oMath>
+                </a14:m>
+                <a:r>
+                  <a:rPr lang="ko-KR" altLang="en-US" sz="1400" dirty="0"/>
+                  <a:t>면 </a:t>
+                </a:r>
+                <a14:m>
+                  <m:oMath xmlns:m="http://schemas.openxmlformats.org/officeDocument/2006/math">
+                    <m:sSub>
+                      <m:sSubPr>
+                        <m:ctrlPr>
+                          <a:rPr lang="en-US" altLang="ko-KR" sz="1400" i="1">
+                            <a:latin typeface="Cambria Math" panose="02040503050406030204" pitchFamily="18" charset="0"/>
+                          </a:rPr>
+                        </m:ctrlPr>
+                      </m:sSubPr>
+                      <m:e>
+                        <m:r>
+                          <a:rPr lang="en-US" altLang="ko-KR" sz="1400" i="1">
+                            <a:latin typeface="Cambria Math" panose="02040503050406030204" pitchFamily="18" charset="0"/>
+                          </a:rPr>
+                          <m:t>𝐺</m:t>
+                        </m:r>
+                      </m:e>
+                      <m:sub>
+                        <m:r>
+                          <a:rPr lang="en-US" altLang="ko-KR" sz="1400" b="0" i="1" smtClean="0">
+                            <a:latin typeface="Cambria Math" panose="02040503050406030204" pitchFamily="18" charset="0"/>
+                          </a:rPr>
+                          <m:t>𝑦</m:t>
+                        </m:r>
+                      </m:sub>
+                    </m:sSub>
+                    <m:d>
+                      <m:dPr>
+                        <m:ctrlPr>
+                          <a:rPr lang="en-US" altLang="ko-KR" sz="1400" i="1">
+                            <a:latin typeface="Cambria Math" panose="02040503050406030204" pitchFamily="18" charset="0"/>
+                          </a:rPr>
+                        </m:ctrlPr>
+                      </m:dPr>
+                      <m:e>
+                        <m:sSub>
+                          <m:sSubPr>
+                            <m:ctrlPr>
+                              <a:rPr lang="en-US" altLang="ko-KR" sz="1400" i="1">
+                                <a:latin typeface="Cambria Math" panose="02040503050406030204" pitchFamily="18" charset="0"/>
+                              </a:rPr>
+                            </m:ctrlPr>
+                          </m:sSubPr>
+                          <m:e>
+                            <m:r>
+                              <a:rPr lang="en-US" altLang="ko-KR" sz="1400" i="1">
+                                <a:latin typeface="Cambria Math" panose="02040503050406030204" pitchFamily="18" charset="0"/>
+                              </a:rPr>
+                              <m:t>𝐶</m:t>
+                            </m:r>
+                          </m:e>
+                          <m:sub>
+                            <m:r>
+                              <a:rPr lang="en-US" altLang="ko-KR" sz="1400" b="0" i="1" smtClean="0">
+                                <a:latin typeface="Cambria Math" panose="02040503050406030204" pitchFamily="18" charset="0"/>
+                              </a:rPr>
+                              <m:t>𝑥</m:t>
+                            </m:r>
+                          </m:sub>
+                        </m:sSub>
+                      </m:e>
+                    </m:d>
+                    <m:r>
+                      <a:rPr lang="en-US" altLang="ko-KR" sz="1400" b="0" i="1" smtClean="0">
+                        <a:latin typeface="Cambria Math" panose="02040503050406030204" pitchFamily="18" charset="0"/>
+                      </a:rPr>
+                      <m:t> </m:t>
+                    </m:r>
+                    <m:r>
+                      <a:rPr lang="ko-KR" altLang="en-US" sz="1400" i="1">
+                        <a:latin typeface="Cambria Math" panose="02040503050406030204" pitchFamily="18" charset="0"/>
+                      </a:rPr>
+                      <m:t>인</m:t>
+                    </m:r>
+                  </m:oMath>
+                </a14:m>
+                <a:r>
+                  <a:rPr lang="ko-KR" altLang="en-US" sz="1400" dirty="0"/>
+                  <a:t> 모든 </a:t>
+                </a:r>
+                <a:r>
+                  <a:rPr lang="en-US" altLang="ko-KR" sz="1400" dirty="0"/>
+                  <a:t>G </a:t>
+                </a:r>
+                <a:r>
+                  <a:rPr lang="ko-KR" altLang="en-US" sz="1400" dirty="0"/>
+                  <a:t>찾아서 기입</a:t>
+                </a:r>
+                <a:r>
+                  <a:rPr lang="en-US" altLang="ko-KR" sz="1400" dirty="0"/>
+                  <a:t>?</a:t>
+                </a:r>
+                <a:endParaRPr lang="ko-KR" altLang="en-US" sz="1400" dirty="0"/>
+              </a:p>
+              <a:p>
+                <a:pPr lvl="1"/>
+                <a:endParaRPr lang="ko-KR" altLang="en-US" sz="1400" dirty="0"/>
+              </a:p>
+            </p:txBody>
+          </p:sp>
+        </mc:Choice>
+        <mc:Fallback>
+          <p:sp>
+            <p:nvSpPr>
+              <p:cNvPr id="3" name="내용 개체 틀 2">
+                <a:extLst>
+                  <a:ext uri="{FF2B5EF4-FFF2-40B4-BE49-F238E27FC236}">
+                    <a16:creationId xmlns:a16="http://schemas.microsoft.com/office/drawing/2014/main" id="{3AFDFF6F-89F8-B588-3C5F-4785ACFC342D}"/>
+                  </a:ext>
+                </a:extLst>
+              </p:cNvPr>
+              <p:cNvSpPr>
+                <a:spLocks noGrp="1" noRot="1" noChangeAspect="1" noMove="1" noResize="1" noEditPoints="1" noAdjustHandles="1" noChangeArrowheads="1" noChangeShapeType="1" noTextEdit="1"/>
+              </p:cNvSpPr>
+              <p:nvPr>
+                <p:ph idx="1"/>
+              </p:nvPr>
+            </p:nvSpPr>
+            <p:spPr>
+              <a:xfrm>
+                <a:off x="5813570" y="1825625"/>
+                <a:ext cx="5540229" cy="4351338"/>
+              </a:xfrm>
+              <a:blipFill>
+                <a:blip r:embed="rId2"/>
+                <a:stretch>
+                  <a:fillRect l="-441" t="-980" r="-110"/>
+                </a:stretch>
+              </a:blipFill>
+            </p:spPr>
+            <p:txBody>
+              <a:bodyPr/>
+              <a:lstStyle/>
+              <a:p>
+                <a:r>
+                  <a:rPr lang="ko-KR" altLang="en-US">
+                    <a:noFill/>
+                  </a:rPr>
+                  <a:t> </a:t>
+                </a:r>
+              </a:p>
+            </p:txBody>
+          </p:sp>
+        </mc:Fallback>
+      </mc:AlternateContent>
+      <mc:AlternateContent xmlns:mc="http://schemas.openxmlformats.org/markup-compatibility/2006">
+        <mc:Choice xmlns:a14="http://schemas.microsoft.com/office/drawing/2010/main" Requires="a14">
+          <p:sp>
+            <p:nvSpPr>
+              <p:cNvPr id="4" name="타원 3">
+                <a:extLst>
+                  <a:ext uri="{FF2B5EF4-FFF2-40B4-BE49-F238E27FC236}">
+                    <a16:creationId xmlns:a16="http://schemas.microsoft.com/office/drawing/2014/main" id="{0EB764A0-0845-F35E-5661-3AD0F8A2C78D}"/>
+                  </a:ext>
+                </a:extLst>
+              </p:cNvPr>
+              <p:cNvSpPr/>
+              <p:nvPr/>
+            </p:nvSpPr>
+            <p:spPr>
+              <a:xfrm>
+                <a:off x="1430323" y="2369890"/>
+                <a:ext cx="1149292" cy="583035"/>
+              </a:xfrm>
+              <a:prstGeom prst="ellipse">
+                <a:avLst/>
+              </a:prstGeom>
+            </p:spPr>
+            <p:style>
+              <a:lnRef idx="2">
+                <a:schemeClr val="accent1">
+                  <a:shade val="15000"/>
+                </a:schemeClr>
+              </a:lnRef>
+              <a:fillRef idx="1">
+                <a:schemeClr val="accent1"/>
+              </a:fillRef>
+              <a:effectRef idx="0">
+                <a:schemeClr val="accent1"/>
+              </a:effectRef>
+              <a:fontRef idx="minor">
+                <a:schemeClr val="lt1"/>
+              </a:fontRef>
+            </p:style>
+            <p:txBody>
+              <a:bodyPr rtlCol="0" anchor="ctr"/>
+              <a:lstStyle/>
+              <a:p>
+                <a:pPr algn="ctr"/>
+                <a14:m>
+                  <m:oMathPara xmlns:m="http://schemas.openxmlformats.org/officeDocument/2006/math">
+                    <m:oMathParaPr>
+                      <m:jc m:val="centerGroup"/>
+                    </m:oMathParaPr>
+                    <m:oMath xmlns:m="http://schemas.openxmlformats.org/officeDocument/2006/math">
+                      <m:sSub>
+                        <m:sSubPr>
+                          <m:ctrlPr>
+                            <a:rPr lang="en-US" altLang="ko-KR" sz="1100" b="0" i="1" smtClean="0">
+                              <a:latin typeface="Cambria Math" panose="02040503050406030204" pitchFamily="18" charset="0"/>
+                            </a:rPr>
+                          </m:ctrlPr>
+                        </m:sSubPr>
+                        <m:e>
+                          <m:r>
+                            <a:rPr lang="en-US" altLang="ko-KR" sz="1100" b="0" i="1" smtClean="0">
+                              <a:latin typeface="Cambria Math" panose="02040503050406030204" pitchFamily="18" charset="0"/>
+                            </a:rPr>
+                            <m:t>𝐺</m:t>
+                          </m:r>
+                        </m:e>
+                        <m:sub>
+                          <m:r>
+                            <a:rPr lang="en-US" altLang="ko-KR" sz="1100" b="0" i="1" smtClean="0">
+                              <a:latin typeface="Cambria Math" panose="02040503050406030204" pitchFamily="18" charset="0"/>
+                            </a:rPr>
+                            <m:t>1</m:t>
+                          </m:r>
+                        </m:sub>
+                      </m:sSub>
+                      <m:r>
+                        <a:rPr lang="en-US" altLang="ko-KR" sz="1100" b="0" i="1" smtClean="0">
+                          <a:latin typeface="Cambria Math" panose="02040503050406030204" pitchFamily="18" charset="0"/>
+                        </a:rPr>
+                        <m:t>(</m:t>
+                      </m:r>
+                      <m:sSub>
+                        <m:sSubPr>
+                          <m:ctrlPr>
+                            <a:rPr lang="en-US" altLang="ko-KR" sz="1100" b="0" i="1" smtClean="0">
+                              <a:latin typeface="Cambria Math" panose="02040503050406030204" pitchFamily="18" charset="0"/>
+                            </a:rPr>
+                          </m:ctrlPr>
+                        </m:sSubPr>
+                        <m:e>
+                          <m:r>
+                            <a:rPr lang="en-US" altLang="ko-KR" sz="1100" b="0" i="1" smtClean="0">
+                              <a:latin typeface="Cambria Math" panose="02040503050406030204" pitchFamily="18" charset="0"/>
+                            </a:rPr>
+                            <m:t>𝐶</m:t>
+                          </m:r>
+                        </m:e>
+                        <m:sub>
+                          <m:r>
+                            <a:rPr lang="en-US" altLang="ko-KR" sz="1100" b="0" i="1" smtClean="0">
+                              <a:latin typeface="Cambria Math" panose="02040503050406030204" pitchFamily="18" charset="0"/>
+                            </a:rPr>
+                            <m:t>1</m:t>
+                          </m:r>
+                        </m:sub>
+                      </m:sSub>
+                      <m:r>
+                        <a:rPr lang="en-US" altLang="ko-KR" sz="1100" b="0" i="1" smtClean="0">
+                          <a:latin typeface="Cambria Math" panose="02040503050406030204" pitchFamily="18" charset="0"/>
+                        </a:rPr>
+                        <m:t>)</m:t>
+                      </m:r>
+                    </m:oMath>
+                  </m:oMathPara>
+                </a14:m>
+                <a:endParaRPr lang="ko-KR" altLang="en-US" sz="1100" dirty="0"/>
+              </a:p>
+            </p:txBody>
+          </p:sp>
+        </mc:Choice>
+        <mc:Fallback>
+          <p:sp>
+            <p:nvSpPr>
+              <p:cNvPr id="4" name="타원 3">
+                <a:extLst>
+                  <a:ext uri="{FF2B5EF4-FFF2-40B4-BE49-F238E27FC236}">
+                    <a16:creationId xmlns:a16="http://schemas.microsoft.com/office/drawing/2014/main" id="{0EB764A0-0845-F35E-5661-3AD0F8A2C78D}"/>
+                  </a:ext>
+                </a:extLst>
+              </p:cNvPr>
+              <p:cNvSpPr>
+                <a:spLocks noRot="1" noChangeAspect="1" noMove="1" noResize="1" noEditPoints="1" noAdjustHandles="1" noChangeArrowheads="1" noChangeShapeType="1" noTextEdit="1"/>
+              </p:cNvSpPr>
+              <p:nvPr/>
+            </p:nvSpPr>
+            <p:spPr>
+              <a:xfrm>
+                <a:off x="1430323" y="2369890"/>
+                <a:ext cx="1149292" cy="583035"/>
+              </a:xfrm>
+              <a:prstGeom prst="ellipse">
+                <a:avLst/>
+              </a:prstGeom>
+              <a:blipFill>
+                <a:blip r:embed="rId3"/>
+                <a:stretch>
+                  <a:fillRect/>
+                </a:stretch>
+              </a:blipFill>
+            </p:spPr>
+            <p:txBody>
+              <a:bodyPr/>
+              <a:lstStyle/>
+              <a:p>
+                <a:r>
+                  <a:rPr lang="ko-KR" altLang="en-US">
+                    <a:noFill/>
+                  </a:rPr>
+                  <a:t> </a:t>
+                </a:r>
+              </a:p>
+            </p:txBody>
+          </p:sp>
+        </mc:Fallback>
+      </mc:AlternateContent>
+      <mc:AlternateContent xmlns:mc="http://schemas.openxmlformats.org/markup-compatibility/2006">
+        <mc:Choice xmlns:a14="http://schemas.microsoft.com/office/drawing/2010/main" Requires="a14">
+          <p:sp>
+            <p:nvSpPr>
+              <p:cNvPr id="6" name="타원 5">
+                <a:extLst>
+                  <a:ext uri="{FF2B5EF4-FFF2-40B4-BE49-F238E27FC236}">
+                    <a16:creationId xmlns:a16="http://schemas.microsoft.com/office/drawing/2014/main" id="{A0CF2438-FE41-B908-6707-B46D7A50EEBC}"/>
+                  </a:ext>
+                </a:extLst>
+              </p:cNvPr>
+              <p:cNvSpPr/>
+              <p:nvPr/>
+            </p:nvSpPr>
+            <p:spPr>
+              <a:xfrm>
+                <a:off x="3449273" y="2369889"/>
+                <a:ext cx="1149292" cy="583035"/>
+              </a:xfrm>
+              <a:prstGeom prst="ellipse">
+                <a:avLst/>
+              </a:prstGeom>
+            </p:spPr>
+            <p:style>
+              <a:lnRef idx="2">
+                <a:schemeClr val="accent1">
+                  <a:shade val="15000"/>
+                </a:schemeClr>
+              </a:lnRef>
+              <a:fillRef idx="1">
+                <a:schemeClr val="accent1"/>
+              </a:fillRef>
+              <a:effectRef idx="0">
+                <a:schemeClr val="accent1"/>
+              </a:effectRef>
+              <a:fontRef idx="minor">
+                <a:schemeClr val="lt1"/>
+              </a:fontRef>
+            </p:style>
+            <p:txBody>
+              <a:bodyPr rtlCol="0" anchor="ctr"/>
+              <a:lstStyle/>
+              <a:p>
+                <a:pPr algn="ctr"/>
+                <a14:m>
+                  <m:oMathPara xmlns:m="http://schemas.openxmlformats.org/officeDocument/2006/math">
+                    <m:oMathParaPr>
+                      <m:jc m:val="centerGroup"/>
+                    </m:oMathParaPr>
+                    <m:oMath xmlns:m="http://schemas.openxmlformats.org/officeDocument/2006/math">
+                      <m:sSub>
+                        <m:sSubPr>
+                          <m:ctrlPr>
+                            <a:rPr lang="en-US" altLang="ko-KR" sz="1100" b="0" i="1" smtClean="0">
+                              <a:latin typeface="Cambria Math" panose="02040503050406030204" pitchFamily="18" charset="0"/>
+                            </a:rPr>
+                          </m:ctrlPr>
+                        </m:sSubPr>
+                        <m:e>
+                          <m:r>
+                            <a:rPr lang="en-US" altLang="ko-KR" sz="1100" b="0" i="1" smtClean="0">
+                              <a:latin typeface="Cambria Math" panose="02040503050406030204" pitchFamily="18" charset="0"/>
+                            </a:rPr>
+                            <m:t>𝐺</m:t>
+                          </m:r>
+                        </m:e>
+                        <m:sub>
+                          <m:r>
+                            <a:rPr lang="en-US" altLang="ko-KR" sz="1100" b="0" i="1" smtClean="0">
+                              <a:latin typeface="Cambria Math" panose="02040503050406030204" pitchFamily="18" charset="0"/>
+                            </a:rPr>
+                            <m:t>1</m:t>
+                          </m:r>
+                          <m:r>
+                            <a:rPr lang="en-US" altLang="ko-KR" sz="1100" b="0" i="1" smtClean="0">
+                              <a:latin typeface="Cambria Math" panose="02040503050406030204" pitchFamily="18" charset="0"/>
+                            </a:rPr>
+                            <m:t>1</m:t>
+                          </m:r>
+                        </m:sub>
+                      </m:sSub>
+                      <m:r>
+                        <a:rPr lang="en-US" altLang="ko-KR" sz="1100" b="0" i="1" smtClean="0">
+                          <a:latin typeface="Cambria Math" panose="02040503050406030204" pitchFamily="18" charset="0"/>
+                        </a:rPr>
+                        <m:t>(</m:t>
+                      </m:r>
+                      <m:sSub>
+                        <m:sSubPr>
+                          <m:ctrlPr>
+                            <a:rPr lang="en-US" altLang="ko-KR" sz="1100" b="0" i="1" smtClean="0">
+                              <a:latin typeface="Cambria Math" panose="02040503050406030204" pitchFamily="18" charset="0"/>
+                            </a:rPr>
+                          </m:ctrlPr>
+                        </m:sSubPr>
+                        <m:e>
+                          <m:r>
+                            <a:rPr lang="en-US" altLang="ko-KR" sz="1100" b="0" i="1" smtClean="0">
+                              <a:latin typeface="Cambria Math" panose="02040503050406030204" pitchFamily="18" charset="0"/>
+                            </a:rPr>
+                            <m:t>𝐶</m:t>
+                          </m:r>
+                        </m:e>
+                        <m:sub>
+                          <m:r>
+                            <a:rPr lang="en-US" altLang="ko-KR" sz="1100" b="0" i="1" smtClean="0">
+                              <a:latin typeface="Cambria Math" panose="02040503050406030204" pitchFamily="18" charset="0"/>
+                            </a:rPr>
+                            <m:t>1</m:t>
+                          </m:r>
+                          <m:r>
+                            <a:rPr lang="en-US" altLang="ko-KR" sz="1100" b="0" i="1" smtClean="0">
+                              <a:latin typeface="Cambria Math" panose="02040503050406030204" pitchFamily="18" charset="0"/>
+                            </a:rPr>
+                            <m:t>1</m:t>
+                          </m:r>
+                        </m:sub>
+                      </m:sSub>
+                      <m:r>
+                        <a:rPr lang="en-US" altLang="ko-KR" sz="1100" b="0" i="1" smtClean="0">
+                          <a:latin typeface="Cambria Math" panose="02040503050406030204" pitchFamily="18" charset="0"/>
+                        </a:rPr>
+                        <m:t>)</m:t>
+                      </m:r>
+                    </m:oMath>
+                  </m:oMathPara>
+                </a14:m>
+                <a:endParaRPr lang="ko-KR" altLang="en-US" sz="1100" dirty="0"/>
+              </a:p>
+            </p:txBody>
+          </p:sp>
+        </mc:Choice>
+        <mc:Fallback>
+          <p:sp>
+            <p:nvSpPr>
+              <p:cNvPr id="6" name="타원 5">
+                <a:extLst>
+                  <a:ext uri="{FF2B5EF4-FFF2-40B4-BE49-F238E27FC236}">
+                    <a16:creationId xmlns:a16="http://schemas.microsoft.com/office/drawing/2014/main" id="{A0CF2438-FE41-B908-6707-B46D7A50EEBC}"/>
+                  </a:ext>
+                </a:extLst>
+              </p:cNvPr>
+              <p:cNvSpPr>
+                <a:spLocks noRot="1" noChangeAspect="1" noMove="1" noResize="1" noEditPoints="1" noAdjustHandles="1" noChangeArrowheads="1" noChangeShapeType="1" noTextEdit="1"/>
+              </p:cNvSpPr>
+              <p:nvPr/>
+            </p:nvSpPr>
+            <p:spPr>
+              <a:xfrm>
+                <a:off x="3449273" y="2369889"/>
+                <a:ext cx="1149292" cy="583035"/>
+              </a:xfrm>
+              <a:prstGeom prst="ellipse">
+                <a:avLst/>
+              </a:prstGeom>
+              <a:blipFill>
+                <a:blip r:embed="rId4"/>
+                <a:stretch>
+                  <a:fillRect/>
+                </a:stretch>
+              </a:blipFill>
+            </p:spPr>
+            <p:txBody>
+              <a:bodyPr/>
+              <a:lstStyle/>
+              <a:p>
+                <a:r>
+                  <a:rPr lang="ko-KR" altLang="en-US">
+                    <a:noFill/>
+                  </a:rPr>
+                  <a:t> </a:t>
+                </a:r>
+              </a:p>
+            </p:txBody>
+          </p:sp>
+        </mc:Fallback>
+      </mc:AlternateContent>
+      <p:cxnSp>
+        <p:nvCxnSpPr>
+          <p:cNvPr id="9" name="직선 화살표 연결선 8">
+            <a:extLst>
+              <a:ext uri="{FF2B5EF4-FFF2-40B4-BE49-F238E27FC236}">
+                <a16:creationId xmlns:a16="http://schemas.microsoft.com/office/drawing/2014/main" id="{994D4251-7CF7-BC5F-D071-CFF0E5D33150}"/>
+              </a:ext>
+            </a:extLst>
+          </p:cNvPr>
+          <p:cNvCxnSpPr>
+            <a:stCxn id="4" idx="6"/>
+            <a:endCxn id="6" idx="2"/>
+          </p:cNvCxnSpPr>
+          <p:nvPr/>
+        </p:nvCxnSpPr>
+        <p:spPr>
+          <a:xfrm flipV="1">
+            <a:off x="2579615" y="2661407"/>
+            <a:ext cx="869658" cy="1"/>
+          </a:xfrm>
+          <a:prstGeom prst="straightConnector1">
+            <a:avLst/>
+          </a:prstGeom>
+          <a:ln>
+            <a:tailEnd type="triangle"/>
+          </a:ln>
+        </p:spPr>
+        <p:style>
+          <a:lnRef idx="2">
+            <a:schemeClr val="accent1"/>
+          </a:lnRef>
+          <a:fillRef idx="0">
+            <a:schemeClr val="accent1"/>
+          </a:fillRef>
+          <a:effectRef idx="1">
+            <a:schemeClr val="accent1"/>
+          </a:effectRef>
+          <a:fontRef idx="minor">
+            <a:schemeClr val="tx1"/>
+          </a:fontRef>
+        </p:style>
+      </p:cxnSp>
+      <mc:AlternateContent xmlns:mc="http://schemas.openxmlformats.org/markup-compatibility/2006">
+        <mc:Choice xmlns:a14="http://schemas.microsoft.com/office/drawing/2010/main" Requires="a14">
+          <p:sp>
+            <p:nvSpPr>
+              <p:cNvPr id="10" name="타원 9">
+                <a:extLst>
+                  <a:ext uri="{FF2B5EF4-FFF2-40B4-BE49-F238E27FC236}">
+                    <a16:creationId xmlns:a16="http://schemas.microsoft.com/office/drawing/2014/main" id="{0ECA3186-BFFB-1649-8009-197D9190802A}"/>
+                  </a:ext>
+                </a:extLst>
+              </p:cNvPr>
+              <p:cNvSpPr/>
+              <p:nvPr/>
+            </p:nvSpPr>
+            <p:spPr>
+              <a:xfrm>
+                <a:off x="1430323" y="3429001"/>
+                <a:ext cx="1149292" cy="583035"/>
+              </a:xfrm>
+              <a:prstGeom prst="ellipse">
+                <a:avLst/>
+              </a:prstGeom>
+            </p:spPr>
+            <p:style>
+              <a:lnRef idx="2">
+                <a:schemeClr val="accent1">
+                  <a:shade val="15000"/>
+                </a:schemeClr>
+              </a:lnRef>
+              <a:fillRef idx="1">
+                <a:schemeClr val="accent1"/>
+              </a:fillRef>
+              <a:effectRef idx="0">
+                <a:schemeClr val="accent1"/>
+              </a:effectRef>
+              <a:fontRef idx="minor">
+                <a:schemeClr val="lt1"/>
+              </a:fontRef>
+            </p:style>
+            <p:txBody>
+              <a:bodyPr rtlCol="0" anchor="ctr"/>
+              <a:lstStyle/>
+              <a:p>
+                <a:pPr algn="ctr"/>
+                <a14:m>
+                  <m:oMathPara xmlns:m="http://schemas.openxmlformats.org/officeDocument/2006/math">
+                    <m:oMathParaPr>
+                      <m:jc m:val="centerGroup"/>
+                    </m:oMathParaPr>
+                    <m:oMath xmlns:m="http://schemas.openxmlformats.org/officeDocument/2006/math">
+                      <m:sSub>
+                        <m:sSubPr>
+                          <m:ctrlPr>
+                            <a:rPr lang="en-US" altLang="ko-KR" sz="1100" b="0" i="1" smtClean="0">
+                              <a:latin typeface="Cambria Math" panose="02040503050406030204" pitchFamily="18" charset="0"/>
+                            </a:rPr>
+                          </m:ctrlPr>
+                        </m:sSubPr>
+                        <m:e>
+                          <m:r>
+                            <a:rPr lang="en-US" altLang="ko-KR" sz="1100" b="0" i="1" smtClean="0">
+                              <a:latin typeface="Cambria Math" panose="02040503050406030204" pitchFamily="18" charset="0"/>
+                            </a:rPr>
+                            <m:t>𝐺</m:t>
+                          </m:r>
+                        </m:e>
+                        <m:sub>
+                          <m:r>
+                            <a:rPr lang="en-US" altLang="ko-KR" sz="1100" b="0" i="1" smtClean="0">
+                              <a:latin typeface="Cambria Math" panose="02040503050406030204" pitchFamily="18" charset="0"/>
+                            </a:rPr>
+                            <m:t>2</m:t>
+                          </m:r>
+                        </m:sub>
+                      </m:sSub>
+                      <m:r>
+                        <a:rPr lang="en-US" altLang="ko-KR" sz="1100" b="0" i="1" smtClean="0">
+                          <a:latin typeface="Cambria Math" panose="02040503050406030204" pitchFamily="18" charset="0"/>
+                        </a:rPr>
+                        <m:t>(</m:t>
+                      </m:r>
+                      <m:sSub>
+                        <m:sSubPr>
+                          <m:ctrlPr>
+                            <a:rPr lang="en-US" altLang="ko-KR" sz="1100" b="0" i="1" smtClean="0">
+                              <a:latin typeface="Cambria Math" panose="02040503050406030204" pitchFamily="18" charset="0"/>
+                            </a:rPr>
+                          </m:ctrlPr>
+                        </m:sSubPr>
+                        <m:e>
+                          <m:r>
+                            <a:rPr lang="en-US" altLang="ko-KR" sz="1100" b="0" i="1" smtClean="0">
+                              <a:latin typeface="Cambria Math" panose="02040503050406030204" pitchFamily="18" charset="0"/>
+                            </a:rPr>
+                            <m:t>𝐶</m:t>
+                          </m:r>
+                        </m:e>
+                        <m:sub>
+                          <m:r>
+                            <a:rPr lang="en-US" altLang="ko-KR" sz="1100" b="0" i="1" smtClean="0">
+                              <a:latin typeface="Cambria Math" panose="02040503050406030204" pitchFamily="18" charset="0"/>
+                            </a:rPr>
+                            <m:t>2</m:t>
+                          </m:r>
+                        </m:sub>
+                      </m:sSub>
+                      <m:r>
+                        <a:rPr lang="en-US" altLang="ko-KR" sz="1100" b="0" i="1" smtClean="0">
+                          <a:latin typeface="Cambria Math" panose="02040503050406030204" pitchFamily="18" charset="0"/>
+                        </a:rPr>
+                        <m:t>)</m:t>
+                      </m:r>
+                    </m:oMath>
+                  </m:oMathPara>
+                </a14:m>
+                <a:endParaRPr lang="ko-KR" altLang="en-US" sz="1100" dirty="0"/>
+              </a:p>
+            </p:txBody>
+          </p:sp>
+        </mc:Choice>
+        <mc:Fallback>
+          <p:sp>
+            <p:nvSpPr>
+              <p:cNvPr id="10" name="타원 9">
+                <a:extLst>
+                  <a:ext uri="{FF2B5EF4-FFF2-40B4-BE49-F238E27FC236}">
+                    <a16:creationId xmlns:a16="http://schemas.microsoft.com/office/drawing/2014/main" id="{0ECA3186-BFFB-1649-8009-197D9190802A}"/>
+                  </a:ext>
+                </a:extLst>
+              </p:cNvPr>
+              <p:cNvSpPr>
+                <a:spLocks noRot="1" noChangeAspect="1" noMove="1" noResize="1" noEditPoints="1" noAdjustHandles="1" noChangeArrowheads="1" noChangeShapeType="1" noTextEdit="1"/>
+              </p:cNvSpPr>
+              <p:nvPr/>
+            </p:nvSpPr>
+            <p:spPr>
+              <a:xfrm>
+                <a:off x="1430323" y="3429001"/>
+                <a:ext cx="1149292" cy="583035"/>
+              </a:xfrm>
+              <a:prstGeom prst="ellipse">
+                <a:avLst/>
+              </a:prstGeom>
+              <a:blipFill>
+                <a:blip r:embed="rId5"/>
+                <a:stretch>
+                  <a:fillRect/>
+                </a:stretch>
+              </a:blipFill>
+            </p:spPr>
+            <p:txBody>
+              <a:bodyPr/>
+              <a:lstStyle/>
+              <a:p>
+                <a:r>
+                  <a:rPr lang="ko-KR" altLang="en-US">
+                    <a:noFill/>
+                  </a:rPr>
+                  <a:t> </a:t>
+                </a:r>
+              </a:p>
+            </p:txBody>
+          </p:sp>
+        </mc:Fallback>
+      </mc:AlternateContent>
+      <mc:AlternateContent xmlns:mc="http://schemas.openxmlformats.org/markup-compatibility/2006">
+        <mc:Choice xmlns:a14="http://schemas.microsoft.com/office/drawing/2010/main" Requires="a14">
+          <p:sp>
+            <p:nvSpPr>
+              <p:cNvPr id="11" name="타원 10">
+                <a:extLst>
+                  <a:ext uri="{FF2B5EF4-FFF2-40B4-BE49-F238E27FC236}">
+                    <a16:creationId xmlns:a16="http://schemas.microsoft.com/office/drawing/2014/main" id="{EDD17FCD-9D6C-2DDD-B55C-4592A14B2083}"/>
+                  </a:ext>
+                </a:extLst>
+              </p:cNvPr>
+              <p:cNvSpPr/>
+              <p:nvPr/>
+            </p:nvSpPr>
+            <p:spPr>
+              <a:xfrm>
+                <a:off x="3449273" y="3429000"/>
+                <a:ext cx="1149292" cy="583035"/>
+              </a:xfrm>
+              <a:prstGeom prst="ellipse">
+                <a:avLst/>
+              </a:prstGeom>
+            </p:spPr>
+            <p:style>
+              <a:lnRef idx="2">
+                <a:schemeClr val="accent1">
+                  <a:shade val="15000"/>
+                </a:schemeClr>
+              </a:lnRef>
+              <a:fillRef idx="1">
+                <a:schemeClr val="accent1"/>
+              </a:fillRef>
+              <a:effectRef idx="0">
+                <a:schemeClr val="accent1"/>
+              </a:effectRef>
+              <a:fontRef idx="minor">
+                <a:schemeClr val="lt1"/>
+              </a:fontRef>
+            </p:style>
+            <p:txBody>
+              <a:bodyPr rtlCol="0" anchor="ctr"/>
+              <a:lstStyle/>
+              <a:p>
+                <a:pPr algn="ctr"/>
+                <a14:m>
+                  <m:oMathPara xmlns:m="http://schemas.openxmlformats.org/officeDocument/2006/math">
+                    <m:oMathParaPr>
+                      <m:jc m:val="centerGroup"/>
+                    </m:oMathParaPr>
+                    <m:oMath xmlns:m="http://schemas.openxmlformats.org/officeDocument/2006/math">
+                      <m:sSub>
+                        <m:sSubPr>
+                          <m:ctrlPr>
+                            <a:rPr lang="en-US" altLang="ko-KR" sz="1100" b="0" i="1" smtClean="0">
+                              <a:latin typeface="Cambria Math" panose="02040503050406030204" pitchFamily="18" charset="0"/>
+                            </a:rPr>
+                          </m:ctrlPr>
+                        </m:sSubPr>
+                        <m:e>
+                          <m:r>
+                            <a:rPr lang="en-US" altLang="ko-KR" sz="1100" b="0" i="1" smtClean="0">
+                              <a:latin typeface="Cambria Math" panose="02040503050406030204" pitchFamily="18" charset="0"/>
+                            </a:rPr>
+                            <m:t>𝐺</m:t>
+                          </m:r>
+                        </m:e>
+                        <m:sub>
+                          <m:r>
+                            <a:rPr lang="en-US" altLang="ko-KR" sz="1100" b="0" i="1" smtClean="0">
+                              <a:latin typeface="Cambria Math" panose="02040503050406030204" pitchFamily="18" charset="0"/>
+                            </a:rPr>
+                            <m:t>22</m:t>
+                          </m:r>
+                        </m:sub>
+                      </m:sSub>
+                      <m:r>
+                        <a:rPr lang="en-US" altLang="ko-KR" sz="1100" b="0" i="1" smtClean="0">
+                          <a:latin typeface="Cambria Math" panose="02040503050406030204" pitchFamily="18" charset="0"/>
+                        </a:rPr>
+                        <m:t>(</m:t>
+                      </m:r>
+                      <m:sSub>
+                        <m:sSubPr>
+                          <m:ctrlPr>
+                            <a:rPr lang="en-US" altLang="ko-KR" sz="1100" b="0" i="1" smtClean="0">
+                              <a:latin typeface="Cambria Math" panose="02040503050406030204" pitchFamily="18" charset="0"/>
+                            </a:rPr>
+                          </m:ctrlPr>
+                        </m:sSubPr>
+                        <m:e>
+                          <m:r>
+                            <a:rPr lang="en-US" altLang="ko-KR" sz="1100" b="0" i="1" smtClean="0">
+                              <a:latin typeface="Cambria Math" panose="02040503050406030204" pitchFamily="18" charset="0"/>
+                            </a:rPr>
+                            <m:t>𝐶</m:t>
+                          </m:r>
+                        </m:e>
+                        <m:sub>
+                          <m:r>
+                            <a:rPr lang="en-US" altLang="ko-KR" sz="1100" b="0" i="1" smtClean="0">
+                              <a:latin typeface="Cambria Math" panose="02040503050406030204" pitchFamily="18" charset="0"/>
+                            </a:rPr>
+                            <m:t>1</m:t>
+                          </m:r>
+                          <m:r>
+                            <a:rPr lang="en-US" altLang="ko-KR" sz="1100" b="0" i="1" smtClean="0">
+                              <a:latin typeface="Cambria Math" panose="02040503050406030204" pitchFamily="18" charset="0"/>
+                            </a:rPr>
+                            <m:t>1</m:t>
+                          </m:r>
+                        </m:sub>
+                      </m:sSub>
+                      <m:r>
+                        <a:rPr lang="en-US" altLang="ko-KR" sz="1100" b="0" i="1" smtClean="0">
+                          <a:latin typeface="Cambria Math" panose="02040503050406030204" pitchFamily="18" charset="0"/>
+                        </a:rPr>
+                        <m:t>)</m:t>
+                      </m:r>
+                    </m:oMath>
+                  </m:oMathPara>
+                </a14:m>
+                <a:endParaRPr lang="ko-KR" altLang="en-US" sz="1100" dirty="0"/>
+              </a:p>
+            </p:txBody>
+          </p:sp>
+        </mc:Choice>
+        <mc:Fallback>
+          <p:sp>
+            <p:nvSpPr>
+              <p:cNvPr id="11" name="타원 10">
+                <a:extLst>
+                  <a:ext uri="{FF2B5EF4-FFF2-40B4-BE49-F238E27FC236}">
+                    <a16:creationId xmlns:a16="http://schemas.microsoft.com/office/drawing/2014/main" id="{EDD17FCD-9D6C-2DDD-B55C-4592A14B2083}"/>
+                  </a:ext>
+                </a:extLst>
+              </p:cNvPr>
+              <p:cNvSpPr>
+                <a:spLocks noRot="1" noChangeAspect="1" noMove="1" noResize="1" noEditPoints="1" noAdjustHandles="1" noChangeArrowheads="1" noChangeShapeType="1" noTextEdit="1"/>
+              </p:cNvSpPr>
+              <p:nvPr/>
+            </p:nvSpPr>
+            <p:spPr>
+              <a:xfrm>
+                <a:off x="3449273" y="3429000"/>
+                <a:ext cx="1149292" cy="583035"/>
+              </a:xfrm>
+              <a:prstGeom prst="ellipse">
+                <a:avLst/>
+              </a:prstGeom>
+              <a:blipFill>
+                <a:blip r:embed="rId6"/>
+                <a:stretch>
+                  <a:fillRect/>
+                </a:stretch>
+              </a:blipFill>
+            </p:spPr>
+            <p:txBody>
+              <a:bodyPr/>
+              <a:lstStyle/>
+              <a:p>
+                <a:r>
+                  <a:rPr lang="ko-KR" altLang="en-US">
+                    <a:noFill/>
+                  </a:rPr>
+                  <a:t> </a:t>
+                </a:r>
+              </a:p>
+            </p:txBody>
+          </p:sp>
+        </mc:Fallback>
+      </mc:AlternateContent>
+      <p:cxnSp>
+        <p:nvCxnSpPr>
+          <p:cNvPr id="12" name="직선 화살표 연결선 11">
+            <a:extLst>
+              <a:ext uri="{FF2B5EF4-FFF2-40B4-BE49-F238E27FC236}">
+                <a16:creationId xmlns:a16="http://schemas.microsoft.com/office/drawing/2014/main" id="{8ACDFB1C-228F-140B-7B60-B94EA04F8226}"/>
+              </a:ext>
+            </a:extLst>
+          </p:cNvPr>
+          <p:cNvCxnSpPr>
+            <a:stCxn id="10" idx="6"/>
+            <a:endCxn id="11" idx="2"/>
+          </p:cNvCxnSpPr>
+          <p:nvPr/>
+        </p:nvCxnSpPr>
+        <p:spPr>
+          <a:xfrm flipV="1">
+            <a:off x="2579615" y="3720518"/>
+            <a:ext cx="869658" cy="1"/>
+          </a:xfrm>
+          <a:prstGeom prst="straightConnector1">
+            <a:avLst/>
+          </a:prstGeom>
+          <a:ln>
+            <a:tailEnd type="triangle"/>
+          </a:ln>
+        </p:spPr>
+        <p:style>
+          <a:lnRef idx="2">
+            <a:schemeClr val="accent1"/>
+          </a:lnRef>
+          <a:fillRef idx="0">
+            <a:schemeClr val="accent1"/>
+          </a:fillRef>
+          <a:effectRef idx="1">
+            <a:schemeClr val="accent1"/>
+          </a:effectRef>
+          <a:fontRef idx="minor">
+            <a:schemeClr val="tx1"/>
+          </a:fontRef>
+        </p:style>
+      </p:cxnSp>
+    </p:spTree>
+    <p:extLst>
+      <p:ext uri="{BB962C8B-B14F-4D97-AF65-F5344CB8AC3E}">
+        <p14:creationId xmlns:p14="http://schemas.microsoft.com/office/powerpoint/2010/main" val="4208543479"/>
       </p:ext>
     </p:extLst>
   </p:cSld>

</xml_diff>